<commit_message>
Fix some typos and complement validation feedback story.
</commit_message>
<xml_diff>
--- a/assets/logo.pptx
+++ b/assets/logo.pptx
@@ -104,6 +104,11 @@
       </a:defRPr>
     </a:lvl9pPr>
   </p:defaultTextStyle>
+  <p:extLst>
+    <p:ext uri="{EFAFB233-063F-42B5-8137-9DF3F51BA10A}">
+      <p15:sldGuideLst xmlns:p15="http://schemas.microsoft.com/office/powerpoint/2012/main"/>
+    </p:ext>
+  </p:extLst>
 </p:presentation>
 </file>
 
@@ -897,7 +902,7 @@
       <dgm:spPr/>
     </dgm:pt>
     <dgm:pt modelId="{C60726BF-58CA-4EAD-AE21-2AEE5B89EC12}">
-      <dgm:prSet phldrT="[텍스트]"/>
+      <dgm:prSet phldrT="[텍스트]" custT="1"/>
       <dgm:spPr/>
       <dgm:t>
         <a:bodyPr/>
@@ -905,10 +910,14 @@
         <a:p>
           <a:pPr latinLnBrk="1"/>
           <a:r>
-            <a:rPr lang="en-US" altLang="ko-KR" b="1" dirty="0"/>
+            <a:rPr lang="en-US" altLang="ko-KR" sz="2400" b="1" u="sng" dirty="0">
+              <a:latin typeface="+mj-lt"/>
+            </a:rPr>
             <a:t>TypeScript Class</a:t>
           </a:r>
-          <a:endParaRPr lang="ko-KR" altLang="en-US" b="1" dirty="0"/>
+          <a:endParaRPr lang="ko-KR" altLang="en-US" sz="2400" b="1" u="sng" dirty="0">
+            <a:latin typeface="+mj-lt"/>
+          </a:endParaRPr>
         </a:p>
       </dgm:t>
     </dgm:pt>
@@ -920,7 +929,9 @@
         <a:lstStyle/>
         <a:p>
           <a:pPr latinLnBrk="1"/>
-          <a:endParaRPr lang="ko-KR" altLang="en-US"/>
+          <a:endParaRPr lang="ko-KR" altLang="en-US" sz="1600" b="0">
+            <a:latin typeface="+mj-lt"/>
+          </a:endParaRPr>
         </a:p>
       </dgm:t>
     </dgm:pt>
@@ -932,12 +943,14 @@
         <a:lstStyle/>
         <a:p>
           <a:pPr latinLnBrk="1"/>
-          <a:endParaRPr lang="ko-KR" altLang="en-US"/>
+          <a:endParaRPr lang="ko-KR" altLang="en-US" sz="1600" b="0">
+            <a:latin typeface="+mj-lt"/>
+          </a:endParaRPr>
         </a:p>
       </dgm:t>
     </dgm:pt>
     <dgm:pt modelId="{C094B65D-16B3-4DAF-B569-33E315BA3ADA}">
-      <dgm:prSet phldrT="[텍스트]"/>
+      <dgm:prSet phldrT="[텍스트]" custT="1"/>
       <dgm:spPr/>
       <dgm:t>
         <a:bodyPr/>
@@ -945,10 +958,14 @@
         <a:p>
           <a:pPr latinLnBrk="1"/>
           <a:r>
-            <a:rPr lang="en-US" altLang="ko-KR" b="1" dirty="0"/>
+            <a:rPr lang="en-US" altLang="ko-KR" sz="2400" b="1" u="sng" dirty="0">
+              <a:latin typeface="+mj-lt"/>
+            </a:rPr>
             <a:t>Swagger</a:t>
           </a:r>
-          <a:endParaRPr lang="ko-KR" altLang="en-US" b="1" dirty="0"/>
+          <a:endParaRPr lang="ko-KR" altLang="en-US" sz="2400" b="1" u="sng" dirty="0">
+            <a:latin typeface="+mj-lt"/>
+          </a:endParaRPr>
         </a:p>
       </dgm:t>
     </dgm:pt>
@@ -960,7 +977,9 @@
         <a:lstStyle/>
         <a:p>
           <a:pPr latinLnBrk="1"/>
-          <a:endParaRPr lang="ko-KR" altLang="en-US"/>
+          <a:endParaRPr lang="ko-KR" altLang="en-US" sz="1600" b="0">
+            <a:latin typeface="+mj-lt"/>
+          </a:endParaRPr>
         </a:p>
       </dgm:t>
     </dgm:pt>
@@ -972,12 +991,14 @@
         <a:lstStyle/>
         <a:p>
           <a:pPr latinLnBrk="1"/>
-          <a:endParaRPr lang="ko-KR" altLang="en-US"/>
+          <a:endParaRPr lang="ko-KR" altLang="en-US" sz="1600" b="0">
+            <a:latin typeface="+mj-lt"/>
+          </a:endParaRPr>
         </a:p>
       </dgm:t>
     </dgm:pt>
     <dgm:pt modelId="{9CADE41D-B346-43A2-9FBB-81CC17ABE009}">
-      <dgm:prSet phldrT="[텍스트]"/>
+      <dgm:prSet phldrT="[텍스트]" custT="1"/>
       <dgm:spPr/>
       <dgm:t>
         <a:bodyPr/>
@@ -985,10 +1006,20 @@
         <a:p>
           <a:pPr latinLnBrk="1"/>
           <a:r>
-            <a:rPr lang="en-US" altLang="ko-KR" b="1" dirty="0"/>
-            <a:t>Function Calling</a:t>
+            <a:rPr lang="en-US" altLang="ko-KR" sz="2400" b="1" u="sng" dirty="0">
+              <a:latin typeface="+mj-lt"/>
+            </a:rPr>
+            <a:t>Function </a:t>
           </a:r>
-          <a:endParaRPr lang="ko-KR" altLang="en-US" b="1" dirty="0"/>
+          <a:r>
+            <a:rPr lang="en-US" altLang="ko-KR" sz="2400" b="1" u="sng" dirty="0" err="1">
+              <a:latin typeface="+mj-lt"/>
+            </a:rPr>
+            <a:t>CallingZ</a:t>
+          </a:r>
+          <a:endParaRPr lang="ko-KR" altLang="en-US" sz="2400" b="1" u="sng" dirty="0">
+            <a:latin typeface="+mj-lt"/>
+          </a:endParaRPr>
         </a:p>
       </dgm:t>
     </dgm:pt>
@@ -1000,7 +1031,9 @@
         <a:lstStyle/>
         <a:p>
           <a:pPr latinLnBrk="1"/>
-          <a:endParaRPr lang="ko-KR" altLang="en-US"/>
+          <a:endParaRPr lang="ko-KR" altLang="en-US" sz="1600" b="0">
+            <a:latin typeface="+mj-lt"/>
+          </a:endParaRPr>
         </a:p>
       </dgm:t>
     </dgm:pt>
@@ -1012,12 +1045,14 @@
         <a:lstStyle/>
         <a:p>
           <a:pPr latinLnBrk="1"/>
-          <a:endParaRPr lang="ko-KR" altLang="en-US"/>
+          <a:endParaRPr lang="ko-KR" altLang="en-US" sz="1600" b="0">
+            <a:latin typeface="+mj-lt"/>
+          </a:endParaRPr>
         </a:p>
       </dgm:t>
     </dgm:pt>
     <dgm:pt modelId="{C6A21C00-C7DD-4CEE-9D58-7316613985FB}">
-      <dgm:prSet phldrT="[텍스트]"/>
+      <dgm:prSet phldrT="[텍스트]" custT="1"/>
       <dgm:spPr/>
       <dgm:t>
         <a:bodyPr/>
@@ -1025,10 +1060,14 @@
         <a:p>
           <a:pPr latinLnBrk="1"/>
           <a:r>
-            <a:rPr lang="en-US" altLang="ko-KR" dirty="0"/>
+            <a:rPr lang="en-US" altLang="ko-KR" sz="2000" b="0" dirty="0">
+              <a:latin typeface="+mj-lt"/>
+            </a:rPr>
             <a:t>Class Chatbot</a:t>
           </a:r>
-          <a:endParaRPr lang="ko-KR" altLang="en-US" dirty="0"/>
+          <a:endParaRPr lang="ko-KR" altLang="en-US" sz="2000" b="0" dirty="0">
+            <a:latin typeface="+mj-lt"/>
+          </a:endParaRPr>
         </a:p>
       </dgm:t>
     </dgm:pt>
@@ -1040,7 +1079,9 @@
         <a:lstStyle/>
         <a:p>
           <a:pPr latinLnBrk="1"/>
-          <a:endParaRPr lang="ko-KR" altLang="en-US"/>
+          <a:endParaRPr lang="ko-KR" altLang="en-US" sz="1600" b="0">
+            <a:latin typeface="+mj-lt"/>
+          </a:endParaRPr>
         </a:p>
       </dgm:t>
     </dgm:pt>
@@ -1052,12 +1093,14 @@
         <a:lstStyle/>
         <a:p>
           <a:pPr latinLnBrk="1"/>
-          <a:endParaRPr lang="ko-KR" altLang="en-US"/>
+          <a:endParaRPr lang="ko-KR" altLang="en-US" sz="1600" b="0">
+            <a:latin typeface="+mj-lt"/>
+          </a:endParaRPr>
         </a:p>
       </dgm:t>
     </dgm:pt>
     <dgm:pt modelId="{CCB5BA7B-7C6B-4B56-B1C8-7649E313F9E7}">
-      <dgm:prSet phldrT="[텍스트]"/>
+      <dgm:prSet phldrT="[텍스트]" custT="1"/>
       <dgm:spPr/>
       <dgm:t>
         <a:bodyPr/>
@@ -1065,10 +1108,14 @@
         <a:p>
           <a:pPr latinLnBrk="1"/>
           <a:r>
-            <a:rPr lang="en-US" altLang="ko-KR" dirty="0"/>
+            <a:rPr lang="en-US" altLang="ko-KR" sz="2000" b="0" dirty="0">
+              <a:latin typeface="+mj-lt"/>
+            </a:rPr>
             <a:t>Multi Agent Orchestration</a:t>
           </a:r>
-          <a:endParaRPr lang="ko-KR" altLang="en-US" dirty="0"/>
+          <a:endParaRPr lang="ko-KR" altLang="en-US" sz="2000" b="0" dirty="0">
+            <a:latin typeface="+mj-lt"/>
+          </a:endParaRPr>
         </a:p>
       </dgm:t>
     </dgm:pt>
@@ -1080,7 +1127,9 @@
         <a:lstStyle/>
         <a:p>
           <a:pPr latinLnBrk="1"/>
-          <a:endParaRPr lang="ko-KR" altLang="en-US"/>
+          <a:endParaRPr lang="ko-KR" altLang="en-US" sz="1600" b="0">
+            <a:latin typeface="+mj-lt"/>
+          </a:endParaRPr>
         </a:p>
       </dgm:t>
     </dgm:pt>
@@ -1092,12 +1141,14 @@
         <a:lstStyle/>
         <a:p>
           <a:pPr latinLnBrk="1"/>
-          <a:endParaRPr lang="ko-KR" altLang="en-US"/>
+          <a:endParaRPr lang="ko-KR" altLang="en-US" sz="1600" b="0">
+            <a:latin typeface="+mj-lt"/>
+          </a:endParaRPr>
         </a:p>
       </dgm:t>
     </dgm:pt>
     <dgm:pt modelId="{77763675-AA58-491C-BC5F-7722A5A105BF}">
-      <dgm:prSet phldrT="[텍스트]"/>
+      <dgm:prSet phldrT="[텍스트]" custT="1"/>
       <dgm:spPr/>
       <dgm:t>
         <a:bodyPr/>
@@ -1105,10 +1156,14 @@
         <a:p>
           <a:pPr latinLnBrk="1"/>
           <a:r>
-            <a:rPr lang="en-US" altLang="ko-KR" dirty="0"/>
+            <a:rPr lang="en-US" altLang="ko-KR" sz="2000" b="0" dirty="0">
+              <a:latin typeface="+mj-lt"/>
+            </a:rPr>
             <a:t>Super AI Chatbot</a:t>
           </a:r>
-          <a:endParaRPr lang="ko-KR" altLang="en-US" dirty="0"/>
+          <a:endParaRPr lang="ko-KR" altLang="en-US" sz="2000" b="0" dirty="0">
+            <a:latin typeface="+mj-lt"/>
+          </a:endParaRPr>
         </a:p>
       </dgm:t>
     </dgm:pt>
@@ -1120,7 +1175,9 @@
         <a:lstStyle/>
         <a:p>
           <a:pPr latinLnBrk="1"/>
-          <a:endParaRPr lang="ko-KR" altLang="en-US"/>
+          <a:endParaRPr lang="ko-KR" altLang="en-US" sz="1600" b="0">
+            <a:latin typeface="+mj-lt"/>
+          </a:endParaRPr>
         </a:p>
       </dgm:t>
     </dgm:pt>
@@ -1132,12 +1189,14 @@
         <a:lstStyle/>
         <a:p>
           <a:pPr latinLnBrk="1"/>
-          <a:endParaRPr lang="ko-KR" altLang="en-US"/>
+          <a:endParaRPr lang="ko-KR" altLang="en-US" sz="1600" b="0">
+            <a:latin typeface="+mj-lt"/>
+          </a:endParaRPr>
         </a:p>
       </dgm:t>
     </dgm:pt>
     <dgm:pt modelId="{37D48D44-3384-4C3C-BA31-678284D71F07}">
-      <dgm:prSet phldrT="[텍스트]"/>
+      <dgm:prSet phldrT="[텍스트]" custT="1"/>
       <dgm:spPr/>
       <dgm:t>
         <a:bodyPr/>
@@ -1145,10 +1204,14 @@
         <a:p>
           <a:pPr latinLnBrk="1"/>
           <a:r>
-            <a:rPr lang="en-US" altLang="ko-KR" dirty="0"/>
+            <a:rPr lang="en-US" altLang="ko-KR" sz="2000" b="0" dirty="0">
+              <a:latin typeface="+mj-lt"/>
+            </a:rPr>
             <a:t>Backend Developer = AI Developer</a:t>
           </a:r>
-          <a:endParaRPr lang="ko-KR" altLang="en-US" dirty="0"/>
+          <a:endParaRPr lang="ko-KR" altLang="en-US" sz="2000" b="0" dirty="0">
+            <a:latin typeface="+mj-lt"/>
+          </a:endParaRPr>
         </a:p>
       </dgm:t>
     </dgm:pt>
@@ -1160,7 +1223,9 @@
         <a:lstStyle/>
         <a:p>
           <a:pPr latinLnBrk="1"/>
-          <a:endParaRPr lang="ko-KR" altLang="en-US"/>
+          <a:endParaRPr lang="ko-KR" altLang="en-US" sz="1600" b="0">
+            <a:latin typeface="+mj-lt"/>
+          </a:endParaRPr>
         </a:p>
       </dgm:t>
     </dgm:pt>
@@ -1172,12 +1237,14 @@
         <a:lstStyle/>
         <a:p>
           <a:pPr latinLnBrk="1"/>
-          <a:endParaRPr lang="ko-KR" altLang="en-US"/>
+          <a:endParaRPr lang="ko-KR" altLang="en-US" sz="1600" b="0">
+            <a:latin typeface="+mj-lt"/>
+          </a:endParaRPr>
         </a:p>
       </dgm:t>
     </dgm:pt>
     <dgm:pt modelId="{BA1D5C62-6199-448D-BC40-B1D403F60881}">
-      <dgm:prSet phldrT="[텍스트]"/>
+      <dgm:prSet phldrT="[텍스트]" custT="1"/>
       <dgm:spPr/>
       <dgm:t>
         <a:bodyPr/>
@@ -1185,10 +1252,14 @@
         <a:p>
           <a:pPr latinLnBrk="1"/>
           <a:r>
-            <a:rPr lang="en-US" altLang="ko-KR" dirty="0"/>
+            <a:rPr lang="en-US" altLang="ko-KR" sz="2000" b="0" dirty="0">
+              <a:latin typeface="+mj-lt"/>
+            </a:rPr>
             <a:t>Compiler</a:t>
           </a:r>
-          <a:endParaRPr lang="ko-KR" altLang="en-US" dirty="0"/>
+          <a:endParaRPr lang="ko-KR" altLang="en-US" sz="2000" b="0" dirty="0">
+            <a:latin typeface="+mj-lt"/>
+          </a:endParaRPr>
         </a:p>
       </dgm:t>
     </dgm:pt>
@@ -1200,7 +1271,9 @@
         <a:lstStyle/>
         <a:p>
           <a:pPr latinLnBrk="1"/>
-          <a:endParaRPr lang="ko-KR" altLang="en-US"/>
+          <a:endParaRPr lang="ko-KR" altLang="en-US" sz="1600" b="0">
+            <a:latin typeface="+mj-lt"/>
+          </a:endParaRPr>
         </a:p>
       </dgm:t>
     </dgm:pt>
@@ -1212,12 +1285,14 @@
         <a:lstStyle/>
         <a:p>
           <a:pPr latinLnBrk="1"/>
-          <a:endParaRPr lang="ko-KR" altLang="en-US"/>
+          <a:endParaRPr lang="ko-KR" altLang="en-US" sz="1600" b="0">
+            <a:latin typeface="+mj-lt"/>
+          </a:endParaRPr>
         </a:p>
       </dgm:t>
     </dgm:pt>
     <dgm:pt modelId="{10FEBC2E-7CCA-4463-9B88-26988B7105CC}">
-      <dgm:prSet phldrT="[텍스트]"/>
+      <dgm:prSet phldrT="[텍스트]" custT="1"/>
       <dgm:spPr/>
       <dgm:t>
         <a:bodyPr/>
@@ -1225,10 +1300,14 @@
         <a:p>
           <a:pPr latinLnBrk="1"/>
           <a:r>
-            <a:rPr lang="en-US" altLang="ko-KR" dirty="0"/>
+            <a:rPr lang="en-US" altLang="ko-KR" sz="2000" b="0" dirty="0">
+              <a:latin typeface="+mj-lt"/>
+            </a:rPr>
             <a:t>Validator</a:t>
           </a:r>
-          <a:endParaRPr lang="ko-KR" altLang="en-US" dirty="0"/>
+          <a:endParaRPr lang="ko-KR" altLang="en-US" sz="2000" b="0" dirty="0">
+            <a:latin typeface="+mj-lt"/>
+          </a:endParaRPr>
         </a:p>
       </dgm:t>
     </dgm:pt>
@@ -1240,7 +1319,9 @@
         <a:lstStyle/>
         <a:p>
           <a:pPr latinLnBrk="1"/>
-          <a:endParaRPr lang="ko-KR" altLang="en-US"/>
+          <a:endParaRPr lang="ko-KR" altLang="en-US" sz="1600" b="0">
+            <a:latin typeface="+mj-lt"/>
+          </a:endParaRPr>
         </a:p>
       </dgm:t>
     </dgm:pt>
@@ -1252,7 +1333,9 @@
         <a:lstStyle/>
         <a:p>
           <a:pPr latinLnBrk="1"/>
-          <a:endParaRPr lang="ko-KR" altLang="en-US"/>
+          <a:endParaRPr lang="ko-KR" altLang="en-US" sz="1600" b="0">
+            <a:latin typeface="+mj-lt"/>
+          </a:endParaRPr>
         </a:p>
       </dgm:t>
     </dgm:pt>
@@ -1319,7 +1402,7 @@
       <dgm:spPr/>
     </dgm:pt>
     <dgm:pt modelId="{B811F302-8CFA-483B-A2C3-DDE77AB0ED2C}" type="pres">
-      <dgm:prSet presAssocID="{9CADE41D-B346-43A2-9FBB-81CC17ABE009}" presName="gear3" presStyleLbl="node1" presStyleIdx="2" presStyleCnt="3"/>
+      <dgm:prSet presAssocID="{9CADE41D-B346-43A2-9FBB-81CC17ABE009}" presName="gear3" presStyleLbl="node1" presStyleIdx="2" presStyleCnt="3" custLinFactNeighborX="-13298" custLinFactNeighborY="-2216"/>
       <dgm:spPr/>
     </dgm:pt>
     <dgm:pt modelId="{69DE1B7E-2F75-4A8A-B8CB-4287818565E0}" type="pres">
@@ -1433,8 +1516,8 @@
       </dsp:nvSpPr>
       <dsp:spPr>
         <a:xfrm>
-          <a:off x="6949439" y="3291840"/>
-          <a:ext cx="4023360" cy="4023360"/>
+          <a:off x="3223260" y="3299459"/>
+          <a:ext cx="3939540" cy="3939540"/>
         </a:xfrm>
         <a:prstGeom prst="gear9">
           <a:avLst/>
@@ -1472,12 +1555,12 @@
         </a:fontRef>
       </dsp:style>
       <dsp:txBody>
-        <a:bodyPr spcFirstLastPara="0" vert="horz" wrap="square" lIns="34290" tIns="34290" rIns="34290" bIns="34290" numCol="1" spcCol="1270" anchor="ctr" anchorCtr="0">
+        <a:bodyPr spcFirstLastPara="0" vert="horz" wrap="square" lIns="30480" tIns="30480" rIns="30480" bIns="30480" numCol="1" spcCol="1270" anchor="ctr" anchorCtr="0">
           <a:noAutofit/>
         </a:bodyPr>
         <a:lstStyle/>
         <a:p>
-          <a:pPr marL="0" lvl="0" indent="0" algn="ctr" defTabSz="1200150" latinLnBrk="1">
+          <a:pPr marL="0" lvl="0" indent="0" algn="ctr" defTabSz="1066800" latinLnBrk="1">
             <a:lnSpc>
               <a:spcPct val="90000"/>
             </a:lnSpc>
@@ -1490,15 +1573,19 @@
             <a:buNone/>
           </a:pPr>
           <a:r>
-            <a:rPr lang="en-US" altLang="ko-KR" sz="2700" b="1" kern="1200" dirty="0"/>
+            <a:rPr lang="en-US" altLang="ko-KR" sz="2400" b="1" u="sng" kern="1200" dirty="0">
+              <a:latin typeface="+mj-lt"/>
+            </a:rPr>
             <a:t>TypeScript Class</a:t>
           </a:r>
-          <a:endParaRPr lang="ko-KR" altLang="en-US" sz="2700" b="1" kern="1200" dirty="0"/>
+          <a:endParaRPr lang="ko-KR" altLang="en-US" sz="2400" b="1" u="sng" kern="1200" dirty="0">
+            <a:latin typeface="+mj-lt"/>
+          </a:endParaRPr>
         </a:p>
       </dsp:txBody>
       <dsp:txXfrm>
-        <a:off x="7758313" y="4234293"/>
-        <a:ext cx="2405612" cy="2068090"/>
+        <a:off x="4015283" y="4222277"/>
+        <a:ext cx="2355494" cy="2025005"/>
       </dsp:txXfrm>
     </dsp:sp>
     <dsp:sp modelId="{78084B7A-C218-4C4A-A8C6-9D1C1C820ABF}">
@@ -1508,8 +1595,8 @@
       </dsp:nvSpPr>
       <dsp:spPr>
         <a:xfrm>
-          <a:off x="6437375" y="5779007"/>
-          <a:ext cx="2560320" cy="1536192"/>
+          <a:off x="2721864" y="5734812"/>
+          <a:ext cx="2506980" cy="1504188"/>
         </a:xfrm>
         <a:prstGeom prst="roundRect">
           <a:avLst>
@@ -1553,12 +1640,12 @@
         <a:fontRef idx="minor"/>
       </dsp:style>
       <dsp:txBody>
-        <a:bodyPr spcFirstLastPara="0" vert="horz" wrap="square" lIns="102870" tIns="102870" rIns="102870" bIns="102870" numCol="1" spcCol="1270" anchor="t" anchorCtr="0">
+        <a:bodyPr spcFirstLastPara="0" vert="horz" wrap="square" lIns="76200" tIns="76200" rIns="76200" bIns="76200" numCol="1" spcCol="1270" anchor="t" anchorCtr="0">
           <a:noAutofit/>
         </a:bodyPr>
         <a:lstStyle/>
         <a:p>
-          <a:pPr marL="228600" lvl="1" indent="-228600" algn="l" defTabSz="933450" latinLnBrk="1">
+          <a:pPr marL="228600" lvl="1" indent="-228600" algn="l" defTabSz="889000" latinLnBrk="1">
             <a:lnSpc>
               <a:spcPct val="90000"/>
             </a:lnSpc>
@@ -1571,13 +1658,17 @@
             <a:buChar char="•"/>
           </a:pPr>
           <a:r>
-            <a:rPr lang="en-US" altLang="ko-KR" sz="2100" kern="1200" dirty="0"/>
+            <a:rPr lang="en-US" altLang="ko-KR" sz="2000" b="0" kern="1200" dirty="0">
+              <a:latin typeface="+mj-lt"/>
+            </a:rPr>
             <a:t>Class Chatbot</a:t>
           </a:r>
-          <a:endParaRPr lang="ko-KR" altLang="en-US" sz="2100" kern="1200" dirty="0"/>
+          <a:endParaRPr lang="ko-KR" altLang="en-US" sz="2000" b="0" kern="1200" dirty="0">
+            <a:latin typeface="+mj-lt"/>
+          </a:endParaRPr>
         </a:p>
         <a:p>
-          <a:pPr marL="228600" lvl="1" indent="-228600" algn="l" defTabSz="933450" latinLnBrk="1">
+          <a:pPr marL="228600" lvl="1" indent="-228600" algn="l" defTabSz="889000" latinLnBrk="1">
             <a:lnSpc>
               <a:spcPct val="90000"/>
             </a:lnSpc>
@@ -1590,15 +1681,19 @@
             <a:buChar char="•"/>
           </a:pPr>
           <a:r>
-            <a:rPr lang="en-US" altLang="ko-KR" sz="2100" kern="1200" dirty="0"/>
+            <a:rPr lang="en-US" altLang="ko-KR" sz="2000" b="0" kern="1200" dirty="0">
+              <a:latin typeface="+mj-lt"/>
+            </a:rPr>
             <a:t>Multi Agent Orchestration</a:t>
           </a:r>
-          <a:endParaRPr lang="ko-KR" altLang="en-US" sz="2100" kern="1200" dirty="0"/>
+          <a:endParaRPr lang="ko-KR" altLang="en-US" sz="2000" b="0" kern="1200" dirty="0">
+            <a:latin typeface="+mj-lt"/>
+          </a:endParaRPr>
         </a:p>
       </dsp:txBody>
       <dsp:txXfrm>
-        <a:off x="6482369" y="5824001"/>
-        <a:ext cx="2470332" cy="1446204"/>
+        <a:off x="2765920" y="5778868"/>
+        <a:ext cx="2418868" cy="1416076"/>
       </dsp:txXfrm>
     </dsp:sp>
     <dsp:sp modelId="{0660A873-9E4D-4DDA-AF38-85B4EFF09DF3}">
@@ -1608,8 +1703,8 @@
       </dsp:nvSpPr>
       <dsp:spPr>
         <a:xfrm>
-          <a:off x="4608575" y="2340864"/>
-          <a:ext cx="2926080" cy="2926080"/>
+          <a:off x="931164" y="2368295"/>
+          <a:ext cx="2865120" cy="2865120"/>
         </a:xfrm>
         <a:prstGeom prst="gear6">
           <a:avLst/>
@@ -1647,12 +1742,12 @@
         </a:fontRef>
       </dsp:style>
       <dsp:txBody>
-        <a:bodyPr spcFirstLastPara="0" vert="horz" wrap="square" lIns="34290" tIns="34290" rIns="34290" bIns="34290" numCol="1" spcCol="1270" anchor="ctr" anchorCtr="0">
+        <a:bodyPr spcFirstLastPara="0" vert="horz" wrap="square" lIns="30480" tIns="30480" rIns="30480" bIns="30480" numCol="1" spcCol="1270" anchor="ctr" anchorCtr="0">
           <a:noAutofit/>
         </a:bodyPr>
         <a:lstStyle/>
         <a:p>
-          <a:pPr marL="0" lvl="0" indent="0" algn="ctr" defTabSz="1200150" latinLnBrk="1">
+          <a:pPr marL="0" lvl="0" indent="0" algn="ctr" defTabSz="1066800" latinLnBrk="1">
             <a:lnSpc>
               <a:spcPct val="90000"/>
             </a:lnSpc>
@@ -1665,15 +1760,19 @@
             <a:buNone/>
           </a:pPr>
           <a:r>
-            <a:rPr lang="en-US" altLang="ko-KR" sz="2700" b="1" kern="1200" dirty="0"/>
+            <a:rPr lang="en-US" altLang="ko-KR" sz="2400" b="1" u="sng" kern="1200" dirty="0">
+              <a:latin typeface="+mj-lt"/>
+            </a:rPr>
             <a:t>Swagger</a:t>
           </a:r>
-          <a:endParaRPr lang="ko-KR" altLang="en-US" sz="2700" b="1" kern="1200" dirty="0"/>
+          <a:endParaRPr lang="ko-KR" altLang="en-US" sz="2400" b="1" u="sng" kern="1200" dirty="0">
+            <a:latin typeface="+mj-lt"/>
+          </a:endParaRPr>
         </a:p>
       </dsp:txBody>
       <dsp:txXfrm>
-        <a:off x="5345224" y="3081966"/>
-        <a:ext cx="1452782" cy="1443876"/>
+        <a:off x="1652467" y="3093957"/>
+        <a:ext cx="1422514" cy="1413796"/>
       </dsp:txXfrm>
     </dsp:sp>
     <dsp:sp modelId="{5102CC00-C213-43E7-969D-8AAF8F8DCCE7}">
@@ -1683,8 +1782,8 @@
       </dsp:nvSpPr>
       <dsp:spPr>
         <a:xfrm>
-          <a:off x="3657599" y="4242816"/>
-          <a:ext cx="2560320" cy="1536192"/>
+          <a:off x="0" y="4230624"/>
+          <a:ext cx="2506980" cy="1504188"/>
         </a:xfrm>
         <a:prstGeom prst="roundRect">
           <a:avLst>
@@ -1728,12 +1827,12 @@
         <a:fontRef idx="minor"/>
       </dsp:style>
       <dsp:txBody>
-        <a:bodyPr spcFirstLastPara="0" vert="horz" wrap="square" lIns="102870" tIns="102870" rIns="102870" bIns="102870" numCol="1" spcCol="1270" anchor="t" anchorCtr="0">
+        <a:bodyPr spcFirstLastPara="0" vert="horz" wrap="square" lIns="76200" tIns="76200" rIns="76200" bIns="76200" numCol="1" spcCol="1270" anchor="t" anchorCtr="0">
           <a:noAutofit/>
         </a:bodyPr>
         <a:lstStyle/>
         <a:p>
-          <a:pPr marL="228600" lvl="1" indent="-228600" algn="l" defTabSz="933450" latinLnBrk="1">
+          <a:pPr marL="228600" lvl="1" indent="-228600" algn="l" defTabSz="889000" latinLnBrk="1">
             <a:lnSpc>
               <a:spcPct val="90000"/>
             </a:lnSpc>
@@ -1746,13 +1845,17 @@
             <a:buChar char="•"/>
           </a:pPr>
           <a:r>
-            <a:rPr lang="en-US" altLang="ko-KR" sz="2100" kern="1200" dirty="0"/>
+            <a:rPr lang="en-US" altLang="ko-KR" sz="2000" b="0" kern="1200" dirty="0">
+              <a:latin typeface="+mj-lt"/>
+            </a:rPr>
             <a:t>Super AI Chatbot</a:t>
           </a:r>
-          <a:endParaRPr lang="ko-KR" altLang="en-US" sz="2100" kern="1200" dirty="0"/>
+          <a:endParaRPr lang="ko-KR" altLang="en-US" sz="2000" b="0" kern="1200" dirty="0">
+            <a:latin typeface="+mj-lt"/>
+          </a:endParaRPr>
         </a:p>
         <a:p>
-          <a:pPr marL="228600" lvl="1" indent="-228600" algn="l" defTabSz="933450" latinLnBrk="1">
+          <a:pPr marL="228600" lvl="1" indent="-228600" algn="l" defTabSz="889000" latinLnBrk="1">
             <a:lnSpc>
               <a:spcPct val="90000"/>
             </a:lnSpc>
@@ -1765,15 +1868,19 @@
             <a:buChar char="•"/>
           </a:pPr>
           <a:r>
-            <a:rPr lang="en-US" altLang="ko-KR" sz="2100" kern="1200" dirty="0"/>
+            <a:rPr lang="en-US" altLang="ko-KR" sz="2000" b="0" kern="1200" dirty="0">
+              <a:latin typeface="+mj-lt"/>
+            </a:rPr>
             <a:t>Backend Developer = AI Developer</a:t>
           </a:r>
-          <a:endParaRPr lang="ko-KR" altLang="en-US" sz="2100" kern="1200" dirty="0"/>
+          <a:endParaRPr lang="ko-KR" altLang="en-US" sz="2000" b="0" kern="1200" dirty="0">
+            <a:latin typeface="+mj-lt"/>
+          </a:endParaRPr>
         </a:p>
       </dsp:txBody>
       <dsp:txXfrm>
-        <a:off x="3702593" y="4287810"/>
-        <a:ext cx="2470332" cy="1446204"/>
+        <a:off x="44056" y="4274680"/>
+        <a:ext cx="2418868" cy="1416076"/>
       </dsp:txXfrm>
     </dsp:sp>
     <dsp:sp modelId="{B811F302-8CFA-483B-A2C3-DDE77AB0ED2C}">
@@ -1783,8 +1890,8 @@
       </dsp:nvSpPr>
       <dsp:spPr>
         <a:xfrm rot="20700000">
-          <a:off x="6247479" y="322167"/>
-          <a:ext cx="2866961" cy="2866961"/>
+          <a:off x="2078719" y="315465"/>
+          <a:ext cx="2807233" cy="2807233"/>
         </a:xfrm>
         <a:prstGeom prst="gear6">
           <a:avLst/>
@@ -1822,12 +1929,12 @@
         </a:fontRef>
       </dsp:style>
       <dsp:txBody>
-        <a:bodyPr spcFirstLastPara="0" vert="horz" wrap="square" lIns="34290" tIns="34290" rIns="34290" bIns="34290" numCol="1" spcCol="1270" anchor="ctr" anchorCtr="0">
+        <a:bodyPr spcFirstLastPara="0" vert="horz" wrap="square" lIns="30480" tIns="30480" rIns="30480" bIns="30480" numCol="1" spcCol="1270" anchor="ctr" anchorCtr="0">
           <a:noAutofit/>
         </a:bodyPr>
         <a:lstStyle/>
         <a:p>
-          <a:pPr marL="0" lvl="0" indent="0" algn="ctr" defTabSz="1200150" latinLnBrk="1">
+          <a:pPr marL="0" lvl="0" indent="0" algn="ctr" defTabSz="1066800" latinLnBrk="1">
             <a:lnSpc>
               <a:spcPct val="90000"/>
             </a:lnSpc>
@@ -1840,15 +1947,25 @@
             <a:buNone/>
           </a:pPr>
           <a:r>
-            <a:rPr lang="en-US" altLang="ko-KR" sz="2700" b="1" kern="1200" dirty="0"/>
-            <a:t>Function Calling</a:t>
+            <a:rPr lang="en-US" altLang="ko-KR" sz="2400" b="1" u="sng" kern="1200" dirty="0">
+              <a:latin typeface="+mj-lt"/>
+            </a:rPr>
+            <a:t>Function </a:t>
           </a:r>
-          <a:endParaRPr lang="ko-KR" altLang="en-US" sz="2700" b="1" kern="1200" dirty="0"/>
+          <a:r>
+            <a:rPr lang="en-US" altLang="ko-KR" sz="2400" b="1" u="sng" kern="1200" dirty="0" err="1">
+              <a:latin typeface="+mj-lt"/>
+            </a:rPr>
+            <a:t>CallingZ</a:t>
+          </a:r>
+          <a:endParaRPr lang="ko-KR" altLang="en-US" sz="2400" b="1" u="sng" kern="1200" dirty="0">
+            <a:latin typeface="+mj-lt"/>
+          </a:endParaRPr>
         </a:p>
       </dsp:txBody>
       <dsp:txXfrm rot="-20700000">
-        <a:off x="6876288" y="950976"/>
-        <a:ext cx="1609344" cy="1609344"/>
+        <a:off x="2694427" y="931174"/>
+        <a:ext cx="1575816" cy="1575816"/>
       </dsp:txXfrm>
     </dsp:sp>
     <dsp:sp modelId="{ED6B4636-920E-4639-985E-A0466E34FC92}">
@@ -1858,8 +1975,8 @@
       </dsp:nvSpPr>
       <dsp:spPr>
         <a:xfrm>
-          <a:off x="8412480" y="950976"/>
-          <a:ext cx="2560320" cy="1536192"/>
+          <a:off x="4655820" y="1007363"/>
+          <a:ext cx="2506980" cy="1504188"/>
         </a:xfrm>
         <a:prstGeom prst="roundRect">
           <a:avLst>
@@ -1903,12 +2020,12 @@
         <a:fontRef idx="minor"/>
       </dsp:style>
       <dsp:txBody>
-        <a:bodyPr spcFirstLastPara="0" vert="horz" wrap="square" lIns="102870" tIns="102870" rIns="102870" bIns="102870" numCol="1" spcCol="1270" anchor="t" anchorCtr="0">
+        <a:bodyPr spcFirstLastPara="0" vert="horz" wrap="square" lIns="76200" tIns="76200" rIns="76200" bIns="76200" numCol="1" spcCol="1270" anchor="t" anchorCtr="0">
           <a:noAutofit/>
         </a:bodyPr>
         <a:lstStyle/>
         <a:p>
-          <a:pPr marL="228600" lvl="1" indent="-228600" algn="l" defTabSz="933450" latinLnBrk="1">
+          <a:pPr marL="228600" lvl="1" indent="-228600" algn="l" defTabSz="889000" latinLnBrk="1">
             <a:lnSpc>
               <a:spcPct val="90000"/>
             </a:lnSpc>
@@ -1921,13 +2038,17 @@
             <a:buChar char="•"/>
           </a:pPr>
           <a:r>
-            <a:rPr lang="en-US" altLang="ko-KR" sz="2100" kern="1200" dirty="0"/>
+            <a:rPr lang="en-US" altLang="ko-KR" sz="2000" b="0" kern="1200" dirty="0">
+              <a:latin typeface="+mj-lt"/>
+            </a:rPr>
             <a:t>Compiler</a:t>
           </a:r>
-          <a:endParaRPr lang="ko-KR" altLang="en-US" sz="2100" kern="1200" dirty="0"/>
+          <a:endParaRPr lang="ko-KR" altLang="en-US" sz="2000" b="0" kern="1200" dirty="0">
+            <a:latin typeface="+mj-lt"/>
+          </a:endParaRPr>
         </a:p>
         <a:p>
-          <a:pPr marL="228600" lvl="1" indent="-228600" algn="l" defTabSz="933450" latinLnBrk="1">
+          <a:pPr marL="228600" lvl="1" indent="-228600" algn="l" defTabSz="889000" latinLnBrk="1">
             <a:lnSpc>
               <a:spcPct val="90000"/>
             </a:lnSpc>
@@ -1940,15 +2061,19 @@
             <a:buChar char="•"/>
           </a:pPr>
           <a:r>
-            <a:rPr lang="en-US" altLang="ko-KR" sz="2100" kern="1200" dirty="0"/>
+            <a:rPr lang="en-US" altLang="ko-KR" sz="2000" b="0" kern="1200" dirty="0">
+              <a:latin typeface="+mj-lt"/>
+            </a:rPr>
             <a:t>Validator</a:t>
           </a:r>
-          <a:endParaRPr lang="ko-KR" altLang="en-US" sz="2100" kern="1200" dirty="0"/>
+          <a:endParaRPr lang="ko-KR" altLang="en-US" sz="2000" b="0" kern="1200" dirty="0">
+            <a:latin typeface="+mj-lt"/>
+          </a:endParaRPr>
         </a:p>
       </dsp:txBody>
       <dsp:txXfrm>
-        <a:off x="8457474" y="995970"/>
-        <a:ext cx="2470332" cy="1446204"/>
+        <a:off x="4699876" y="1051419"/>
+        <a:ext cx="2418868" cy="1416076"/>
       </dsp:txXfrm>
     </dsp:sp>
     <dsp:sp modelId="{DA059C0F-2DD7-4B86-9653-1FC597247497}">
@@ -1958,15 +2083,15 @@
       </dsp:nvSpPr>
       <dsp:spPr>
         <a:xfrm>
-          <a:off x="6675575" y="2664315"/>
-          <a:ext cx="5149900" cy="5149900"/>
+          <a:off x="2954068" y="2685608"/>
+          <a:ext cx="5042611" cy="5042611"/>
         </a:xfrm>
         <a:prstGeom prst="circularArrow">
           <a:avLst>
-            <a:gd name="adj1" fmla="val 4687"/>
+            <a:gd name="adj1" fmla="val 4688"/>
             <a:gd name="adj2" fmla="val 299029"/>
-            <a:gd name="adj3" fmla="val 2560958"/>
-            <a:gd name="adj4" fmla="val 15767953"/>
+            <a:gd name="adj3" fmla="val 2559607"/>
+            <a:gd name="adj4" fmla="val 15770680"/>
             <a:gd name="adj5" fmla="val 5469"/>
           </a:avLst>
         </a:prstGeom>
@@ -2010,8 +2135,8 @@
       </dsp:nvSpPr>
       <dsp:spPr>
         <a:xfrm>
-          <a:off x="4090372" y="1680039"/>
-          <a:ext cx="3741724" cy="3741724"/>
+          <a:off x="423756" y="1721613"/>
+          <a:ext cx="3663772" cy="3663772"/>
         </a:xfrm>
         <a:prstGeom prst="leftCircularArrow">
           <a:avLst>
@@ -2062,8 +2187,8 @@
       </dsp:nvSpPr>
       <dsp:spPr>
         <a:xfrm>
-          <a:off x="5584321" y="-319198"/>
-          <a:ext cx="4034332" cy="4034332"/>
+          <a:off x="1886581" y="-235973"/>
+          <a:ext cx="3950284" cy="3950284"/>
         </a:xfrm>
         <a:prstGeom prst="circularArrow">
           <a:avLst>
@@ -6596,14 +6721,14 @@
           <p:nvPr>
             <p:extLst>
               <p:ext uri="{D42A27DB-BD31-4B8C-83A1-F6EECF244321}">
-                <p14:modId xmlns:p14="http://schemas.microsoft.com/office/powerpoint/2010/main" val="3937862890"/>
+                <p14:modId xmlns:p14="http://schemas.microsoft.com/office/powerpoint/2010/main" val="666635168"/>
               </p:ext>
             </p:extLst>
           </p:nvPr>
         </p:nvGraphicFramePr>
         <p:xfrm>
-          <a:off x="0" y="0"/>
-          <a:ext cx="14630400" cy="7315200"/>
+          <a:off x="3733799" y="0"/>
+          <a:ext cx="7162801" cy="7315200"/>
         </p:xfrm>
         <a:graphic>
           <a:graphicData uri="http://schemas.openxmlformats.org/drawingml/2006/diagram">

</xml_diff>

<commit_message>
New optimization chapter and pseudo code in validation feedback section.
</commit_message>
<xml_diff>
--- a/assets/logo.pptx
+++ b/assets/logo.pptx
@@ -5,7 +5,7 @@
     <p:sldMasterId id="2147483660" r:id="rId1"/>
   </p:sldMasterIdLst>
   <p:sldIdLst>
-    <p:sldId id="257" r:id="rId2"/>
+    <p:sldId id="258" r:id="rId2"/>
   </p:sldIdLst>
   <p:sldSz cx="14630400" cy="7315200"/>
   <p:notesSz cx="6858000" cy="9144000"/>
@@ -897,11 +897,11 @@
 <file path=ppt/diagrams/data1.xml><?xml version="1.0" encoding="utf-8"?>
 <dgm:dataModel xmlns:dgm="http://schemas.openxmlformats.org/drawingml/2006/diagram" xmlns:a="http://schemas.openxmlformats.org/drawingml/2006/main">
   <dgm:ptLst>
-    <dgm:pt modelId="{B2A346DF-EF57-4188-8874-A4E13C0037F8}" type="doc">
-      <dgm:prSet loTypeId="urn:microsoft.com/office/officeart/2005/8/layout/gear1" loCatId="process" qsTypeId="urn:microsoft.com/office/officeart/2005/8/quickstyle/3d5" qsCatId="3D" csTypeId="urn:microsoft.com/office/officeart/2005/8/colors/colorful3" csCatId="colorful" phldr="1"/>
+    <dgm:pt modelId="{987BD4C4-22A5-443F-B954-6A13CDF793B2}" type="doc">
+      <dgm:prSet loTypeId="urn:microsoft.com/office/officeart/2005/8/layout/gear1" loCatId="process" qsTypeId="urn:microsoft.com/office/officeart/2005/8/quickstyle/simple5" qsCatId="simple" csTypeId="urn:microsoft.com/office/officeart/2005/8/colors/colorful3" csCatId="colorful" phldr="1"/>
       <dgm:spPr/>
     </dgm:pt>
-    <dgm:pt modelId="{C60726BF-58CA-4EAD-AE21-2AEE5B89EC12}">
+    <dgm:pt modelId="{D181B5ED-DA18-4FE0-A6C2-257A606BE61B}">
       <dgm:prSet phldrT="[텍스트]" custT="1"/>
       <dgm:spPr/>
       <dgm:t>
@@ -910,18 +910,14 @@
         <a:p>
           <a:pPr latinLnBrk="1"/>
           <a:r>
-            <a:rPr lang="en-US" altLang="ko-KR" sz="2400" b="1" u="sng" dirty="0">
-              <a:latin typeface="+mj-lt"/>
-            </a:rPr>
+            <a:rPr lang="en-US" altLang="ko-KR" sz="2800" b="1" u="sng" dirty="0"/>
             <a:t>TypeScript Class</a:t>
           </a:r>
-          <a:endParaRPr lang="ko-KR" altLang="en-US" sz="2400" b="1" u="sng" dirty="0">
-            <a:latin typeface="+mj-lt"/>
-          </a:endParaRPr>
+          <a:endParaRPr lang="ko-KR" altLang="en-US" sz="2800" b="1" u="sng" dirty="0"/>
         </a:p>
       </dgm:t>
     </dgm:pt>
-    <dgm:pt modelId="{678CC9CD-B846-45E1-87A2-20CBAE631A58}" type="parTrans" cxnId="{D11DB63F-B76E-4939-A366-5791BE062869}">
+    <dgm:pt modelId="{0E4E4113-0D7D-48AA-91EB-ADBF0D1B61F1}" type="parTrans" cxnId="{6574F3B0-F6C9-4D75-8789-956E8D1A4A01}">
       <dgm:prSet/>
       <dgm:spPr/>
       <dgm:t>
@@ -929,13 +925,11 @@
         <a:lstStyle/>
         <a:p>
           <a:pPr latinLnBrk="1"/>
-          <a:endParaRPr lang="ko-KR" altLang="en-US" sz="1600" b="0">
-            <a:latin typeface="+mj-lt"/>
-          </a:endParaRPr>
+          <a:endParaRPr lang="ko-KR" altLang="en-US" sz="1800"/>
         </a:p>
       </dgm:t>
     </dgm:pt>
-    <dgm:pt modelId="{012115A8-C794-4EBE-BD4E-49BDCD6F133D}" type="sibTrans" cxnId="{D11DB63F-B76E-4939-A366-5791BE062869}">
+    <dgm:pt modelId="{81E866CD-28A9-44F9-9707-D2DC1BECC927}" type="sibTrans" cxnId="{6574F3B0-F6C9-4D75-8789-956E8D1A4A01}">
       <dgm:prSet/>
       <dgm:spPr/>
       <dgm:t>
@@ -943,13 +937,11 @@
         <a:lstStyle/>
         <a:p>
           <a:pPr latinLnBrk="1"/>
-          <a:endParaRPr lang="ko-KR" altLang="en-US" sz="1600" b="0">
-            <a:latin typeface="+mj-lt"/>
-          </a:endParaRPr>
+          <a:endParaRPr lang="ko-KR" altLang="en-US" sz="1800"/>
         </a:p>
       </dgm:t>
     </dgm:pt>
-    <dgm:pt modelId="{C094B65D-16B3-4DAF-B569-33E315BA3ADA}">
+    <dgm:pt modelId="{CB683ED3-AA54-43B8-AEF8-4A7EA1E4E169}">
       <dgm:prSet phldrT="[텍스트]" custT="1"/>
       <dgm:spPr/>
       <dgm:t>
@@ -958,18 +950,14 @@
         <a:p>
           <a:pPr latinLnBrk="1"/>
           <a:r>
-            <a:rPr lang="en-US" altLang="ko-KR" sz="2400" b="1" u="sng" dirty="0">
-              <a:latin typeface="+mj-lt"/>
-            </a:rPr>
+            <a:rPr lang="en-US" altLang="ko-KR" sz="2800" b="1" u="sng" dirty="0"/>
             <a:t>Swagger</a:t>
           </a:r>
-          <a:endParaRPr lang="ko-KR" altLang="en-US" sz="2400" b="1" u="sng" dirty="0">
-            <a:latin typeface="+mj-lt"/>
-          </a:endParaRPr>
+          <a:endParaRPr lang="ko-KR" altLang="en-US" sz="2800" b="1" u="sng" dirty="0"/>
         </a:p>
       </dgm:t>
     </dgm:pt>
-    <dgm:pt modelId="{333A5487-F6F4-41AC-BE74-60567B4C4698}" type="parTrans" cxnId="{AABF0D56-7B66-4800-AC8A-F45C03AD06B6}">
+    <dgm:pt modelId="{5BD7F532-5354-45B2-B75D-AE10C0318DB2}" type="parTrans" cxnId="{CF05AF3F-B7DA-45CF-8CAD-F398D91089FA}">
       <dgm:prSet/>
       <dgm:spPr/>
       <dgm:t>
@@ -977,13 +965,11 @@
         <a:lstStyle/>
         <a:p>
           <a:pPr latinLnBrk="1"/>
-          <a:endParaRPr lang="ko-KR" altLang="en-US" sz="1600" b="0">
-            <a:latin typeface="+mj-lt"/>
-          </a:endParaRPr>
+          <a:endParaRPr lang="ko-KR" altLang="en-US" sz="1800"/>
         </a:p>
       </dgm:t>
     </dgm:pt>
-    <dgm:pt modelId="{3968C133-40CA-44AB-B0B5-DBEC14CDE810}" type="sibTrans" cxnId="{AABF0D56-7B66-4800-AC8A-F45C03AD06B6}">
+    <dgm:pt modelId="{2E8B6977-976E-482A-AB52-0377E8D9FFB5}" type="sibTrans" cxnId="{CF05AF3F-B7DA-45CF-8CAD-F398D91089FA}">
       <dgm:prSet/>
       <dgm:spPr/>
       <dgm:t>
@@ -991,13 +977,11 @@
         <a:lstStyle/>
         <a:p>
           <a:pPr latinLnBrk="1"/>
-          <a:endParaRPr lang="ko-KR" altLang="en-US" sz="1600" b="0">
-            <a:latin typeface="+mj-lt"/>
-          </a:endParaRPr>
+          <a:endParaRPr lang="ko-KR" altLang="en-US" sz="1800"/>
         </a:p>
       </dgm:t>
     </dgm:pt>
-    <dgm:pt modelId="{9CADE41D-B346-43A2-9FBB-81CC17ABE009}">
+    <dgm:pt modelId="{A329BDF0-7B5D-4AF2-976F-D255AA1FBC67}">
       <dgm:prSet phldrT="[텍스트]" custT="1"/>
       <dgm:spPr/>
       <dgm:t>
@@ -1006,24 +990,14 @@
         <a:p>
           <a:pPr latinLnBrk="1"/>
           <a:r>
-            <a:rPr lang="en-US" altLang="ko-KR" sz="2400" b="1" u="sng" dirty="0">
-              <a:latin typeface="+mj-lt"/>
-            </a:rPr>
-            <a:t>Function </a:t>
+            <a:rPr lang="en-US" altLang="ko-KR" sz="2800" b="1" u="sng" dirty="0"/>
+            <a:t>Function Calling</a:t>
           </a:r>
-          <a:r>
-            <a:rPr lang="en-US" altLang="ko-KR" sz="2400" b="1" u="sng" dirty="0" err="1">
-              <a:latin typeface="+mj-lt"/>
-            </a:rPr>
-            <a:t>CallingZ</a:t>
-          </a:r>
-          <a:endParaRPr lang="ko-KR" altLang="en-US" sz="2400" b="1" u="sng" dirty="0">
-            <a:latin typeface="+mj-lt"/>
-          </a:endParaRPr>
+          <a:endParaRPr lang="ko-KR" altLang="en-US" sz="2800" b="1" u="sng" dirty="0"/>
         </a:p>
       </dgm:t>
     </dgm:pt>
-    <dgm:pt modelId="{BD1A5F11-8876-4730-BC82-048724EDD931}" type="parTrans" cxnId="{9ECA8B9B-4151-4079-BED9-27B66E701E7B}">
+    <dgm:pt modelId="{3DDD165F-A26F-4AF9-908E-C8FBCFFAF7C0}" type="parTrans" cxnId="{2673A0C5-3E10-4A96-BCB1-671302F38BC0}">
       <dgm:prSet/>
       <dgm:spPr/>
       <dgm:t>
@@ -1031,13 +1005,11 @@
         <a:lstStyle/>
         <a:p>
           <a:pPr latinLnBrk="1"/>
-          <a:endParaRPr lang="ko-KR" altLang="en-US" sz="1600" b="0">
-            <a:latin typeface="+mj-lt"/>
-          </a:endParaRPr>
+          <a:endParaRPr lang="ko-KR" altLang="en-US" sz="1800"/>
         </a:p>
       </dgm:t>
     </dgm:pt>
-    <dgm:pt modelId="{925FF1BE-70A2-4EDE-A8A5-6CCC25CA0302}" type="sibTrans" cxnId="{9ECA8B9B-4151-4079-BED9-27B66E701E7B}">
+    <dgm:pt modelId="{88B7F584-B907-48D8-8D8A-344F6B6628D2}" type="sibTrans" cxnId="{2673A0C5-3E10-4A96-BCB1-671302F38BC0}">
       <dgm:prSet/>
       <dgm:spPr/>
       <dgm:t>
@@ -1045,13 +1017,11 @@
         <a:lstStyle/>
         <a:p>
           <a:pPr latinLnBrk="1"/>
-          <a:endParaRPr lang="ko-KR" altLang="en-US" sz="1600" b="0">
-            <a:latin typeface="+mj-lt"/>
-          </a:endParaRPr>
+          <a:endParaRPr lang="ko-KR" altLang="en-US" sz="1800"/>
         </a:p>
       </dgm:t>
     </dgm:pt>
-    <dgm:pt modelId="{C6A21C00-C7DD-4CEE-9D58-7316613985FB}">
+    <dgm:pt modelId="{519384AE-C19D-44FD-B369-9D1A0BD97F05}">
       <dgm:prSet phldrT="[텍스트]" custT="1"/>
       <dgm:spPr/>
       <dgm:t>
@@ -1060,18 +1030,14 @@
         <a:p>
           <a:pPr latinLnBrk="1"/>
           <a:r>
-            <a:rPr lang="en-US" altLang="ko-KR" sz="2000" b="0" dirty="0">
-              <a:latin typeface="+mj-lt"/>
-            </a:rPr>
-            <a:t>Class Chatbot</a:t>
+            <a:rPr lang="en-US" altLang="ko-KR" sz="1800" dirty="0"/>
+            <a:t>Compiler Skills</a:t>
           </a:r>
-          <a:endParaRPr lang="ko-KR" altLang="en-US" sz="2000" b="0" dirty="0">
-            <a:latin typeface="+mj-lt"/>
-          </a:endParaRPr>
+          <a:endParaRPr lang="ko-KR" altLang="en-US" sz="1800" dirty="0"/>
         </a:p>
       </dgm:t>
     </dgm:pt>
-    <dgm:pt modelId="{F63F44CB-AEEC-4FB6-BD56-A0996E666983}" type="parTrans" cxnId="{90E932BA-2F50-4B9E-B9F3-7269108FE4D6}">
+    <dgm:pt modelId="{B1D6344A-7357-426A-B4B9-9C5B3236FC9A}" type="parTrans" cxnId="{0093D0D2-620B-473F-81B3-2961609920AE}">
       <dgm:prSet/>
       <dgm:spPr/>
       <dgm:t>
@@ -1079,13 +1045,11 @@
         <a:lstStyle/>
         <a:p>
           <a:pPr latinLnBrk="1"/>
-          <a:endParaRPr lang="ko-KR" altLang="en-US" sz="1600" b="0">
-            <a:latin typeface="+mj-lt"/>
-          </a:endParaRPr>
+          <a:endParaRPr lang="ko-KR" altLang="en-US" sz="1800"/>
         </a:p>
       </dgm:t>
     </dgm:pt>
-    <dgm:pt modelId="{FF48E1B3-9815-4263-8655-51C2BD1D8905}" type="sibTrans" cxnId="{90E932BA-2F50-4B9E-B9F3-7269108FE4D6}">
+    <dgm:pt modelId="{A90B41A2-FFF8-4D2F-8EDC-E5F30182E909}" type="sibTrans" cxnId="{0093D0D2-620B-473F-81B3-2961609920AE}">
       <dgm:prSet/>
       <dgm:spPr/>
       <dgm:t>
@@ -1093,13 +1057,11 @@
         <a:lstStyle/>
         <a:p>
           <a:pPr latinLnBrk="1"/>
-          <a:endParaRPr lang="ko-KR" altLang="en-US" sz="1600" b="0">
-            <a:latin typeface="+mj-lt"/>
-          </a:endParaRPr>
+          <a:endParaRPr lang="ko-KR" altLang="en-US" sz="1800"/>
         </a:p>
       </dgm:t>
     </dgm:pt>
-    <dgm:pt modelId="{CCB5BA7B-7C6B-4B56-B1C8-7649E313F9E7}">
+    <dgm:pt modelId="{AAA86462-AE16-4FEA-8AF3-BA9A2C504D07}">
       <dgm:prSet phldrT="[텍스트]" custT="1"/>
       <dgm:spPr/>
       <dgm:t>
@@ -1108,18 +1070,14 @@
         <a:p>
           <a:pPr latinLnBrk="1"/>
           <a:r>
-            <a:rPr lang="en-US" altLang="ko-KR" sz="2000" b="0" dirty="0">
-              <a:latin typeface="+mj-lt"/>
-            </a:rPr>
-            <a:t>Multi Agent Orchestration</a:t>
+            <a:rPr lang="en-US" altLang="ko-KR" sz="1800" dirty="0"/>
+            <a:t>Validation Feedback</a:t>
           </a:r>
-          <a:endParaRPr lang="ko-KR" altLang="en-US" sz="2000" b="0" dirty="0">
-            <a:latin typeface="+mj-lt"/>
-          </a:endParaRPr>
+          <a:endParaRPr lang="ko-KR" altLang="en-US" sz="1800" dirty="0"/>
         </a:p>
       </dgm:t>
     </dgm:pt>
-    <dgm:pt modelId="{8A7DCF4C-58D4-4CE0-826F-D23217B99568}" type="parTrans" cxnId="{BF26037C-0EBF-4073-9B7C-4A52F4D50916}">
+    <dgm:pt modelId="{8345894B-8A49-49FC-8219-D1C8C3109C95}" type="parTrans" cxnId="{0573E324-4074-43EA-9A28-E408C1950690}">
       <dgm:prSet/>
       <dgm:spPr/>
       <dgm:t>
@@ -1127,13 +1085,11 @@
         <a:lstStyle/>
         <a:p>
           <a:pPr latinLnBrk="1"/>
-          <a:endParaRPr lang="ko-KR" altLang="en-US" sz="1600" b="0">
-            <a:latin typeface="+mj-lt"/>
-          </a:endParaRPr>
+          <a:endParaRPr lang="ko-KR" altLang="en-US" sz="1800"/>
         </a:p>
       </dgm:t>
     </dgm:pt>
-    <dgm:pt modelId="{96561900-9BC9-4813-A2A6-0DC188BB219B}" type="sibTrans" cxnId="{BF26037C-0EBF-4073-9B7C-4A52F4D50916}">
+    <dgm:pt modelId="{75944135-7DAA-4D53-8EEF-1E48294379EE}" type="sibTrans" cxnId="{0573E324-4074-43EA-9A28-E408C1950690}">
       <dgm:prSet/>
       <dgm:spPr/>
       <dgm:t>
@@ -1141,13 +1097,11 @@
         <a:lstStyle/>
         <a:p>
           <a:pPr latinLnBrk="1"/>
-          <a:endParaRPr lang="ko-KR" altLang="en-US" sz="1600" b="0">
-            <a:latin typeface="+mj-lt"/>
-          </a:endParaRPr>
+          <a:endParaRPr lang="ko-KR" altLang="en-US" sz="1800"/>
         </a:p>
       </dgm:t>
     </dgm:pt>
-    <dgm:pt modelId="{77763675-AA58-491C-BC5F-7722A5A105BF}">
+    <dgm:pt modelId="{A9DC3AD1-D5D8-4464-B8F6-F8C7539BC9C4}">
       <dgm:prSet phldrT="[텍스트]" custT="1"/>
       <dgm:spPr/>
       <dgm:t>
@@ -1156,18 +1110,14 @@
         <a:p>
           <a:pPr latinLnBrk="1"/>
           <a:r>
-            <a:rPr lang="en-US" altLang="ko-KR" sz="2000" b="0" dirty="0">
-              <a:latin typeface="+mj-lt"/>
-            </a:rPr>
-            <a:t>Super AI Chatbot</a:t>
+            <a:rPr lang="en-US" altLang="ko-KR" sz="1800" dirty="0"/>
+            <a:t>Swagger Chatbot</a:t>
           </a:r>
-          <a:endParaRPr lang="ko-KR" altLang="en-US" sz="2000" b="0" dirty="0">
-            <a:latin typeface="+mj-lt"/>
-          </a:endParaRPr>
+          <a:endParaRPr lang="ko-KR" altLang="en-US" sz="1800" dirty="0"/>
         </a:p>
       </dgm:t>
     </dgm:pt>
-    <dgm:pt modelId="{55303219-23B0-48CE-85CC-5115EFD825B3}" type="parTrans" cxnId="{7DD4E380-DC64-4BDB-96FA-EB8DDD66F0C0}">
+    <dgm:pt modelId="{B58C0A7D-C5F4-4F02-B8CC-195277A51BC3}" type="parTrans" cxnId="{B9D41B65-8E01-40F8-AC6D-ED678644439D}">
       <dgm:prSet/>
       <dgm:spPr/>
       <dgm:t>
@@ -1175,13 +1125,11 @@
         <a:lstStyle/>
         <a:p>
           <a:pPr latinLnBrk="1"/>
-          <a:endParaRPr lang="ko-KR" altLang="en-US" sz="1600" b="0">
-            <a:latin typeface="+mj-lt"/>
-          </a:endParaRPr>
+          <a:endParaRPr lang="ko-KR" altLang="en-US" sz="1800"/>
         </a:p>
       </dgm:t>
     </dgm:pt>
-    <dgm:pt modelId="{18F524AF-E3F2-446D-B261-F47230C35E17}" type="sibTrans" cxnId="{7DD4E380-DC64-4BDB-96FA-EB8DDD66F0C0}">
+    <dgm:pt modelId="{3AD5D78C-3E62-4F33-811C-F7C682F69C1A}" type="sibTrans" cxnId="{B9D41B65-8E01-40F8-AC6D-ED678644439D}">
       <dgm:prSet/>
       <dgm:spPr/>
       <dgm:t>
@@ -1189,13 +1137,11 @@
         <a:lstStyle/>
         <a:p>
           <a:pPr latinLnBrk="1"/>
-          <a:endParaRPr lang="ko-KR" altLang="en-US" sz="1600" b="0">
-            <a:latin typeface="+mj-lt"/>
-          </a:endParaRPr>
+          <a:endParaRPr lang="ko-KR" altLang="en-US" sz="1800"/>
         </a:p>
       </dgm:t>
     </dgm:pt>
-    <dgm:pt modelId="{37D48D44-3384-4C3C-BA31-678284D71F07}">
+    <dgm:pt modelId="{72310635-50C2-4AC8-8106-7A7B7C0F2835}">
       <dgm:prSet phldrT="[텍스트]" custT="1"/>
       <dgm:spPr/>
       <dgm:t>
@@ -1204,18 +1150,21 @@
         <a:p>
           <a:pPr latinLnBrk="1"/>
           <a:r>
-            <a:rPr lang="en-US" altLang="ko-KR" sz="2000" b="0" dirty="0">
-              <a:latin typeface="+mj-lt"/>
-            </a:rPr>
-            <a:t>Backend Developer = AI Developer</a:t>
+            <a:rPr lang="en-US" altLang="ko-KR" sz="1800" dirty="0"/>
+            <a:t>Backend Developer</a:t>
           </a:r>
-          <a:endParaRPr lang="ko-KR" altLang="en-US" sz="2000" b="0" dirty="0">
-            <a:latin typeface="+mj-lt"/>
-          </a:endParaRPr>
+          <a:br>
+            <a:rPr lang="en-US" altLang="ko-KR" sz="1800" dirty="0"/>
+          </a:br>
+          <a:r>
+            <a:rPr lang="en-US" altLang="ko-KR" sz="1800" dirty="0"/>
+            <a:t>= AI Developer</a:t>
+          </a:r>
+          <a:endParaRPr lang="ko-KR" altLang="en-US" sz="1800" dirty="0"/>
         </a:p>
       </dgm:t>
     </dgm:pt>
-    <dgm:pt modelId="{ADC03DE3-A77B-4757-9A17-09DBF9218281}" type="parTrans" cxnId="{870729FD-7BCE-46C8-A2AA-3B7BFDB3F11B}">
+    <dgm:pt modelId="{A0DFE743-5883-4217-956D-F2329D5C6370}" type="parTrans" cxnId="{C568F812-7026-4CCB-942E-ED4D617D0305}">
       <dgm:prSet/>
       <dgm:spPr/>
       <dgm:t>
@@ -1223,13 +1172,11 @@
         <a:lstStyle/>
         <a:p>
           <a:pPr latinLnBrk="1"/>
-          <a:endParaRPr lang="ko-KR" altLang="en-US" sz="1600" b="0">
-            <a:latin typeface="+mj-lt"/>
-          </a:endParaRPr>
+          <a:endParaRPr lang="ko-KR" altLang="en-US" sz="1800"/>
         </a:p>
       </dgm:t>
     </dgm:pt>
-    <dgm:pt modelId="{4936610F-557C-439C-A600-2337432E005F}" type="sibTrans" cxnId="{870729FD-7BCE-46C8-A2AA-3B7BFDB3F11B}">
+    <dgm:pt modelId="{B93B130D-8729-4E8F-82D1-7DA8C8D45505}" type="sibTrans" cxnId="{C568F812-7026-4CCB-942E-ED4D617D0305}">
       <dgm:prSet/>
       <dgm:spPr/>
       <dgm:t>
@@ -1237,13 +1184,11 @@
         <a:lstStyle/>
         <a:p>
           <a:pPr latinLnBrk="1"/>
-          <a:endParaRPr lang="ko-KR" altLang="en-US" sz="1600" b="0">
-            <a:latin typeface="+mj-lt"/>
-          </a:endParaRPr>
+          <a:endParaRPr lang="ko-KR" altLang="en-US" sz="1800"/>
         </a:p>
       </dgm:t>
     </dgm:pt>
-    <dgm:pt modelId="{BA1D5C62-6199-448D-BC40-B1D403F60881}">
+    <dgm:pt modelId="{39796BFF-7E6C-4DA2-86DD-A28D772EA49C}">
       <dgm:prSet phldrT="[텍스트]" custT="1"/>
       <dgm:spPr/>
       <dgm:t>
@@ -1252,18 +1197,14 @@
         <a:p>
           <a:pPr latinLnBrk="1"/>
           <a:r>
-            <a:rPr lang="en-US" altLang="ko-KR" sz="2000" b="0" dirty="0">
-              <a:latin typeface="+mj-lt"/>
-            </a:rPr>
-            <a:t>Compiler</a:t>
+            <a:rPr lang="en-US" altLang="ko-KR" sz="2000" dirty="0"/>
+            <a:t>Class Chatbot</a:t>
           </a:r>
-          <a:endParaRPr lang="ko-KR" altLang="en-US" sz="2000" b="0" dirty="0">
-            <a:latin typeface="+mj-lt"/>
-          </a:endParaRPr>
+          <a:endParaRPr lang="ko-KR" altLang="en-US" sz="2000" dirty="0"/>
         </a:p>
       </dgm:t>
     </dgm:pt>
-    <dgm:pt modelId="{19EDB513-A74F-485F-8C17-3F7DA0645623}" type="parTrans" cxnId="{81D45FDB-FD72-4196-99E1-DACEFF28B916}">
+    <dgm:pt modelId="{E5A844FF-C808-483B-89B4-B14EC65A0BBD}" type="parTrans" cxnId="{F213BB51-005A-4048-B2A2-CA37F42E22DA}">
       <dgm:prSet/>
       <dgm:spPr/>
       <dgm:t>
@@ -1271,13 +1212,11 @@
         <a:lstStyle/>
         <a:p>
           <a:pPr latinLnBrk="1"/>
-          <a:endParaRPr lang="ko-KR" altLang="en-US" sz="1600" b="0">
-            <a:latin typeface="+mj-lt"/>
-          </a:endParaRPr>
+          <a:endParaRPr lang="ko-KR" altLang="en-US"/>
         </a:p>
       </dgm:t>
     </dgm:pt>
-    <dgm:pt modelId="{1BA7BFCE-5C28-4DCA-8436-CC9CDFB6ACC3}" type="sibTrans" cxnId="{81D45FDB-FD72-4196-99E1-DACEFF28B916}">
+    <dgm:pt modelId="{3D3CBBE8-459D-4050-8E4B-F63F393A609E}" type="sibTrans" cxnId="{F213BB51-005A-4048-B2A2-CA37F42E22DA}">
       <dgm:prSet/>
       <dgm:spPr/>
       <dgm:t>
@@ -1285,13 +1224,11 @@
         <a:lstStyle/>
         <a:p>
           <a:pPr latinLnBrk="1"/>
-          <a:endParaRPr lang="ko-KR" altLang="en-US" sz="1600" b="0">
-            <a:latin typeface="+mj-lt"/>
-          </a:endParaRPr>
+          <a:endParaRPr lang="ko-KR" altLang="en-US"/>
         </a:p>
       </dgm:t>
     </dgm:pt>
-    <dgm:pt modelId="{10FEBC2E-7CCA-4463-9B88-26988B7105CC}">
+    <dgm:pt modelId="{6FC165F1-D7D2-4A64-A200-B793C41AED32}">
       <dgm:prSet phldrT="[텍스트]" custT="1"/>
       <dgm:spPr/>
       <dgm:t>
@@ -1300,18 +1237,14 @@
         <a:p>
           <a:pPr latinLnBrk="1"/>
           <a:r>
-            <a:rPr lang="en-US" altLang="ko-KR" sz="2000" b="0" dirty="0">
-              <a:latin typeface="+mj-lt"/>
-            </a:rPr>
-            <a:t>Validator</a:t>
+            <a:rPr lang="en-US" altLang="ko-KR" sz="2000" dirty="0"/>
+            <a:t>Multi Agent Orchestration</a:t>
           </a:r>
-          <a:endParaRPr lang="ko-KR" altLang="en-US" sz="2000" b="0" dirty="0">
-            <a:latin typeface="+mj-lt"/>
-          </a:endParaRPr>
+          <a:endParaRPr lang="ko-KR" altLang="en-US" sz="2000" dirty="0"/>
         </a:p>
       </dgm:t>
     </dgm:pt>
-    <dgm:pt modelId="{BAF65464-B391-40F4-A997-0E30573A7F2B}" type="parTrans" cxnId="{3A2F899F-A858-4E5B-8E11-EF432F477D1A}">
+    <dgm:pt modelId="{E9C8D743-1349-4E94-A893-C1E4574B3B30}" type="parTrans" cxnId="{FBF56F25-610E-4471-A302-29DCAFD466E0}">
       <dgm:prSet/>
       <dgm:spPr/>
       <dgm:t>
@@ -1319,13 +1252,11 @@
         <a:lstStyle/>
         <a:p>
           <a:pPr latinLnBrk="1"/>
-          <a:endParaRPr lang="ko-KR" altLang="en-US" sz="1600" b="0">
-            <a:latin typeface="+mj-lt"/>
-          </a:endParaRPr>
+          <a:endParaRPr lang="ko-KR" altLang="en-US"/>
         </a:p>
       </dgm:t>
     </dgm:pt>
-    <dgm:pt modelId="{64AA2CF5-3EBB-4974-9947-133D7B6BF7D0}" type="sibTrans" cxnId="{3A2F899F-A858-4E5B-8E11-EF432F477D1A}">
+    <dgm:pt modelId="{8BA372E8-9063-4675-A445-B72F61F97A7F}" type="sibTrans" cxnId="{FBF56F25-610E-4471-A302-29DCAFD466E0}">
       <dgm:prSet/>
       <dgm:spPr/>
       <dgm:t>
@@ -1333,14 +1264,12 @@
         <a:lstStyle/>
         <a:p>
           <a:pPr latinLnBrk="1"/>
-          <a:endParaRPr lang="ko-KR" altLang="en-US" sz="1600" b="0">
-            <a:latin typeface="+mj-lt"/>
-          </a:endParaRPr>
+          <a:endParaRPr lang="ko-KR" altLang="en-US"/>
         </a:p>
       </dgm:t>
     </dgm:pt>
-    <dgm:pt modelId="{8CF0A488-F71E-4272-9A24-303F2B79395F}" type="pres">
-      <dgm:prSet presAssocID="{B2A346DF-EF57-4188-8874-A4E13C0037F8}" presName="composite" presStyleCnt="0">
+    <dgm:pt modelId="{CEA83A1E-5867-4263-AC64-2D29153CCED5}" type="pres">
+      <dgm:prSet presAssocID="{987BD4C4-22A5-443F-B954-6A13CDF793B2}" presName="composite" presStyleCnt="0">
         <dgm:presLayoutVars>
           <dgm:chMax val="3"/>
           <dgm:animLvl val="lvl"/>
@@ -1349,8 +1278,8 @@
       </dgm:prSet>
       <dgm:spPr/>
     </dgm:pt>
-    <dgm:pt modelId="{F0CDFD12-6093-457B-A03A-70B11DF75411}" type="pres">
-      <dgm:prSet presAssocID="{C60726BF-58CA-4EAD-AE21-2AEE5B89EC12}" presName="gear1" presStyleLbl="node1" presStyleIdx="0" presStyleCnt="3">
+    <dgm:pt modelId="{B9B90B7C-3ECD-432C-A7F9-46A0C04E0762}" type="pres">
+      <dgm:prSet presAssocID="{D181B5ED-DA18-4FE0-A6C2-257A606BE61B}" presName="gear1" presStyleLbl="node1" presStyleIdx="0" presStyleCnt="3">
         <dgm:presLayoutVars>
           <dgm:chMax val="1"/>
           <dgm:bulletEnabled val="1"/>
@@ -1358,16 +1287,16 @@
       </dgm:prSet>
       <dgm:spPr/>
     </dgm:pt>
-    <dgm:pt modelId="{4995517B-8D8B-437F-A5AE-9C8C3267960C}" type="pres">
-      <dgm:prSet presAssocID="{C60726BF-58CA-4EAD-AE21-2AEE5B89EC12}" presName="gear1srcNode" presStyleLbl="node1" presStyleIdx="0" presStyleCnt="3"/>
+    <dgm:pt modelId="{6E7EFE10-0CA1-4860-A847-BEA10428F85E}" type="pres">
+      <dgm:prSet presAssocID="{D181B5ED-DA18-4FE0-A6C2-257A606BE61B}" presName="gear1srcNode" presStyleLbl="node1" presStyleIdx="0" presStyleCnt="3"/>
       <dgm:spPr/>
     </dgm:pt>
-    <dgm:pt modelId="{A78D4927-E365-4D35-BC83-B7E95672AF01}" type="pres">
-      <dgm:prSet presAssocID="{C60726BF-58CA-4EAD-AE21-2AEE5B89EC12}" presName="gear1dstNode" presStyleLbl="node1" presStyleIdx="0" presStyleCnt="3"/>
+    <dgm:pt modelId="{83B2D239-5D32-4782-98EB-DF04C5BFF45B}" type="pres">
+      <dgm:prSet presAssocID="{D181B5ED-DA18-4FE0-A6C2-257A606BE61B}" presName="gear1dstNode" presStyleLbl="node1" presStyleIdx="0" presStyleCnt="3"/>
       <dgm:spPr/>
     </dgm:pt>
-    <dgm:pt modelId="{78084B7A-C218-4C4A-A8C6-9D1C1C820ABF}" type="pres">
-      <dgm:prSet presAssocID="{C60726BF-58CA-4EAD-AE21-2AEE5B89EC12}" presName="gear1ch" presStyleLbl="fgAcc1" presStyleIdx="0" presStyleCnt="3">
+    <dgm:pt modelId="{BDD998CA-DE61-4156-978E-1A4FD2D91C6F}" type="pres">
+      <dgm:prSet presAssocID="{D181B5ED-DA18-4FE0-A6C2-257A606BE61B}" presName="gear1ch" presStyleLbl="fgAcc1" presStyleIdx="0" presStyleCnt="3">
         <dgm:presLayoutVars>
           <dgm:chMax val="0"/>
           <dgm:bulletEnabled val="1"/>
@@ -1375,8 +1304,8 @@
       </dgm:prSet>
       <dgm:spPr/>
     </dgm:pt>
-    <dgm:pt modelId="{0660A873-9E4D-4DDA-AF38-85B4EFF09DF3}" type="pres">
-      <dgm:prSet presAssocID="{C094B65D-16B3-4DAF-B569-33E315BA3ADA}" presName="gear2" presStyleLbl="node1" presStyleIdx="1" presStyleCnt="3">
+    <dgm:pt modelId="{A8188B7F-A7B3-4C50-9AB4-15BA141D4FD6}" type="pres">
+      <dgm:prSet presAssocID="{CB683ED3-AA54-43B8-AEF8-4A7EA1E4E169}" presName="gear2" presStyleLbl="node1" presStyleIdx="1" presStyleCnt="3">
         <dgm:presLayoutVars>
           <dgm:chMax val="1"/>
           <dgm:bulletEnabled val="1"/>
@@ -1384,16 +1313,16 @@
       </dgm:prSet>
       <dgm:spPr/>
     </dgm:pt>
-    <dgm:pt modelId="{D44890EC-D73E-4F2A-BF8F-F782B0C4D65C}" type="pres">
-      <dgm:prSet presAssocID="{C094B65D-16B3-4DAF-B569-33E315BA3ADA}" presName="gear2srcNode" presStyleLbl="node1" presStyleIdx="1" presStyleCnt="3"/>
+    <dgm:pt modelId="{23F0D49E-29C9-4BE3-85CF-FBDA0C6E8BA2}" type="pres">
+      <dgm:prSet presAssocID="{CB683ED3-AA54-43B8-AEF8-4A7EA1E4E169}" presName="gear2srcNode" presStyleLbl="node1" presStyleIdx="1" presStyleCnt="3"/>
       <dgm:spPr/>
     </dgm:pt>
-    <dgm:pt modelId="{92B0CE9C-3113-4528-A727-89719D08C3FF}" type="pres">
-      <dgm:prSet presAssocID="{C094B65D-16B3-4DAF-B569-33E315BA3ADA}" presName="gear2dstNode" presStyleLbl="node1" presStyleIdx="1" presStyleCnt="3"/>
+    <dgm:pt modelId="{33F2D945-C4F1-4DF7-8F62-581EB89B3419}" type="pres">
+      <dgm:prSet presAssocID="{CB683ED3-AA54-43B8-AEF8-4A7EA1E4E169}" presName="gear2dstNode" presStyleLbl="node1" presStyleIdx="1" presStyleCnt="3"/>
       <dgm:spPr/>
     </dgm:pt>
-    <dgm:pt modelId="{5102CC00-C213-43E7-969D-8AAF8F8DCCE7}" type="pres">
-      <dgm:prSet presAssocID="{C094B65D-16B3-4DAF-B569-33E315BA3ADA}" presName="gear2ch" presStyleLbl="fgAcc1" presStyleIdx="1" presStyleCnt="3">
+    <dgm:pt modelId="{21B43C4B-550B-45AE-9733-FE0D3441DF38}" type="pres">
+      <dgm:prSet presAssocID="{CB683ED3-AA54-43B8-AEF8-4A7EA1E4E169}" presName="gear2ch" presStyleLbl="fgAcc1" presStyleIdx="1" presStyleCnt="3">
         <dgm:presLayoutVars>
           <dgm:chMax val="0"/>
           <dgm:bulletEnabled val="1"/>
@@ -1401,12 +1330,12 @@
       </dgm:prSet>
       <dgm:spPr/>
     </dgm:pt>
-    <dgm:pt modelId="{B811F302-8CFA-483B-A2C3-DDE77AB0ED2C}" type="pres">
-      <dgm:prSet presAssocID="{9CADE41D-B346-43A2-9FBB-81CC17ABE009}" presName="gear3" presStyleLbl="node1" presStyleIdx="2" presStyleCnt="3" custLinFactNeighborX="-13298" custLinFactNeighborY="-2216"/>
+    <dgm:pt modelId="{CEC9D55E-0D2F-48D7-A161-7E440D14CFFE}" type="pres">
+      <dgm:prSet presAssocID="{A329BDF0-7B5D-4AF2-976F-D255AA1FBC67}" presName="gear3" presStyleLbl="node1" presStyleIdx="2" presStyleCnt="3"/>
       <dgm:spPr/>
     </dgm:pt>
-    <dgm:pt modelId="{69DE1B7E-2F75-4A8A-B8CB-4287818565E0}" type="pres">
-      <dgm:prSet presAssocID="{9CADE41D-B346-43A2-9FBB-81CC17ABE009}" presName="gear3tx" presStyleLbl="node1" presStyleIdx="2" presStyleCnt="3">
+    <dgm:pt modelId="{67C7B691-AE99-4A4B-A98D-D90055216AAA}" type="pres">
+      <dgm:prSet presAssocID="{A329BDF0-7B5D-4AF2-976F-D255AA1FBC67}" presName="gear3tx" presStyleLbl="node1" presStyleIdx="2" presStyleCnt="3">
         <dgm:presLayoutVars>
           <dgm:chMax val="1"/>
           <dgm:bulletEnabled val="1"/>
@@ -1414,16 +1343,16 @@
       </dgm:prSet>
       <dgm:spPr/>
     </dgm:pt>
-    <dgm:pt modelId="{164A7303-4BED-48B0-9863-9DDEBA73D8B8}" type="pres">
-      <dgm:prSet presAssocID="{9CADE41D-B346-43A2-9FBB-81CC17ABE009}" presName="gear3srcNode" presStyleLbl="node1" presStyleIdx="2" presStyleCnt="3"/>
+    <dgm:pt modelId="{46B5A6CF-51F5-4627-8A95-7981E0697951}" type="pres">
+      <dgm:prSet presAssocID="{A329BDF0-7B5D-4AF2-976F-D255AA1FBC67}" presName="gear3srcNode" presStyleLbl="node1" presStyleIdx="2" presStyleCnt="3"/>
       <dgm:spPr/>
     </dgm:pt>
-    <dgm:pt modelId="{9E868F16-09F1-4D56-975B-0DC251631FB2}" type="pres">
-      <dgm:prSet presAssocID="{9CADE41D-B346-43A2-9FBB-81CC17ABE009}" presName="gear3dstNode" presStyleLbl="node1" presStyleIdx="2" presStyleCnt="3"/>
+    <dgm:pt modelId="{88BD5829-C90F-44A3-9077-DECD74E8A224}" type="pres">
+      <dgm:prSet presAssocID="{A329BDF0-7B5D-4AF2-976F-D255AA1FBC67}" presName="gear3dstNode" presStyleLbl="node1" presStyleIdx="2" presStyleCnt="3"/>
       <dgm:spPr/>
     </dgm:pt>
-    <dgm:pt modelId="{ED6B4636-920E-4639-985E-A0466E34FC92}" type="pres">
-      <dgm:prSet presAssocID="{9CADE41D-B346-43A2-9FBB-81CC17ABE009}" presName="gear3ch" presStyleLbl="fgAcc1" presStyleIdx="2" presStyleCnt="3">
+    <dgm:pt modelId="{D4998C81-76E6-4D12-B378-82F96096F70A}" type="pres">
+      <dgm:prSet presAssocID="{A329BDF0-7B5D-4AF2-976F-D255AA1FBC67}" presName="gear3ch" presStyleLbl="fgAcc1" presStyleIdx="2" presStyleCnt="3">
         <dgm:presLayoutVars>
           <dgm:chMax val="0"/>
           <dgm:bulletEnabled val="1"/>
@@ -1431,65 +1360,65 @@
       </dgm:prSet>
       <dgm:spPr/>
     </dgm:pt>
-    <dgm:pt modelId="{DA059C0F-2DD7-4B86-9653-1FC597247497}" type="pres">
-      <dgm:prSet presAssocID="{012115A8-C794-4EBE-BD4E-49BDCD6F133D}" presName="connector1" presStyleLbl="sibTrans2D1" presStyleIdx="0" presStyleCnt="3"/>
+    <dgm:pt modelId="{599DA31D-28AB-41F5-9A40-5CD1A2A4EEA2}" type="pres">
+      <dgm:prSet presAssocID="{81E866CD-28A9-44F9-9707-D2DC1BECC927}" presName="connector1" presStyleLbl="sibTrans2D1" presStyleIdx="0" presStyleCnt="3"/>
       <dgm:spPr/>
     </dgm:pt>
-    <dgm:pt modelId="{5FA9BAF4-892C-4C58-96C9-8892CE071BB5}" type="pres">
-      <dgm:prSet presAssocID="{3968C133-40CA-44AB-B0B5-DBEC14CDE810}" presName="connector2" presStyleLbl="sibTrans2D1" presStyleIdx="1" presStyleCnt="3"/>
+    <dgm:pt modelId="{2B918095-2C7B-4C93-9C1E-A4DEA84BD8E8}" type="pres">
+      <dgm:prSet presAssocID="{2E8B6977-976E-482A-AB52-0377E8D9FFB5}" presName="connector2" presStyleLbl="sibTrans2D1" presStyleIdx="1" presStyleCnt="3"/>
       <dgm:spPr/>
     </dgm:pt>
-    <dgm:pt modelId="{1586828D-3546-4077-A3EE-360051504D71}" type="pres">
-      <dgm:prSet presAssocID="{925FF1BE-70A2-4EDE-A8A5-6CCC25CA0302}" presName="connector3" presStyleLbl="sibTrans2D1" presStyleIdx="2" presStyleCnt="3"/>
+    <dgm:pt modelId="{C30D21E8-4557-4AA3-8698-F2E695EB884C}" type="pres">
+      <dgm:prSet presAssocID="{88B7F584-B907-48D8-8D8A-344F6B6628D2}" presName="connector3" presStyleLbl="sibTrans2D1" presStyleIdx="2" presStyleCnt="3"/>
       <dgm:spPr/>
     </dgm:pt>
   </dgm:ptLst>
   <dgm:cxnLst>
-    <dgm:cxn modelId="{14288300-4A87-4E51-AAAB-26B74E16B5C7}" type="presOf" srcId="{C094B65D-16B3-4DAF-B569-33E315BA3ADA}" destId="{92B0CE9C-3113-4528-A727-89719D08C3FF}" srcOrd="2" destOrd="0" presId="urn:microsoft.com/office/officeart/2005/8/layout/gear1"/>
-    <dgm:cxn modelId="{099D0614-9EDD-4599-8EE8-FDE581E92E80}" type="presOf" srcId="{BA1D5C62-6199-448D-BC40-B1D403F60881}" destId="{ED6B4636-920E-4639-985E-A0466E34FC92}" srcOrd="0" destOrd="0" presId="urn:microsoft.com/office/officeart/2005/8/layout/gear1"/>
-    <dgm:cxn modelId="{EE49BF1E-FEAC-4940-A4CC-7B68C3F35CC5}" type="presOf" srcId="{C094B65D-16B3-4DAF-B569-33E315BA3ADA}" destId="{0660A873-9E4D-4DDA-AF38-85B4EFF09DF3}" srcOrd="0" destOrd="0" presId="urn:microsoft.com/office/officeart/2005/8/layout/gear1"/>
-    <dgm:cxn modelId="{5A98C91F-488D-406A-8158-2FD72C48305F}" type="presOf" srcId="{C6A21C00-C7DD-4CEE-9D58-7316613985FB}" destId="{78084B7A-C218-4C4A-A8C6-9D1C1C820ABF}" srcOrd="0" destOrd="0" presId="urn:microsoft.com/office/officeart/2005/8/layout/gear1"/>
-    <dgm:cxn modelId="{B1E8A92A-E95D-4252-8B59-251FF3FEAD32}" type="presOf" srcId="{37D48D44-3384-4C3C-BA31-678284D71F07}" destId="{5102CC00-C213-43E7-969D-8AAF8F8DCCE7}" srcOrd="0" destOrd="1" presId="urn:microsoft.com/office/officeart/2005/8/layout/gear1"/>
-    <dgm:cxn modelId="{9ACC4D32-6BC1-4AB8-88C8-9891408FC477}" type="presOf" srcId="{9CADE41D-B346-43A2-9FBB-81CC17ABE009}" destId="{B811F302-8CFA-483B-A2C3-DDE77AB0ED2C}" srcOrd="0" destOrd="0" presId="urn:microsoft.com/office/officeart/2005/8/layout/gear1"/>
-    <dgm:cxn modelId="{D11DB63F-B76E-4939-A366-5791BE062869}" srcId="{B2A346DF-EF57-4188-8874-A4E13C0037F8}" destId="{C60726BF-58CA-4EAD-AE21-2AEE5B89EC12}" srcOrd="0" destOrd="0" parTransId="{678CC9CD-B846-45E1-87A2-20CBAE631A58}" sibTransId="{012115A8-C794-4EBE-BD4E-49BDCD6F133D}"/>
-    <dgm:cxn modelId="{4D770146-E52E-470A-9B6E-D318EDBEACC7}" type="presOf" srcId="{C60726BF-58CA-4EAD-AE21-2AEE5B89EC12}" destId="{A78D4927-E365-4D35-BC83-B7E95672AF01}" srcOrd="2" destOrd="0" presId="urn:microsoft.com/office/officeart/2005/8/layout/gear1"/>
-    <dgm:cxn modelId="{AABF0D56-7B66-4800-AC8A-F45C03AD06B6}" srcId="{B2A346DF-EF57-4188-8874-A4E13C0037F8}" destId="{C094B65D-16B3-4DAF-B569-33E315BA3ADA}" srcOrd="1" destOrd="0" parTransId="{333A5487-F6F4-41AC-BE74-60567B4C4698}" sibTransId="{3968C133-40CA-44AB-B0B5-DBEC14CDE810}"/>
-    <dgm:cxn modelId="{BF26037C-0EBF-4073-9B7C-4A52F4D50916}" srcId="{C60726BF-58CA-4EAD-AE21-2AEE5B89EC12}" destId="{CCB5BA7B-7C6B-4B56-B1C8-7649E313F9E7}" srcOrd="1" destOrd="0" parTransId="{8A7DCF4C-58D4-4CE0-826F-D23217B99568}" sibTransId="{96561900-9BC9-4813-A2A6-0DC188BB219B}"/>
-    <dgm:cxn modelId="{69DB127D-FD14-4DA0-B5F4-DD87BD4B195E}" type="presOf" srcId="{C60726BF-58CA-4EAD-AE21-2AEE5B89EC12}" destId="{F0CDFD12-6093-457B-A03A-70B11DF75411}" srcOrd="0" destOrd="0" presId="urn:microsoft.com/office/officeart/2005/8/layout/gear1"/>
-    <dgm:cxn modelId="{7DD4E380-DC64-4BDB-96FA-EB8DDD66F0C0}" srcId="{C094B65D-16B3-4DAF-B569-33E315BA3ADA}" destId="{77763675-AA58-491C-BC5F-7722A5A105BF}" srcOrd="0" destOrd="0" parTransId="{55303219-23B0-48CE-85CC-5115EFD825B3}" sibTransId="{18F524AF-E3F2-446D-B261-F47230C35E17}"/>
-    <dgm:cxn modelId="{213F3281-95FE-453F-879F-295450973B39}" type="presOf" srcId="{77763675-AA58-491C-BC5F-7722A5A105BF}" destId="{5102CC00-C213-43E7-969D-8AAF8F8DCCE7}" srcOrd="0" destOrd="0" presId="urn:microsoft.com/office/officeart/2005/8/layout/gear1"/>
-    <dgm:cxn modelId="{61013289-E611-4375-809B-E29FA0B02E16}" type="presOf" srcId="{3968C133-40CA-44AB-B0B5-DBEC14CDE810}" destId="{5FA9BAF4-892C-4C58-96C9-8892CE071BB5}" srcOrd="0" destOrd="0" presId="urn:microsoft.com/office/officeart/2005/8/layout/gear1"/>
-    <dgm:cxn modelId="{A2F2C78E-14AE-422C-91E9-545D6D6502B8}" type="presOf" srcId="{9CADE41D-B346-43A2-9FBB-81CC17ABE009}" destId="{164A7303-4BED-48B0-9863-9DDEBA73D8B8}" srcOrd="2" destOrd="0" presId="urn:microsoft.com/office/officeart/2005/8/layout/gear1"/>
-    <dgm:cxn modelId="{D0A59390-A189-4268-A57F-36021F8F4635}" type="presOf" srcId="{9CADE41D-B346-43A2-9FBB-81CC17ABE009}" destId="{9E868F16-09F1-4D56-975B-0DC251631FB2}" srcOrd="3" destOrd="0" presId="urn:microsoft.com/office/officeart/2005/8/layout/gear1"/>
-    <dgm:cxn modelId="{9ECA8B9B-4151-4079-BED9-27B66E701E7B}" srcId="{B2A346DF-EF57-4188-8874-A4E13C0037F8}" destId="{9CADE41D-B346-43A2-9FBB-81CC17ABE009}" srcOrd="2" destOrd="0" parTransId="{BD1A5F11-8876-4730-BC82-048724EDD931}" sibTransId="{925FF1BE-70A2-4EDE-A8A5-6CCC25CA0302}"/>
-    <dgm:cxn modelId="{3A2F899F-A858-4E5B-8E11-EF432F477D1A}" srcId="{9CADE41D-B346-43A2-9FBB-81CC17ABE009}" destId="{10FEBC2E-7CCA-4463-9B88-26988B7105CC}" srcOrd="1" destOrd="0" parTransId="{BAF65464-B391-40F4-A997-0E30573A7F2B}" sibTransId="{64AA2CF5-3EBB-4974-9947-133D7B6BF7D0}"/>
-    <dgm:cxn modelId="{0418F1AD-7235-468C-B984-D22D23EF8D36}" type="presOf" srcId="{012115A8-C794-4EBE-BD4E-49BDCD6F133D}" destId="{DA059C0F-2DD7-4B86-9653-1FC597247497}" srcOrd="0" destOrd="0" presId="urn:microsoft.com/office/officeart/2005/8/layout/gear1"/>
-    <dgm:cxn modelId="{779F79AE-6D9E-4ECB-8ED6-43F9B71ED216}" type="presOf" srcId="{925FF1BE-70A2-4EDE-A8A5-6CCC25CA0302}" destId="{1586828D-3546-4077-A3EE-360051504D71}" srcOrd="0" destOrd="0" presId="urn:microsoft.com/office/officeart/2005/8/layout/gear1"/>
-    <dgm:cxn modelId="{8EC84BAF-528B-4D29-9E20-3BACC7046D84}" type="presOf" srcId="{C094B65D-16B3-4DAF-B569-33E315BA3ADA}" destId="{D44890EC-D73E-4F2A-BF8F-F782B0C4D65C}" srcOrd="1" destOrd="0" presId="urn:microsoft.com/office/officeart/2005/8/layout/gear1"/>
-    <dgm:cxn modelId="{90E932BA-2F50-4B9E-B9F3-7269108FE4D6}" srcId="{C60726BF-58CA-4EAD-AE21-2AEE5B89EC12}" destId="{C6A21C00-C7DD-4CEE-9D58-7316613985FB}" srcOrd="0" destOrd="0" parTransId="{F63F44CB-AEEC-4FB6-BD56-A0996E666983}" sibTransId="{FF48E1B3-9815-4263-8655-51C2BD1D8905}"/>
-    <dgm:cxn modelId="{BAEC53BC-7E70-4488-8E21-36B06934ED57}" type="presOf" srcId="{C60726BF-58CA-4EAD-AE21-2AEE5B89EC12}" destId="{4995517B-8D8B-437F-A5AE-9C8C3267960C}" srcOrd="1" destOrd="0" presId="urn:microsoft.com/office/officeart/2005/8/layout/gear1"/>
-    <dgm:cxn modelId="{B3D8BCC2-0B07-4296-89D5-53E6247284F3}" type="presOf" srcId="{10FEBC2E-7CCA-4463-9B88-26988B7105CC}" destId="{ED6B4636-920E-4639-985E-A0466E34FC92}" srcOrd="0" destOrd="1" presId="urn:microsoft.com/office/officeart/2005/8/layout/gear1"/>
-    <dgm:cxn modelId="{7866D7D8-F43D-4C52-9EE1-82A5CB1564A7}" type="presOf" srcId="{B2A346DF-EF57-4188-8874-A4E13C0037F8}" destId="{8CF0A488-F71E-4272-9A24-303F2B79395F}" srcOrd="0" destOrd="0" presId="urn:microsoft.com/office/officeart/2005/8/layout/gear1"/>
-    <dgm:cxn modelId="{81D45FDB-FD72-4196-99E1-DACEFF28B916}" srcId="{9CADE41D-B346-43A2-9FBB-81CC17ABE009}" destId="{BA1D5C62-6199-448D-BC40-B1D403F60881}" srcOrd="0" destOrd="0" parTransId="{19EDB513-A74F-485F-8C17-3F7DA0645623}" sibTransId="{1BA7BFCE-5C28-4DCA-8436-CC9CDFB6ACC3}"/>
-    <dgm:cxn modelId="{1A5940E2-2BE4-4F30-8A6A-9049130F074B}" type="presOf" srcId="{9CADE41D-B346-43A2-9FBB-81CC17ABE009}" destId="{69DE1B7E-2F75-4A8A-B8CB-4287818565E0}" srcOrd="1" destOrd="0" presId="urn:microsoft.com/office/officeart/2005/8/layout/gear1"/>
-    <dgm:cxn modelId="{A84B37EE-AB74-4FA0-9C8A-D27AE9FE1121}" type="presOf" srcId="{CCB5BA7B-7C6B-4B56-B1C8-7649E313F9E7}" destId="{78084B7A-C218-4C4A-A8C6-9D1C1C820ABF}" srcOrd="0" destOrd="1" presId="urn:microsoft.com/office/officeart/2005/8/layout/gear1"/>
-    <dgm:cxn modelId="{870729FD-7BCE-46C8-A2AA-3B7BFDB3F11B}" srcId="{C094B65D-16B3-4DAF-B569-33E315BA3ADA}" destId="{37D48D44-3384-4C3C-BA31-678284D71F07}" srcOrd="1" destOrd="0" parTransId="{ADC03DE3-A77B-4757-9A17-09DBF9218281}" sibTransId="{4936610F-557C-439C-A600-2337432E005F}"/>
-    <dgm:cxn modelId="{331EB1F1-26F4-43BE-AC9D-D7368E9D6A3D}" type="presParOf" srcId="{8CF0A488-F71E-4272-9A24-303F2B79395F}" destId="{F0CDFD12-6093-457B-A03A-70B11DF75411}" srcOrd="0" destOrd="0" presId="urn:microsoft.com/office/officeart/2005/8/layout/gear1"/>
-    <dgm:cxn modelId="{AF8DD60E-A802-453F-A20D-49A00A9E99C0}" type="presParOf" srcId="{8CF0A488-F71E-4272-9A24-303F2B79395F}" destId="{4995517B-8D8B-437F-A5AE-9C8C3267960C}" srcOrd="1" destOrd="0" presId="urn:microsoft.com/office/officeart/2005/8/layout/gear1"/>
-    <dgm:cxn modelId="{4907E43D-F766-4885-87E8-14FEF1E88AB9}" type="presParOf" srcId="{8CF0A488-F71E-4272-9A24-303F2B79395F}" destId="{A78D4927-E365-4D35-BC83-B7E95672AF01}" srcOrd="2" destOrd="0" presId="urn:microsoft.com/office/officeart/2005/8/layout/gear1"/>
-    <dgm:cxn modelId="{D11BF9B1-B701-4A71-9BC2-70479F0DF323}" type="presParOf" srcId="{8CF0A488-F71E-4272-9A24-303F2B79395F}" destId="{78084B7A-C218-4C4A-A8C6-9D1C1C820ABF}" srcOrd="3" destOrd="0" presId="urn:microsoft.com/office/officeart/2005/8/layout/gear1"/>
-    <dgm:cxn modelId="{470CF4A3-8C5A-4CB7-B20F-8741600A6729}" type="presParOf" srcId="{8CF0A488-F71E-4272-9A24-303F2B79395F}" destId="{0660A873-9E4D-4DDA-AF38-85B4EFF09DF3}" srcOrd="4" destOrd="0" presId="urn:microsoft.com/office/officeart/2005/8/layout/gear1"/>
-    <dgm:cxn modelId="{34FDBB94-4D34-412A-97EC-0B59302627FB}" type="presParOf" srcId="{8CF0A488-F71E-4272-9A24-303F2B79395F}" destId="{D44890EC-D73E-4F2A-BF8F-F782B0C4D65C}" srcOrd="5" destOrd="0" presId="urn:microsoft.com/office/officeart/2005/8/layout/gear1"/>
-    <dgm:cxn modelId="{E5934711-4004-4597-B5CC-214842B95996}" type="presParOf" srcId="{8CF0A488-F71E-4272-9A24-303F2B79395F}" destId="{92B0CE9C-3113-4528-A727-89719D08C3FF}" srcOrd="6" destOrd="0" presId="urn:microsoft.com/office/officeart/2005/8/layout/gear1"/>
-    <dgm:cxn modelId="{F8439F53-8FCA-48B0-9DF8-94FEA2A0017C}" type="presParOf" srcId="{8CF0A488-F71E-4272-9A24-303F2B79395F}" destId="{5102CC00-C213-43E7-969D-8AAF8F8DCCE7}" srcOrd="7" destOrd="0" presId="urn:microsoft.com/office/officeart/2005/8/layout/gear1"/>
-    <dgm:cxn modelId="{F5E7D333-D845-459D-ACA8-F4C2370F9C34}" type="presParOf" srcId="{8CF0A488-F71E-4272-9A24-303F2B79395F}" destId="{B811F302-8CFA-483B-A2C3-DDE77AB0ED2C}" srcOrd="8" destOrd="0" presId="urn:microsoft.com/office/officeart/2005/8/layout/gear1"/>
-    <dgm:cxn modelId="{4BA8E1E5-C85E-4CF4-A7CD-EBD751999A51}" type="presParOf" srcId="{8CF0A488-F71E-4272-9A24-303F2B79395F}" destId="{69DE1B7E-2F75-4A8A-B8CB-4287818565E0}" srcOrd="9" destOrd="0" presId="urn:microsoft.com/office/officeart/2005/8/layout/gear1"/>
-    <dgm:cxn modelId="{F5A3CC81-E001-4F1A-86EB-5A63ACA57F8E}" type="presParOf" srcId="{8CF0A488-F71E-4272-9A24-303F2B79395F}" destId="{164A7303-4BED-48B0-9863-9DDEBA73D8B8}" srcOrd="10" destOrd="0" presId="urn:microsoft.com/office/officeart/2005/8/layout/gear1"/>
-    <dgm:cxn modelId="{5D93A26D-17A1-450D-9F81-697C5461BC05}" type="presParOf" srcId="{8CF0A488-F71E-4272-9A24-303F2B79395F}" destId="{9E868F16-09F1-4D56-975B-0DC251631FB2}" srcOrd="11" destOrd="0" presId="urn:microsoft.com/office/officeart/2005/8/layout/gear1"/>
-    <dgm:cxn modelId="{2B84F928-3E7E-4B33-AFD6-AA29DD7E2D57}" type="presParOf" srcId="{8CF0A488-F71E-4272-9A24-303F2B79395F}" destId="{ED6B4636-920E-4639-985E-A0466E34FC92}" srcOrd="12" destOrd="0" presId="urn:microsoft.com/office/officeart/2005/8/layout/gear1"/>
-    <dgm:cxn modelId="{D8A904EC-260C-4371-B908-BDD3747FFD9F}" type="presParOf" srcId="{8CF0A488-F71E-4272-9A24-303F2B79395F}" destId="{DA059C0F-2DD7-4B86-9653-1FC597247497}" srcOrd="13" destOrd="0" presId="urn:microsoft.com/office/officeart/2005/8/layout/gear1"/>
-    <dgm:cxn modelId="{0D572A25-73B7-411A-B175-9CC01A57839E}" type="presParOf" srcId="{8CF0A488-F71E-4272-9A24-303F2B79395F}" destId="{5FA9BAF4-892C-4C58-96C9-8892CE071BB5}" srcOrd="14" destOrd="0" presId="urn:microsoft.com/office/officeart/2005/8/layout/gear1"/>
-    <dgm:cxn modelId="{AA3BBA7B-B22E-414A-91A2-312E2CA61186}" type="presParOf" srcId="{8CF0A488-F71E-4272-9A24-303F2B79395F}" destId="{1586828D-3546-4077-A3EE-360051504D71}" srcOrd="15" destOrd="0" presId="urn:microsoft.com/office/officeart/2005/8/layout/gear1"/>
+    <dgm:cxn modelId="{F856E510-5571-436E-9C5E-6C5FB95EDF3D}" type="presOf" srcId="{AAA86462-AE16-4FEA-8AF3-BA9A2C504D07}" destId="{D4998C81-76E6-4D12-B378-82F96096F70A}" srcOrd="0" destOrd="1" presId="urn:microsoft.com/office/officeart/2005/8/layout/gear1"/>
+    <dgm:cxn modelId="{C568F812-7026-4CCB-942E-ED4D617D0305}" srcId="{CB683ED3-AA54-43B8-AEF8-4A7EA1E4E169}" destId="{72310635-50C2-4AC8-8106-7A7B7C0F2835}" srcOrd="1" destOrd="0" parTransId="{A0DFE743-5883-4217-956D-F2329D5C6370}" sibTransId="{B93B130D-8729-4E8F-82D1-7DA8C8D45505}"/>
+    <dgm:cxn modelId="{EF247714-A0B8-4C07-9A7C-673104181E7F}" type="presOf" srcId="{88B7F584-B907-48D8-8D8A-344F6B6628D2}" destId="{C30D21E8-4557-4AA3-8698-F2E695EB884C}" srcOrd="0" destOrd="0" presId="urn:microsoft.com/office/officeart/2005/8/layout/gear1"/>
+    <dgm:cxn modelId="{E1B85E21-7321-4D24-BDF3-D23DBB6BC8D7}" type="presOf" srcId="{A329BDF0-7B5D-4AF2-976F-D255AA1FBC67}" destId="{67C7B691-AE99-4A4B-A98D-D90055216AAA}" srcOrd="1" destOrd="0" presId="urn:microsoft.com/office/officeart/2005/8/layout/gear1"/>
+    <dgm:cxn modelId="{0573E324-4074-43EA-9A28-E408C1950690}" srcId="{A329BDF0-7B5D-4AF2-976F-D255AA1FBC67}" destId="{AAA86462-AE16-4FEA-8AF3-BA9A2C504D07}" srcOrd="1" destOrd="0" parTransId="{8345894B-8A49-49FC-8219-D1C8C3109C95}" sibTransId="{75944135-7DAA-4D53-8EEF-1E48294379EE}"/>
+    <dgm:cxn modelId="{FBF56F25-610E-4471-A302-29DCAFD466E0}" srcId="{D181B5ED-DA18-4FE0-A6C2-257A606BE61B}" destId="{6FC165F1-D7D2-4A64-A200-B793C41AED32}" srcOrd="1" destOrd="0" parTransId="{E9C8D743-1349-4E94-A893-C1E4574B3B30}" sibTransId="{8BA372E8-9063-4675-A445-B72F61F97A7F}"/>
+    <dgm:cxn modelId="{6C30A028-0E61-42D0-9524-0BFD44098E67}" type="presOf" srcId="{987BD4C4-22A5-443F-B954-6A13CDF793B2}" destId="{CEA83A1E-5867-4263-AC64-2D29153CCED5}" srcOrd="0" destOrd="0" presId="urn:microsoft.com/office/officeart/2005/8/layout/gear1"/>
+    <dgm:cxn modelId="{8A9E1B2E-B569-4876-A60F-AF3C6A7BFB29}" type="presOf" srcId="{2E8B6977-976E-482A-AB52-0377E8D9FFB5}" destId="{2B918095-2C7B-4C93-9C1E-A4DEA84BD8E8}" srcOrd="0" destOrd="0" presId="urn:microsoft.com/office/officeart/2005/8/layout/gear1"/>
+    <dgm:cxn modelId="{8A861D31-F5EA-4FF9-B3EE-19905B5DA2A2}" type="presOf" srcId="{39796BFF-7E6C-4DA2-86DD-A28D772EA49C}" destId="{BDD998CA-DE61-4156-978E-1A4FD2D91C6F}" srcOrd="0" destOrd="0" presId="urn:microsoft.com/office/officeart/2005/8/layout/gear1"/>
+    <dgm:cxn modelId="{0767E134-2DD5-4261-8A54-763CB2E52127}" type="presOf" srcId="{6FC165F1-D7D2-4A64-A200-B793C41AED32}" destId="{BDD998CA-DE61-4156-978E-1A4FD2D91C6F}" srcOrd="0" destOrd="1" presId="urn:microsoft.com/office/officeart/2005/8/layout/gear1"/>
+    <dgm:cxn modelId="{40335338-6ACD-43F7-A1DD-75A7E58D1469}" type="presOf" srcId="{81E866CD-28A9-44F9-9707-D2DC1BECC927}" destId="{599DA31D-28AB-41F5-9A40-5CD1A2A4EEA2}" srcOrd="0" destOrd="0" presId="urn:microsoft.com/office/officeart/2005/8/layout/gear1"/>
+    <dgm:cxn modelId="{DC29F239-86B5-4BCF-B7FC-AA106AF2C2FE}" type="presOf" srcId="{519384AE-C19D-44FD-B369-9D1A0BD97F05}" destId="{D4998C81-76E6-4D12-B378-82F96096F70A}" srcOrd="0" destOrd="0" presId="urn:microsoft.com/office/officeart/2005/8/layout/gear1"/>
+    <dgm:cxn modelId="{8CB36F3A-D690-495C-BE8D-EFD16D34AA0E}" type="presOf" srcId="{A329BDF0-7B5D-4AF2-976F-D255AA1FBC67}" destId="{CEC9D55E-0D2F-48D7-A161-7E440D14CFFE}" srcOrd="0" destOrd="0" presId="urn:microsoft.com/office/officeart/2005/8/layout/gear1"/>
+    <dgm:cxn modelId="{CF05AF3F-B7DA-45CF-8CAD-F398D91089FA}" srcId="{987BD4C4-22A5-443F-B954-6A13CDF793B2}" destId="{CB683ED3-AA54-43B8-AEF8-4A7EA1E4E169}" srcOrd="1" destOrd="0" parTransId="{5BD7F532-5354-45B2-B75D-AE10C0318DB2}" sibTransId="{2E8B6977-976E-482A-AB52-0377E8D9FFB5}"/>
+    <dgm:cxn modelId="{FF8B135E-537C-44BA-9C39-6EAB8320EC88}" type="presOf" srcId="{D181B5ED-DA18-4FE0-A6C2-257A606BE61B}" destId="{B9B90B7C-3ECD-432C-A7F9-46A0C04E0762}" srcOrd="0" destOrd="0" presId="urn:microsoft.com/office/officeart/2005/8/layout/gear1"/>
+    <dgm:cxn modelId="{C077235E-78F3-4869-BC11-3708F2187E2D}" type="presOf" srcId="{CB683ED3-AA54-43B8-AEF8-4A7EA1E4E169}" destId="{33F2D945-C4F1-4DF7-8F62-581EB89B3419}" srcOrd="2" destOrd="0" presId="urn:microsoft.com/office/officeart/2005/8/layout/gear1"/>
+    <dgm:cxn modelId="{B9D41B65-8E01-40F8-AC6D-ED678644439D}" srcId="{CB683ED3-AA54-43B8-AEF8-4A7EA1E4E169}" destId="{A9DC3AD1-D5D8-4464-B8F6-F8C7539BC9C4}" srcOrd="0" destOrd="0" parTransId="{B58C0A7D-C5F4-4F02-B8CC-195277A51BC3}" sibTransId="{3AD5D78C-3E62-4F33-811C-F7C682F69C1A}"/>
+    <dgm:cxn modelId="{7F832E6A-E112-4014-8A34-429F0856F2E5}" type="presOf" srcId="{D181B5ED-DA18-4FE0-A6C2-257A606BE61B}" destId="{83B2D239-5D32-4782-98EB-DF04C5BFF45B}" srcOrd="2" destOrd="0" presId="urn:microsoft.com/office/officeart/2005/8/layout/gear1"/>
+    <dgm:cxn modelId="{5E0B9F4E-3A0C-476B-89AA-FE3ED30441F1}" type="presOf" srcId="{A329BDF0-7B5D-4AF2-976F-D255AA1FBC67}" destId="{88BD5829-C90F-44A3-9077-DECD74E8A224}" srcOrd="3" destOrd="0" presId="urn:microsoft.com/office/officeart/2005/8/layout/gear1"/>
+    <dgm:cxn modelId="{F213BB51-005A-4048-B2A2-CA37F42E22DA}" srcId="{D181B5ED-DA18-4FE0-A6C2-257A606BE61B}" destId="{39796BFF-7E6C-4DA2-86DD-A28D772EA49C}" srcOrd="0" destOrd="0" parTransId="{E5A844FF-C808-483B-89B4-B14EC65A0BBD}" sibTransId="{3D3CBBE8-459D-4050-8E4B-F63F393A609E}"/>
+    <dgm:cxn modelId="{AE75267A-4845-4744-AB23-0AFF54F2A297}" type="presOf" srcId="{D181B5ED-DA18-4FE0-A6C2-257A606BE61B}" destId="{6E7EFE10-0CA1-4860-A847-BEA10428F85E}" srcOrd="1" destOrd="0" presId="urn:microsoft.com/office/officeart/2005/8/layout/gear1"/>
+    <dgm:cxn modelId="{F8A83681-E1AE-4015-94AE-08D2A5F18681}" type="presOf" srcId="{CB683ED3-AA54-43B8-AEF8-4A7EA1E4E169}" destId="{23F0D49E-29C9-4BE3-85CF-FBDA0C6E8BA2}" srcOrd="1" destOrd="0" presId="urn:microsoft.com/office/officeart/2005/8/layout/gear1"/>
+    <dgm:cxn modelId="{6574F3B0-F6C9-4D75-8789-956E8D1A4A01}" srcId="{987BD4C4-22A5-443F-B954-6A13CDF793B2}" destId="{D181B5ED-DA18-4FE0-A6C2-257A606BE61B}" srcOrd="0" destOrd="0" parTransId="{0E4E4113-0D7D-48AA-91EB-ADBF0D1B61F1}" sibTransId="{81E866CD-28A9-44F9-9707-D2DC1BECC927}"/>
+    <dgm:cxn modelId="{E75359BB-B2AF-4A8D-B519-D85C607D2927}" type="presOf" srcId="{72310635-50C2-4AC8-8106-7A7B7C0F2835}" destId="{21B43C4B-550B-45AE-9733-FE0D3441DF38}" srcOrd="0" destOrd="1" presId="urn:microsoft.com/office/officeart/2005/8/layout/gear1"/>
+    <dgm:cxn modelId="{2673A0C5-3E10-4A96-BCB1-671302F38BC0}" srcId="{987BD4C4-22A5-443F-B954-6A13CDF793B2}" destId="{A329BDF0-7B5D-4AF2-976F-D255AA1FBC67}" srcOrd="2" destOrd="0" parTransId="{3DDD165F-A26F-4AF9-908E-C8FBCFFAF7C0}" sibTransId="{88B7F584-B907-48D8-8D8A-344F6B6628D2}"/>
+    <dgm:cxn modelId="{70496BC8-01F6-49B4-AD6D-A0D9265B655B}" type="presOf" srcId="{A9DC3AD1-D5D8-4464-B8F6-F8C7539BC9C4}" destId="{21B43C4B-550B-45AE-9733-FE0D3441DF38}" srcOrd="0" destOrd="0" presId="urn:microsoft.com/office/officeart/2005/8/layout/gear1"/>
+    <dgm:cxn modelId="{0093D0D2-620B-473F-81B3-2961609920AE}" srcId="{A329BDF0-7B5D-4AF2-976F-D255AA1FBC67}" destId="{519384AE-C19D-44FD-B369-9D1A0BD97F05}" srcOrd="0" destOrd="0" parTransId="{B1D6344A-7357-426A-B4B9-9C5B3236FC9A}" sibTransId="{A90B41A2-FFF8-4D2F-8EDC-E5F30182E909}"/>
+    <dgm:cxn modelId="{095587DA-9386-4110-9ADF-444338306956}" type="presOf" srcId="{CB683ED3-AA54-43B8-AEF8-4A7EA1E4E169}" destId="{A8188B7F-A7B3-4C50-9AB4-15BA141D4FD6}" srcOrd="0" destOrd="0" presId="urn:microsoft.com/office/officeart/2005/8/layout/gear1"/>
+    <dgm:cxn modelId="{901A9DFD-7C5A-43E5-92F8-FE9979C04702}" type="presOf" srcId="{A329BDF0-7B5D-4AF2-976F-D255AA1FBC67}" destId="{46B5A6CF-51F5-4627-8A95-7981E0697951}" srcOrd="2" destOrd="0" presId="urn:microsoft.com/office/officeart/2005/8/layout/gear1"/>
+    <dgm:cxn modelId="{46830E87-F3EF-47EA-87D4-A8E6F791EBB8}" type="presParOf" srcId="{CEA83A1E-5867-4263-AC64-2D29153CCED5}" destId="{B9B90B7C-3ECD-432C-A7F9-46A0C04E0762}" srcOrd="0" destOrd="0" presId="urn:microsoft.com/office/officeart/2005/8/layout/gear1"/>
+    <dgm:cxn modelId="{EB4F0A32-7A55-4C2B-AABE-CBD4D1B5203E}" type="presParOf" srcId="{CEA83A1E-5867-4263-AC64-2D29153CCED5}" destId="{6E7EFE10-0CA1-4860-A847-BEA10428F85E}" srcOrd="1" destOrd="0" presId="urn:microsoft.com/office/officeart/2005/8/layout/gear1"/>
+    <dgm:cxn modelId="{0A8852A3-639A-4A74-97C6-B37DCF654B8A}" type="presParOf" srcId="{CEA83A1E-5867-4263-AC64-2D29153CCED5}" destId="{83B2D239-5D32-4782-98EB-DF04C5BFF45B}" srcOrd="2" destOrd="0" presId="urn:microsoft.com/office/officeart/2005/8/layout/gear1"/>
+    <dgm:cxn modelId="{F16D91C0-0179-4B3C-87CE-9C2C050420D4}" type="presParOf" srcId="{CEA83A1E-5867-4263-AC64-2D29153CCED5}" destId="{BDD998CA-DE61-4156-978E-1A4FD2D91C6F}" srcOrd="3" destOrd="0" presId="urn:microsoft.com/office/officeart/2005/8/layout/gear1"/>
+    <dgm:cxn modelId="{0164C016-22A2-4C65-AC3A-D0A22A20918C}" type="presParOf" srcId="{CEA83A1E-5867-4263-AC64-2D29153CCED5}" destId="{A8188B7F-A7B3-4C50-9AB4-15BA141D4FD6}" srcOrd="4" destOrd="0" presId="urn:microsoft.com/office/officeart/2005/8/layout/gear1"/>
+    <dgm:cxn modelId="{560DBD1C-B399-4D1E-9C6C-CCBCA1736BA7}" type="presParOf" srcId="{CEA83A1E-5867-4263-AC64-2D29153CCED5}" destId="{23F0D49E-29C9-4BE3-85CF-FBDA0C6E8BA2}" srcOrd="5" destOrd="0" presId="urn:microsoft.com/office/officeart/2005/8/layout/gear1"/>
+    <dgm:cxn modelId="{CF681DA7-02FB-47CC-8119-CBA5CA963252}" type="presParOf" srcId="{CEA83A1E-5867-4263-AC64-2D29153CCED5}" destId="{33F2D945-C4F1-4DF7-8F62-581EB89B3419}" srcOrd="6" destOrd="0" presId="urn:microsoft.com/office/officeart/2005/8/layout/gear1"/>
+    <dgm:cxn modelId="{1D4D1FEF-0A42-45E8-8AA9-043E32207D0D}" type="presParOf" srcId="{CEA83A1E-5867-4263-AC64-2D29153CCED5}" destId="{21B43C4B-550B-45AE-9733-FE0D3441DF38}" srcOrd="7" destOrd="0" presId="urn:microsoft.com/office/officeart/2005/8/layout/gear1"/>
+    <dgm:cxn modelId="{F01E5ECF-8109-4769-9F83-C502D2D92B42}" type="presParOf" srcId="{CEA83A1E-5867-4263-AC64-2D29153CCED5}" destId="{CEC9D55E-0D2F-48D7-A161-7E440D14CFFE}" srcOrd="8" destOrd="0" presId="urn:microsoft.com/office/officeart/2005/8/layout/gear1"/>
+    <dgm:cxn modelId="{3EAB265C-F32F-429B-A7DD-00E7A3631CA2}" type="presParOf" srcId="{CEA83A1E-5867-4263-AC64-2D29153CCED5}" destId="{67C7B691-AE99-4A4B-A98D-D90055216AAA}" srcOrd="9" destOrd="0" presId="urn:microsoft.com/office/officeart/2005/8/layout/gear1"/>
+    <dgm:cxn modelId="{3E96A742-1BDF-442A-B2F1-243A2481114F}" type="presParOf" srcId="{CEA83A1E-5867-4263-AC64-2D29153CCED5}" destId="{46B5A6CF-51F5-4627-8A95-7981E0697951}" srcOrd="10" destOrd="0" presId="urn:microsoft.com/office/officeart/2005/8/layout/gear1"/>
+    <dgm:cxn modelId="{AD44A9D7-FD08-4DDA-BB15-A2408BAF27EB}" type="presParOf" srcId="{CEA83A1E-5867-4263-AC64-2D29153CCED5}" destId="{88BD5829-C90F-44A3-9077-DECD74E8A224}" srcOrd="11" destOrd="0" presId="urn:microsoft.com/office/officeart/2005/8/layout/gear1"/>
+    <dgm:cxn modelId="{96792FBB-EE88-4C6B-9A2B-4EB1D51BE3C8}" type="presParOf" srcId="{CEA83A1E-5867-4263-AC64-2D29153CCED5}" destId="{D4998C81-76E6-4D12-B378-82F96096F70A}" srcOrd="12" destOrd="0" presId="urn:microsoft.com/office/officeart/2005/8/layout/gear1"/>
+    <dgm:cxn modelId="{83FE2B9E-DFC3-48C0-8657-17DA877737A7}" type="presParOf" srcId="{CEA83A1E-5867-4263-AC64-2D29153CCED5}" destId="{599DA31D-28AB-41F5-9A40-5CD1A2A4EEA2}" srcOrd="13" destOrd="0" presId="urn:microsoft.com/office/officeart/2005/8/layout/gear1"/>
+    <dgm:cxn modelId="{004D50F1-5728-4AA2-9679-4FB4C5E59AAD}" type="presParOf" srcId="{CEA83A1E-5867-4263-AC64-2D29153CCED5}" destId="{2B918095-2C7B-4C93-9C1E-A4DEA84BD8E8}" srcOrd="14" destOrd="0" presId="urn:microsoft.com/office/officeart/2005/8/layout/gear1"/>
+    <dgm:cxn modelId="{C0B3CB0A-F313-432F-A889-03D335B6852B}" type="presParOf" srcId="{CEA83A1E-5867-4263-AC64-2D29153CCED5}" destId="{C30D21E8-4557-4AA3-8698-F2E695EB884C}" srcOrd="15" destOrd="0" presId="urn:microsoft.com/office/officeart/2005/8/layout/gear1"/>
   </dgm:cxnLst>
   <dgm:bg/>
   <dgm:whole/>
@@ -1509,45 +1438,76 @@
       <dsp:cNvGrpSpPr/>
     </dsp:nvGrpSpPr>
     <dsp:grpSpPr/>
-    <dsp:sp modelId="{F0CDFD12-6093-457B-A03A-70B11DF75411}">
+    <dsp:sp modelId="{B9B90B7C-3ECD-432C-A7F9-46A0C04E0762}">
       <dsp:nvSpPr>
         <dsp:cNvPr id="0" name=""/>
         <dsp:cNvSpPr/>
       </dsp:nvSpPr>
       <dsp:spPr>
         <a:xfrm>
-          <a:off x="3223260" y="3299459"/>
-          <a:ext cx="3939540" cy="3939540"/>
+          <a:off x="4438996" y="3291840"/>
+          <a:ext cx="4023360" cy="4023360"/>
         </a:xfrm>
         <a:prstGeom prst="gear9">
           <a:avLst/>
         </a:prstGeom>
-        <a:solidFill>
-          <a:schemeClr val="accent3">
-            <a:hueOff val="0"/>
-            <a:satOff val="0"/>
-            <a:lumOff val="0"/>
-            <a:alphaOff val="0"/>
-          </a:schemeClr>
-        </a:solidFill>
+        <a:gradFill rotWithShape="0">
+          <a:gsLst>
+            <a:gs pos="0">
+              <a:schemeClr val="accent3">
+                <a:hueOff val="0"/>
+                <a:satOff val="0"/>
+                <a:lumOff val="0"/>
+                <a:alphaOff val="0"/>
+                <a:satMod val="103000"/>
+                <a:lumMod val="102000"/>
+                <a:tint val="94000"/>
+              </a:schemeClr>
+            </a:gs>
+            <a:gs pos="50000">
+              <a:schemeClr val="accent3">
+                <a:hueOff val="0"/>
+                <a:satOff val="0"/>
+                <a:lumOff val="0"/>
+                <a:alphaOff val="0"/>
+                <a:satMod val="110000"/>
+                <a:lumMod val="100000"/>
+                <a:shade val="100000"/>
+              </a:schemeClr>
+            </a:gs>
+            <a:gs pos="100000">
+              <a:schemeClr val="accent3">
+                <a:hueOff val="0"/>
+                <a:satOff val="0"/>
+                <a:lumOff val="0"/>
+                <a:alphaOff val="0"/>
+                <a:lumMod val="99000"/>
+                <a:satMod val="120000"/>
+                <a:shade val="78000"/>
+              </a:schemeClr>
+            </a:gs>
+          </a:gsLst>
+          <a:lin ang="5400000" scaled="0"/>
+        </a:gradFill>
         <a:ln>
           <a:noFill/>
         </a:ln>
-        <a:effectLst/>
-        <a:sp3d extrusionH="381000" contourW="38100" prstMaterial="matte">
-          <a:contourClr>
-            <a:schemeClr val="lt1"/>
-          </a:contourClr>
-        </a:sp3d>
+        <a:effectLst>
+          <a:outerShdw blurRad="57150" dist="19050" dir="5400000" algn="ctr" rotWithShape="0">
+            <a:srgbClr val="000000">
+              <a:alpha val="63000"/>
+            </a:srgbClr>
+          </a:outerShdw>
+        </a:effectLst>
       </dsp:spPr>
       <dsp:style>
         <a:lnRef idx="0">
           <a:scrgbClr r="0" g="0" b="0"/>
         </a:lnRef>
-        <a:fillRef idx="1">
+        <a:fillRef idx="3">
           <a:scrgbClr r="0" g="0" b="0"/>
         </a:fillRef>
-        <a:effectRef idx="0">
+        <a:effectRef idx="3">
           <a:scrgbClr r="0" g="0" b="0"/>
         </a:effectRef>
         <a:fontRef idx="minor">
@@ -1555,12 +1515,12 @@
         </a:fontRef>
       </dsp:style>
       <dsp:txBody>
-        <a:bodyPr spcFirstLastPara="0" vert="horz" wrap="square" lIns="30480" tIns="30480" rIns="30480" bIns="30480" numCol="1" spcCol="1270" anchor="ctr" anchorCtr="0">
+        <a:bodyPr spcFirstLastPara="0" vert="horz" wrap="square" lIns="35560" tIns="35560" rIns="35560" bIns="35560" numCol="1" spcCol="1270" anchor="ctr" anchorCtr="0">
           <a:noAutofit/>
         </a:bodyPr>
         <a:lstStyle/>
         <a:p>
-          <a:pPr marL="0" lvl="0" indent="0" algn="ctr" defTabSz="1066800" latinLnBrk="1">
+          <a:pPr marL="0" lvl="0" indent="0" algn="ctr" defTabSz="1244600" latinLnBrk="1">
             <a:lnSpc>
               <a:spcPct val="90000"/>
             </a:lnSpc>
@@ -1573,30 +1533,26 @@
             <a:buNone/>
           </a:pPr>
           <a:r>
-            <a:rPr lang="en-US" altLang="ko-KR" sz="2400" b="1" u="sng" kern="1200" dirty="0">
-              <a:latin typeface="+mj-lt"/>
-            </a:rPr>
+            <a:rPr lang="en-US" altLang="ko-KR" sz="2800" b="1" u="sng" kern="1200" dirty="0"/>
             <a:t>TypeScript Class</a:t>
           </a:r>
-          <a:endParaRPr lang="ko-KR" altLang="en-US" sz="2400" b="1" u="sng" kern="1200" dirty="0">
-            <a:latin typeface="+mj-lt"/>
-          </a:endParaRPr>
+          <a:endParaRPr lang="ko-KR" altLang="en-US" sz="2800" b="1" u="sng" kern="1200" dirty="0"/>
         </a:p>
       </dsp:txBody>
       <dsp:txXfrm>
-        <a:off x="4015283" y="4222277"/>
-        <a:ext cx="2355494" cy="2025005"/>
+        <a:off x="5247870" y="4234293"/>
+        <a:ext cx="2405612" cy="2068090"/>
       </dsp:txXfrm>
     </dsp:sp>
-    <dsp:sp modelId="{78084B7A-C218-4C4A-A8C6-9D1C1C820ABF}">
+    <dsp:sp modelId="{BDD998CA-DE61-4156-978E-1A4FD2D91C6F}">
       <dsp:nvSpPr>
         <dsp:cNvPr id="0" name=""/>
         <dsp:cNvSpPr/>
       </dsp:nvSpPr>
       <dsp:spPr>
         <a:xfrm>
-          <a:off x="2721864" y="5734812"/>
-          <a:ext cx="2506980" cy="1504188"/>
+          <a:off x="3926932" y="5779007"/>
+          <a:ext cx="2560320" cy="1536192"/>
         </a:xfrm>
         <a:prstGeom prst="roundRect">
           <a:avLst>
@@ -1625,7 +1581,6 @@
           <a:miter lim="800000"/>
         </a:ln>
         <a:effectLst/>
-        <a:sp3d z="57150" extrusionH="63500" prstMaterial="matte"/>
       </dsp:spPr>
       <dsp:style>
         <a:lnRef idx="1">
@@ -1634,7 +1589,7 @@
         <a:fillRef idx="1">
           <a:scrgbClr r="0" g="0" b="0"/>
         </a:fillRef>
-        <a:effectRef idx="0">
+        <a:effectRef idx="2">
           <a:scrgbClr r="0" g="0" b="0"/>
         </a:effectRef>
         <a:fontRef idx="minor"/>
@@ -1658,14 +1613,10 @@
             <a:buChar char="•"/>
           </a:pPr>
           <a:r>
-            <a:rPr lang="en-US" altLang="ko-KR" sz="2000" b="0" kern="1200" dirty="0">
-              <a:latin typeface="+mj-lt"/>
-            </a:rPr>
+            <a:rPr lang="en-US" altLang="ko-KR" sz="2000" kern="1200" dirty="0"/>
             <a:t>Class Chatbot</a:t>
           </a:r>
-          <a:endParaRPr lang="ko-KR" altLang="en-US" sz="2000" b="0" kern="1200" dirty="0">
-            <a:latin typeface="+mj-lt"/>
-          </a:endParaRPr>
+          <a:endParaRPr lang="ko-KR" altLang="en-US" sz="2000" kern="1200" dirty="0"/>
         </a:p>
         <a:p>
           <a:pPr marL="228600" lvl="1" indent="-228600" algn="l" defTabSz="889000" latinLnBrk="1">
@@ -1681,60 +1632,87 @@
             <a:buChar char="•"/>
           </a:pPr>
           <a:r>
-            <a:rPr lang="en-US" altLang="ko-KR" sz="2000" b="0" kern="1200" dirty="0">
-              <a:latin typeface="+mj-lt"/>
-            </a:rPr>
+            <a:rPr lang="en-US" altLang="ko-KR" sz="2000" kern="1200" dirty="0"/>
             <a:t>Multi Agent Orchestration</a:t>
           </a:r>
-          <a:endParaRPr lang="ko-KR" altLang="en-US" sz="2000" b="0" kern="1200" dirty="0">
-            <a:latin typeface="+mj-lt"/>
-          </a:endParaRPr>
+          <a:endParaRPr lang="ko-KR" altLang="en-US" sz="2000" kern="1200" dirty="0"/>
         </a:p>
       </dsp:txBody>
       <dsp:txXfrm>
-        <a:off x="2765920" y="5778868"/>
-        <a:ext cx="2418868" cy="1416076"/>
+        <a:off x="3971926" y="5824001"/>
+        <a:ext cx="2470332" cy="1446204"/>
       </dsp:txXfrm>
     </dsp:sp>
-    <dsp:sp modelId="{0660A873-9E4D-4DDA-AF38-85B4EFF09DF3}">
+    <dsp:sp modelId="{A8188B7F-A7B3-4C50-9AB4-15BA141D4FD6}">
       <dsp:nvSpPr>
         <dsp:cNvPr id="0" name=""/>
         <dsp:cNvSpPr/>
       </dsp:nvSpPr>
       <dsp:spPr>
         <a:xfrm>
-          <a:off x="931164" y="2368295"/>
-          <a:ext cx="2865120" cy="2865120"/>
+          <a:off x="2098132" y="2340864"/>
+          <a:ext cx="2926080" cy="2926080"/>
         </a:xfrm>
         <a:prstGeom prst="gear6">
           <a:avLst/>
         </a:prstGeom>
-        <a:solidFill>
-          <a:schemeClr val="accent3">
-            <a:hueOff val="2058582"/>
-            <a:satOff val="12356"/>
-            <a:lumOff val="9413"/>
-            <a:alphaOff val="0"/>
-          </a:schemeClr>
-        </a:solidFill>
+        <a:gradFill rotWithShape="0">
+          <a:gsLst>
+            <a:gs pos="0">
+              <a:schemeClr val="accent3">
+                <a:hueOff val="2058582"/>
+                <a:satOff val="12356"/>
+                <a:lumOff val="9413"/>
+                <a:alphaOff val="0"/>
+                <a:satMod val="103000"/>
+                <a:lumMod val="102000"/>
+                <a:tint val="94000"/>
+              </a:schemeClr>
+            </a:gs>
+            <a:gs pos="50000">
+              <a:schemeClr val="accent3">
+                <a:hueOff val="2058582"/>
+                <a:satOff val="12356"/>
+                <a:lumOff val="9413"/>
+                <a:alphaOff val="0"/>
+                <a:satMod val="110000"/>
+                <a:lumMod val="100000"/>
+                <a:shade val="100000"/>
+              </a:schemeClr>
+            </a:gs>
+            <a:gs pos="100000">
+              <a:schemeClr val="accent3">
+                <a:hueOff val="2058582"/>
+                <a:satOff val="12356"/>
+                <a:lumOff val="9413"/>
+                <a:alphaOff val="0"/>
+                <a:lumMod val="99000"/>
+                <a:satMod val="120000"/>
+                <a:shade val="78000"/>
+              </a:schemeClr>
+            </a:gs>
+          </a:gsLst>
+          <a:lin ang="5400000" scaled="0"/>
+        </a:gradFill>
         <a:ln>
           <a:noFill/>
         </a:ln>
-        <a:effectLst/>
-        <a:sp3d extrusionH="381000" contourW="38100" prstMaterial="matte">
-          <a:contourClr>
-            <a:schemeClr val="lt1"/>
-          </a:contourClr>
-        </a:sp3d>
+        <a:effectLst>
+          <a:outerShdw blurRad="57150" dist="19050" dir="5400000" algn="ctr" rotWithShape="0">
+            <a:srgbClr val="000000">
+              <a:alpha val="63000"/>
+            </a:srgbClr>
+          </a:outerShdw>
+        </a:effectLst>
       </dsp:spPr>
       <dsp:style>
         <a:lnRef idx="0">
           <a:scrgbClr r="0" g="0" b="0"/>
         </a:lnRef>
-        <a:fillRef idx="1">
+        <a:fillRef idx="3">
           <a:scrgbClr r="0" g="0" b="0"/>
         </a:fillRef>
-        <a:effectRef idx="0">
+        <a:effectRef idx="3">
           <a:scrgbClr r="0" g="0" b="0"/>
         </a:effectRef>
         <a:fontRef idx="minor">
@@ -1742,12 +1720,12 @@
         </a:fontRef>
       </dsp:style>
       <dsp:txBody>
-        <a:bodyPr spcFirstLastPara="0" vert="horz" wrap="square" lIns="30480" tIns="30480" rIns="30480" bIns="30480" numCol="1" spcCol="1270" anchor="ctr" anchorCtr="0">
+        <a:bodyPr spcFirstLastPara="0" vert="horz" wrap="square" lIns="35560" tIns="35560" rIns="35560" bIns="35560" numCol="1" spcCol="1270" anchor="ctr" anchorCtr="0">
           <a:noAutofit/>
         </a:bodyPr>
         <a:lstStyle/>
         <a:p>
-          <a:pPr marL="0" lvl="0" indent="0" algn="ctr" defTabSz="1066800" latinLnBrk="1">
+          <a:pPr marL="0" lvl="0" indent="0" algn="ctr" defTabSz="1244600" latinLnBrk="1">
             <a:lnSpc>
               <a:spcPct val="90000"/>
             </a:lnSpc>
@@ -1760,30 +1738,26 @@
             <a:buNone/>
           </a:pPr>
           <a:r>
-            <a:rPr lang="en-US" altLang="ko-KR" sz="2400" b="1" u="sng" kern="1200" dirty="0">
-              <a:latin typeface="+mj-lt"/>
-            </a:rPr>
+            <a:rPr lang="en-US" altLang="ko-KR" sz="2800" b="1" u="sng" kern="1200" dirty="0"/>
             <a:t>Swagger</a:t>
           </a:r>
-          <a:endParaRPr lang="ko-KR" altLang="en-US" sz="2400" b="1" u="sng" kern="1200" dirty="0">
-            <a:latin typeface="+mj-lt"/>
-          </a:endParaRPr>
+          <a:endParaRPr lang="ko-KR" altLang="en-US" sz="2800" b="1" u="sng" kern="1200" dirty="0"/>
         </a:p>
       </dsp:txBody>
       <dsp:txXfrm>
-        <a:off x="1652467" y="3093957"/>
-        <a:ext cx="1422514" cy="1413796"/>
+        <a:off x="2834781" y="3081966"/>
+        <a:ext cx="1452782" cy="1443876"/>
       </dsp:txXfrm>
     </dsp:sp>
-    <dsp:sp modelId="{5102CC00-C213-43E7-969D-8AAF8F8DCCE7}">
+    <dsp:sp modelId="{21B43C4B-550B-45AE-9733-FE0D3441DF38}">
       <dsp:nvSpPr>
         <dsp:cNvPr id="0" name=""/>
         <dsp:cNvSpPr/>
       </dsp:nvSpPr>
       <dsp:spPr>
         <a:xfrm>
-          <a:off x="0" y="4230624"/>
-          <a:ext cx="2506980" cy="1504188"/>
+          <a:off x="1147156" y="4242816"/>
+          <a:ext cx="2560320" cy="1536192"/>
         </a:xfrm>
         <a:prstGeom prst="roundRect">
           <a:avLst>
@@ -1812,7 +1786,6 @@
           <a:miter lim="800000"/>
         </a:ln>
         <a:effectLst/>
-        <a:sp3d z="57150" extrusionH="63500" prstMaterial="matte"/>
       </dsp:spPr>
       <dsp:style>
         <a:lnRef idx="1">
@@ -1821,18 +1794,18 @@
         <a:fillRef idx="1">
           <a:scrgbClr r="0" g="0" b="0"/>
         </a:fillRef>
-        <a:effectRef idx="0">
+        <a:effectRef idx="2">
           <a:scrgbClr r="0" g="0" b="0"/>
         </a:effectRef>
         <a:fontRef idx="minor"/>
       </dsp:style>
       <dsp:txBody>
-        <a:bodyPr spcFirstLastPara="0" vert="horz" wrap="square" lIns="76200" tIns="76200" rIns="76200" bIns="76200" numCol="1" spcCol="1270" anchor="t" anchorCtr="0">
+        <a:bodyPr spcFirstLastPara="0" vert="horz" wrap="square" lIns="68580" tIns="68580" rIns="68580" bIns="68580" numCol="1" spcCol="1270" anchor="t" anchorCtr="0">
           <a:noAutofit/>
         </a:bodyPr>
         <a:lstStyle/>
         <a:p>
-          <a:pPr marL="228600" lvl="1" indent="-228600" algn="l" defTabSz="889000" latinLnBrk="1">
+          <a:pPr marL="171450" lvl="1" indent="-171450" algn="l" defTabSz="800100" latinLnBrk="1">
             <a:lnSpc>
               <a:spcPct val="90000"/>
             </a:lnSpc>
@@ -1845,17 +1818,13 @@
             <a:buChar char="•"/>
           </a:pPr>
           <a:r>
-            <a:rPr lang="en-US" altLang="ko-KR" sz="2000" b="0" kern="1200" dirty="0">
-              <a:latin typeface="+mj-lt"/>
-            </a:rPr>
-            <a:t>Super AI Chatbot</a:t>
+            <a:rPr lang="en-US" altLang="ko-KR" sz="1800" kern="1200" dirty="0"/>
+            <a:t>Swagger Chatbot</a:t>
           </a:r>
-          <a:endParaRPr lang="ko-KR" altLang="en-US" sz="2000" b="0" kern="1200" dirty="0">
-            <a:latin typeface="+mj-lt"/>
-          </a:endParaRPr>
+          <a:endParaRPr lang="ko-KR" altLang="en-US" sz="1800" kern="1200" dirty="0"/>
         </a:p>
         <a:p>
-          <a:pPr marL="228600" lvl="1" indent="-228600" algn="l" defTabSz="889000" latinLnBrk="1">
+          <a:pPr marL="171450" lvl="1" indent="-171450" algn="l" defTabSz="800100" latinLnBrk="1">
             <a:lnSpc>
               <a:spcPct val="90000"/>
             </a:lnSpc>
@@ -1868,60 +1837,94 @@
             <a:buChar char="•"/>
           </a:pPr>
           <a:r>
-            <a:rPr lang="en-US" altLang="ko-KR" sz="2000" b="0" kern="1200" dirty="0">
-              <a:latin typeface="+mj-lt"/>
-            </a:rPr>
-            <a:t>Backend Developer = AI Developer</a:t>
+            <a:rPr lang="en-US" altLang="ko-KR" sz="1800" kern="1200" dirty="0"/>
+            <a:t>Backend Developer</a:t>
           </a:r>
-          <a:endParaRPr lang="ko-KR" altLang="en-US" sz="2000" b="0" kern="1200" dirty="0">
-            <a:latin typeface="+mj-lt"/>
-          </a:endParaRPr>
+          <a:br>
+            <a:rPr lang="en-US" altLang="ko-KR" sz="1800" kern="1200" dirty="0"/>
+          </a:br>
+          <a:r>
+            <a:rPr lang="en-US" altLang="ko-KR" sz="1800" kern="1200" dirty="0"/>
+            <a:t>= AI Developer</a:t>
+          </a:r>
+          <a:endParaRPr lang="ko-KR" altLang="en-US" sz="1800" kern="1200" dirty="0"/>
         </a:p>
       </dsp:txBody>
       <dsp:txXfrm>
-        <a:off x="44056" y="4274680"/>
-        <a:ext cx="2418868" cy="1416076"/>
+        <a:off x="1192150" y="4287810"/>
+        <a:ext cx="2470332" cy="1446204"/>
       </dsp:txXfrm>
     </dsp:sp>
-    <dsp:sp modelId="{B811F302-8CFA-483B-A2C3-DDE77AB0ED2C}">
+    <dsp:sp modelId="{CEC9D55E-0D2F-48D7-A161-7E440D14CFFE}">
       <dsp:nvSpPr>
         <dsp:cNvPr id="0" name=""/>
         <dsp:cNvSpPr/>
       </dsp:nvSpPr>
       <dsp:spPr>
         <a:xfrm rot="20700000">
-          <a:off x="2078719" y="315465"/>
-          <a:ext cx="2807233" cy="2807233"/>
+          <a:off x="3737035" y="322167"/>
+          <a:ext cx="2866961" cy="2866961"/>
         </a:xfrm>
         <a:prstGeom prst="gear6">
           <a:avLst/>
         </a:prstGeom>
-        <a:solidFill>
-          <a:schemeClr val="accent3">
-            <a:hueOff val="4117163"/>
-            <a:satOff val="24712"/>
-            <a:lumOff val="18825"/>
-            <a:alphaOff val="0"/>
-          </a:schemeClr>
-        </a:solidFill>
+        <a:gradFill rotWithShape="0">
+          <a:gsLst>
+            <a:gs pos="0">
+              <a:schemeClr val="accent3">
+                <a:hueOff val="4117163"/>
+                <a:satOff val="24712"/>
+                <a:lumOff val="18825"/>
+                <a:alphaOff val="0"/>
+                <a:satMod val="103000"/>
+                <a:lumMod val="102000"/>
+                <a:tint val="94000"/>
+              </a:schemeClr>
+            </a:gs>
+            <a:gs pos="50000">
+              <a:schemeClr val="accent3">
+                <a:hueOff val="4117163"/>
+                <a:satOff val="24712"/>
+                <a:lumOff val="18825"/>
+                <a:alphaOff val="0"/>
+                <a:satMod val="110000"/>
+                <a:lumMod val="100000"/>
+                <a:shade val="100000"/>
+              </a:schemeClr>
+            </a:gs>
+            <a:gs pos="100000">
+              <a:schemeClr val="accent3">
+                <a:hueOff val="4117163"/>
+                <a:satOff val="24712"/>
+                <a:lumOff val="18825"/>
+                <a:alphaOff val="0"/>
+                <a:lumMod val="99000"/>
+                <a:satMod val="120000"/>
+                <a:shade val="78000"/>
+              </a:schemeClr>
+            </a:gs>
+          </a:gsLst>
+          <a:lin ang="5400000" scaled="0"/>
+        </a:gradFill>
         <a:ln>
           <a:noFill/>
         </a:ln>
-        <a:effectLst/>
-        <a:sp3d extrusionH="381000" contourW="38100" prstMaterial="matte">
-          <a:contourClr>
-            <a:schemeClr val="lt1"/>
-          </a:contourClr>
-        </a:sp3d>
+        <a:effectLst>
+          <a:outerShdw blurRad="57150" dist="19050" dir="5400000" algn="ctr" rotWithShape="0">
+            <a:srgbClr val="000000">
+              <a:alpha val="63000"/>
+            </a:srgbClr>
+          </a:outerShdw>
+        </a:effectLst>
       </dsp:spPr>
       <dsp:style>
         <a:lnRef idx="0">
           <a:scrgbClr r="0" g="0" b="0"/>
         </a:lnRef>
-        <a:fillRef idx="1">
+        <a:fillRef idx="3">
           <a:scrgbClr r="0" g="0" b="0"/>
         </a:fillRef>
-        <a:effectRef idx="0">
+        <a:effectRef idx="3">
           <a:scrgbClr r="0" g="0" b="0"/>
         </a:effectRef>
         <a:fontRef idx="minor">
@@ -1929,12 +1932,12 @@
         </a:fontRef>
       </dsp:style>
       <dsp:txBody>
-        <a:bodyPr spcFirstLastPara="0" vert="horz" wrap="square" lIns="30480" tIns="30480" rIns="30480" bIns="30480" numCol="1" spcCol="1270" anchor="ctr" anchorCtr="0">
+        <a:bodyPr spcFirstLastPara="0" vert="horz" wrap="square" lIns="35560" tIns="35560" rIns="35560" bIns="35560" numCol="1" spcCol="1270" anchor="ctr" anchorCtr="0">
           <a:noAutofit/>
         </a:bodyPr>
         <a:lstStyle/>
         <a:p>
-          <a:pPr marL="0" lvl="0" indent="0" algn="ctr" defTabSz="1066800" latinLnBrk="1">
+          <a:pPr marL="0" lvl="0" indent="0" algn="ctr" defTabSz="1244600" latinLnBrk="1">
             <a:lnSpc>
               <a:spcPct val="90000"/>
             </a:lnSpc>
@@ -1947,36 +1950,26 @@
             <a:buNone/>
           </a:pPr>
           <a:r>
-            <a:rPr lang="en-US" altLang="ko-KR" sz="2400" b="1" u="sng" kern="1200" dirty="0">
-              <a:latin typeface="+mj-lt"/>
-            </a:rPr>
-            <a:t>Function </a:t>
+            <a:rPr lang="en-US" altLang="ko-KR" sz="2800" b="1" u="sng" kern="1200" dirty="0"/>
+            <a:t>Function Calling</a:t>
           </a:r>
-          <a:r>
-            <a:rPr lang="en-US" altLang="ko-KR" sz="2400" b="1" u="sng" kern="1200" dirty="0" err="1">
-              <a:latin typeface="+mj-lt"/>
-            </a:rPr>
-            <a:t>CallingZ</a:t>
-          </a:r>
-          <a:endParaRPr lang="ko-KR" altLang="en-US" sz="2400" b="1" u="sng" kern="1200" dirty="0">
-            <a:latin typeface="+mj-lt"/>
-          </a:endParaRPr>
+          <a:endParaRPr lang="ko-KR" altLang="en-US" sz="2800" b="1" u="sng" kern="1200" dirty="0"/>
         </a:p>
       </dsp:txBody>
       <dsp:txXfrm rot="-20700000">
-        <a:off x="2694427" y="931174"/>
-        <a:ext cx="1575816" cy="1575816"/>
+        <a:off x="4365844" y="950976"/>
+        <a:ext cx="1609344" cy="1609344"/>
       </dsp:txXfrm>
     </dsp:sp>
-    <dsp:sp modelId="{ED6B4636-920E-4639-985E-A0466E34FC92}">
+    <dsp:sp modelId="{D4998C81-76E6-4D12-B378-82F96096F70A}">
       <dsp:nvSpPr>
         <dsp:cNvPr id="0" name=""/>
         <dsp:cNvSpPr/>
       </dsp:nvSpPr>
       <dsp:spPr>
         <a:xfrm>
-          <a:off x="4655820" y="1007363"/>
-          <a:ext cx="2506980" cy="1504188"/>
+          <a:off x="5902036" y="950976"/>
+          <a:ext cx="2560320" cy="1536192"/>
         </a:xfrm>
         <a:prstGeom prst="roundRect">
           <a:avLst>
@@ -2005,7 +1998,6 @@
           <a:miter lim="800000"/>
         </a:ln>
         <a:effectLst/>
-        <a:sp3d z="57150" extrusionH="63500" prstMaterial="matte"/>
       </dsp:spPr>
       <dsp:style>
         <a:lnRef idx="1">
@@ -2014,18 +2006,18 @@
         <a:fillRef idx="1">
           <a:scrgbClr r="0" g="0" b="0"/>
         </a:fillRef>
-        <a:effectRef idx="0">
+        <a:effectRef idx="2">
           <a:scrgbClr r="0" g="0" b="0"/>
         </a:effectRef>
         <a:fontRef idx="minor"/>
       </dsp:style>
       <dsp:txBody>
-        <a:bodyPr spcFirstLastPara="0" vert="horz" wrap="square" lIns="76200" tIns="76200" rIns="76200" bIns="76200" numCol="1" spcCol="1270" anchor="t" anchorCtr="0">
+        <a:bodyPr spcFirstLastPara="0" vert="horz" wrap="square" lIns="68580" tIns="68580" rIns="68580" bIns="68580" numCol="1" spcCol="1270" anchor="t" anchorCtr="0">
           <a:noAutofit/>
         </a:bodyPr>
         <a:lstStyle/>
         <a:p>
-          <a:pPr marL="228600" lvl="1" indent="-228600" algn="l" defTabSz="889000" latinLnBrk="1">
+          <a:pPr marL="171450" lvl="1" indent="-171450" algn="l" defTabSz="800100" latinLnBrk="1">
             <a:lnSpc>
               <a:spcPct val="90000"/>
             </a:lnSpc>
@@ -2038,17 +2030,13 @@
             <a:buChar char="•"/>
           </a:pPr>
           <a:r>
-            <a:rPr lang="en-US" altLang="ko-KR" sz="2000" b="0" kern="1200" dirty="0">
-              <a:latin typeface="+mj-lt"/>
-            </a:rPr>
-            <a:t>Compiler</a:t>
+            <a:rPr lang="en-US" altLang="ko-KR" sz="1800" kern="1200" dirty="0"/>
+            <a:t>Compiler Skills</a:t>
           </a:r>
-          <a:endParaRPr lang="ko-KR" altLang="en-US" sz="2000" b="0" kern="1200" dirty="0">
-            <a:latin typeface="+mj-lt"/>
-          </a:endParaRPr>
+          <a:endParaRPr lang="ko-KR" altLang="en-US" sz="1800" kern="1200" dirty="0"/>
         </a:p>
         <a:p>
-          <a:pPr marL="228600" lvl="1" indent="-228600" algn="l" defTabSz="889000" latinLnBrk="1">
+          <a:pPr marL="171450" lvl="1" indent="-171450" algn="l" defTabSz="800100" latinLnBrk="1">
             <a:lnSpc>
               <a:spcPct val="90000"/>
             </a:lnSpc>
@@ -2061,66 +2049,93 @@
             <a:buChar char="•"/>
           </a:pPr>
           <a:r>
-            <a:rPr lang="en-US" altLang="ko-KR" sz="2000" b="0" kern="1200" dirty="0">
-              <a:latin typeface="+mj-lt"/>
-            </a:rPr>
-            <a:t>Validator</a:t>
+            <a:rPr lang="en-US" altLang="ko-KR" sz="1800" kern="1200" dirty="0"/>
+            <a:t>Validation Feedback</a:t>
           </a:r>
-          <a:endParaRPr lang="ko-KR" altLang="en-US" sz="2000" b="0" kern="1200" dirty="0">
-            <a:latin typeface="+mj-lt"/>
-          </a:endParaRPr>
+          <a:endParaRPr lang="ko-KR" altLang="en-US" sz="1800" kern="1200" dirty="0"/>
         </a:p>
       </dsp:txBody>
       <dsp:txXfrm>
-        <a:off x="4699876" y="1051419"/>
-        <a:ext cx="2418868" cy="1416076"/>
+        <a:off x="5947030" y="995970"/>
+        <a:ext cx="2470332" cy="1446204"/>
       </dsp:txXfrm>
     </dsp:sp>
-    <dsp:sp modelId="{DA059C0F-2DD7-4B86-9653-1FC597247497}">
+    <dsp:sp modelId="{599DA31D-28AB-41F5-9A40-5CD1A2A4EEA2}">
       <dsp:nvSpPr>
         <dsp:cNvPr id="0" name=""/>
         <dsp:cNvSpPr/>
       </dsp:nvSpPr>
       <dsp:spPr>
         <a:xfrm>
-          <a:off x="2954068" y="2685608"/>
-          <a:ext cx="5042611" cy="5042611"/>
+          <a:off x="4165131" y="2664315"/>
+          <a:ext cx="5149900" cy="5149900"/>
         </a:xfrm>
         <a:prstGeom prst="circularArrow">
           <a:avLst>
-            <a:gd name="adj1" fmla="val 4688"/>
+            <a:gd name="adj1" fmla="val 4687"/>
             <a:gd name="adj2" fmla="val 299029"/>
-            <a:gd name="adj3" fmla="val 2559607"/>
-            <a:gd name="adj4" fmla="val 15770680"/>
+            <a:gd name="adj3" fmla="val 2560958"/>
+            <a:gd name="adj4" fmla="val 15767953"/>
             <a:gd name="adj5" fmla="val 5469"/>
           </a:avLst>
         </a:prstGeom>
-        <a:solidFill>
-          <a:schemeClr val="accent3">
-            <a:hueOff val="0"/>
-            <a:satOff val="0"/>
-            <a:lumOff val="0"/>
-            <a:alphaOff val="0"/>
-          </a:schemeClr>
-        </a:solidFill>
+        <a:gradFill rotWithShape="0">
+          <a:gsLst>
+            <a:gs pos="0">
+              <a:schemeClr val="accent3">
+                <a:hueOff val="0"/>
+                <a:satOff val="0"/>
+                <a:lumOff val="0"/>
+                <a:alphaOff val="0"/>
+                <a:satMod val="103000"/>
+                <a:lumMod val="102000"/>
+                <a:tint val="94000"/>
+              </a:schemeClr>
+            </a:gs>
+            <a:gs pos="50000">
+              <a:schemeClr val="accent3">
+                <a:hueOff val="0"/>
+                <a:satOff val="0"/>
+                <a:lumOff val="0"/>
+                <a:alphaOff val="0"/>
+                <a:satMod val="110000"/>
+                <a:lumMod val="100000"/>
+                <a:shade val="100000"/>
+              </a:schemeClr>
+            </a:gs>
+            <a:gs pos="100000">
+              <a:schemeClr val="accent3">
+                <a:hueOff val="0"/>
+                <a:satOff val="0"/>
+                <a:lumOff val="0"/>
+                <a:alphaOff val="0"/>
+                <a:lumMod val="99000"/>
+                <a:satMod val="120000"/>
+                <a:shade val="78000"/>
+              </a:schemeClr>
+            </a:gs>
+          </a:gsLst>
+          <a:lin ang="5400000" scaled="0"/>
+        </a:gradFill>
         <a:ln>
           <a:noFill/>
         </a:ln>
-        <a:effectLst/>
-        <a:sp3d z="-52400" extrusionH="181000" contourW="38100" prstMaterial="matte">
-          <a:contourClr>
-            <a:schemeClr val="lt1"/>
-          </a:contourClr>
-        </a:sp3d>
+        <a:effectLst>
+          <a:outerShdw blurRad="57150" dist="19050" dir="5400000" algn="ctr" rotWithShape="0">
+            <a:srgbClr val="000000">
+              <a:alpha val="63000"/>
+            </a:srgbClr>
+          </a:outerShdw>
+        </a:effectLst>
       </dsp:spPr>
       <dsp:style>
         <a:lnRef idx="0">
           <a:scrgbClr r="0" g="0" b="0"/>
         </a:lnRef>
-        <a:fillRef idx="1">
+        <a:fillRef idx="3">
           <a:scrgbClr r="0" g="0" b="0"/>
         </a:fillRef>
-        <a:effectRef idx="0">
+        <a:effectRef idx="3">
           <a:scrgbClr r="0" g="0" b="0"/>
         </a:effectRef>
         <a:fontRef idx="minor">
@@ -2128,15 +2143,15 @@
         </a:fontRef>
       </dsp:style>
     </dsp:sp>
-    <dsp:sp modelId="{5FA9BAF4-892C-4C58-96C9-8892CE071BB5}">
+    <dsp:sp modelId="{2B918095-2C7B-4C93-9C1E-A4DEA84BD8E8}">
       <dsp:nvSpPr>
         <dsp:cNvPr id="0" name=""/>
         <dsp:cNvSpPr/>
       </dsp:nvSpPr>
       <dsp:spPr>
         <a:xfrm>
-          <a:off x="423756" y="1721613"/>
-          <a:ext cx="3663772" cy="3663772"/>
+          <a:off x="1579929" y="1680039"/>
+          <a:ext cx="3741724" cy="3741724"/>
         </a:xfrm>
         <a:prstGeom prst="leftCircularArrow">
           <a:avLst>
@@ -2147,32 +2162,63 @@
             <a:gd name="adj5" fmla="val 7527"/>
           </a:avLst>
         </a:prstGeom>
-        <a:solidFill>
-          <a:schemeClr val="accent3">
-            <a:hueOff val="2058582"/>
-            <a:satOff val="12356"/>
-            <a:lumOff val="9413"/>
-            <a:alphaOff val="0"/>
-          </a:schemeClr>
-        </a:solidFill>
+        <a:gradFill rotWithShape="0">
+          <a:gsLst>
+            <a:gs pos="0">
+              <a:schemeClr val="accent3">
+                <a:hueOff val="2058582"/>
+                <a:satOff val="12356"/>
+                <a:lumOff val="9413"/>
+                <a:alphaOff val="0"/>
+                <a:satMod val="103000"/>
+                <a:lumMod val="102000"/>
+                <a:tint val="94000"/>
+              </a:schemeClr>
+            </a:gs>
+            <a:gs pos="50000">
+              <a:schemeClr val="accent3">
+                <a:hueOff val="2058582"/>
+                <a:satOff val="12356"/>
+                <a:lumOff val="9413"/>
+                <a:alphaOff val="0"/>
+                <a:satMod val="110000"/>
+                <a:lumMod val="100000"/>
+                <a:shade val="100000"/>
+              </a:schemeClr>
+            </a:gs>
+            <a:gs pos="100000">
+              <a:schemeClr val="accent3">
+                <a:hueOff val="2058582"/>
+                <a:satOff val="12356"/>
+                <a:lumOff val="9413"/>
+                <a:alphaOff val="0"/>
+                <a:lumMod val="99000"/>
+                <a:satMod val="120000"/>
+                <a:shade val="78000"/>
+              </a:schemeClr>
+            </a:gs>
+          </a:gsLst>
+          <a:lin ang="5400000" scaled="0"/>
+        </a:gradFill>
         <a:ln>
           <a:noFill/>
         </a:ln>
-        <a:effectLst/>
-        <a:sp3d z="-52400" extrusionH="181000" contourW="38100" prstMaterial="matte">
-          <a:contourClr>
-            <a:schemeClr val="lt1"/>
-          </a:contourClr>
-        </a:sp3d>
+        <a:effectLst>
+          <a:outerShdw blurRad="57150" dist="19050" dir="5400000" algn="ctr" rotWithShape="0">
+            <a:srgbClr val="000000">
+              <a:alpha val="63000"/>
+            </a:srgbClr>
+          </a:outerShdw>
+        </a:effectLst>
       </dsp:spPr>
       <dsp:style>
         <a:lnRef idx="0">
           <a:scrgbClr r="0" g="0" b="0"/>
         </a:lnRef>
-        <a:fillRef idx="1">
+        <a:fillRef idx="3">
           <a:scrgbClr r="0" g="0" b="0"/>
         </a:fillRef>
-        <a:effectRef idx="0">
+        <a:effectRef idx="3">
           <a:scrgbClr r="0" g="0" b="0"/>
         </a:effectRef>
         <a:fontRef idx="minor">
@@ -2180,15 +2226,15 @@
         </a:fontRef>
       </dsp:style>
     </dsp:sp>
-    <dsp:sp modelId="{1586828D-3546-4077-A3EE-360051504D71}">
+    <dsp:sp modelId="{C30D21E8-4557-4AA3-8698-F2E695EB884C}">
       <dsp:nvSpPr>
         <dsp:cNvPr id="0" name=""/>
         <dsp:cNvSpPr/>
       </dsp:nvSpPr>
       <dsp:spPr>
         <a:xfrm>
-          <a:off x="1886581" y="-235973"/>
-          <a:ext cx="3950284" cy="3950284"/>
+          <a:off x="3073878" y="-319198"/>
+          <a:ext cx="4034332" cy="4034332"/>
         </a:xfrm>
         <a:prstGeom prst="circularArrow">
           <a:avLst>
@@ -2199,32 +2245,63 @@
             <a:gd name="adj5" fmla="val 6981"/>
           </a:avLst>
         </a:prstGeom>
-        <a:solidFill>
-          <a:schemeClr val="accent3">
-            <a:hueOff val="4117163"/>
-            <a:satOff val="24712"/>
-            <a:lumOff val="18825"/>
-            <a:alphaOff val="0"/>
-          </a:schemeClr>
-        </a:solidFill>
+        <a:gradFill rotWithShape="0">
+          <a:gsLst>
+            <a:gs pos="0">
+              <a:schemeClr val="accent3">
+                <a:hueOff val="4117163"/>
+                <a:satOff val="24712"/>
+                <a:lumOff val="18825"/>
+                <a:alphaOff val="0"/>
+                <a:satMod val="103000"/>
+                <a:lumMod val="102000"/>
+                <a:tint val="94000"/>
+              </a:schemeClr>
+            </a:gs>
+            <a:gs pos="50000">
+              <a:schemeClr val="accent3">
+                <a:hueOff val="4117163"/>
+                <a:satOff val="24712"/>
+                <a:lumOff val="18825"/>
+                <a:alphaOff val="0"/>
+                <a:satMod val="110000"/>
+                <a:lumMod val="100000"/>
+                <a:shade val="100000"/>
+              </a:schemeClr>
+            </a:gs>
+            <a:gs pos="100000">
+              <a:schemeClr val="accent3">
+                <a:hueOff val="4117163"/>
+                <a:satOff val="24712"/>
+                <a:lumOff val="18825"/>
+                <a:alphaOff val="0"/>
+                <a:lumMod val="99000"/>
+                <a:satMod val="120000"/>
+                <a:shade val="78000"/>
+              </a:schemeClr>
+            </a:gs>
+          </a:gsLst>
+          <a:lin ang="5400000" scaled="0"/>
+        </a:gradFill>
         <a:ln>
           <a:noFill/>
         </a:ln>
-        <a:effectLst/>
-        <a:sp3d z="-52400" extrusionH="181000" contourW="38100" prstMaterial="matte">
-          <a:contourClr>
-            <a:schemeClr val="lt1"/>
-          </a:contourClr>
-        </a:sp3d>
+        <a:effectLst>
+          <a:outerShdw blurRad="57150" dist="19050" dir="5400000" algn="ctr" rotWithShape="0">
+            <a:srgbClr val="000000">
+              <a:alpha val="63000"/>
+            </a:srgbClr>
+          </a:outerShdw>
+        </a:effectLst>
       </dsp:spPr>
       <dsp:style>
         <a:lnRef idx="0">
           <a:scrgbClr r="0" g="0" b="0"/>
         </a:lnRef>
-        <a:fillRef idx="1">
+        <a:fillRef idx="3">
           <a:scrgbClr r="0" g="0" b="0"/>
         </a:fillRef>
-        <a:effectRef idx="0">
+        <a:effectRef idx="3">
           <a:scrgbClr r="0" g="0" b="0"/>
         </a:effectRef>
         <a:fontRef idx="minor">
@@ -2710,35 +2787,31 @@
 </file>
 
 <file path=ppt/diagrams/quickStyle1.xml><?xml version="1.0" encoding="utf-8"?>
-<dgm:styleDef xmlns:dgm="http://schemas.openxmlformats.org/drawingml/2006/diagram" xmlns:a="http://schemas.openxmlformats.org/drawingml/2006/main" uniqueId="urn:microsoft.com/office/officeart/2005/8/quickstyle/3d5">
+<dgm:styleDef xmlns:dgm="http://schemas.openxmlformats.org/drawingml/2006/diagram" xmlns:a="http://schemas.openxmlformats.org/drawingml/2006/main" uniqueId="urn:microsoft.com/office/officeart/2005/8/quickstyle/simple5">
   <dgm:title val=""/>
   <dgm:desc val=""/>
   <dgm:catLst>
-    <dgm:cat type="3D" pri="11500"/>
+    <dgm:cat type="simple" pri="10500"/>
   </dgm:catLst>
   <dgm:scene3d>
-    <a:camera prst="isometricOffAxis2Left" zoom="95000"/>
-    <a:lightRig rig="flat" dir="t"/>
+    <a:camera prst="orthographicFront"/>
+    <a:lightRig rig="threePt" dir="t"/>
   </dgm:scene3d>
   <dgm:styleLbl name="node0">
     <dgm:scene3d>
       <a:camera prst="orthographicFront"/>
       <a:lightRig rig="threePt" dir="t"/>
     </dgm:scene3d>
-    <dgm:sp3d extrusionH="381000" contourW="38100" prstMaterial="matte">
-      <a:contourClr>
-        <a:schemeClr val="lt1"/>
-      </a:contourClr>
-    </dgm:sp3d>
+    <dgm:sp3d/>
     <dgm:txPr/>
     <dgm:style>
       <a:lnRef idx="0">
         <a:scrgbClr r="0" g="0" b="0"/>
       </a:lnRef>
-      <a:fillRef idx="1">
+      <a:fillRef idx="3">
         <a:scrgbClr r="0" g="0" b="0"/>
       </a:fillRef>
-      <a:effectRef idx="0">
+      <a:effectRef idx="3">
         <a:scrgbClr r="0" g="0" b="0"/>
       </a:effectRef>
       <a:fontRef idx="minor">
@@ -2751,20 +2824,16 @@
       <a:camera prst="orthographicFront"/>
       <a:lightRig rig="threePt" dir="t"/>
     </dgm:scene3d>
-    <dgm:sp3d extrusionH="381000" contourW="38100" prstMaterial="matte">
-      <a:contourClr>
-        <a:schemeClr val="lt1"/>
-      </a:contourClr>
-    </dgm:sp3d>
+    <dgm:sp3d/>
     <dgm:txPr/>
     <dgm:style>
       <a:lnRef idx="0">
         <a:scrgbClr r="0" g="0" b="0"/>
       </a:lnRef>
-      <a:fillRef idx="1">
+      <a:fillRef idx="3">
         <a:scrgbClr r="0" g="0" b="0"/>
       </a:fillRef>
-      <a:effectRef idx="0">
+      <a:effectRef idx="3">
         <a:scrgbClr r="0" g="0" b="0"/>
       </a:effectRef>
       <a:fontRef idx="minor">
@@ -2777,20 +2846,16 @@
       <a:camera prst="orthographicFront"/>
       <a:lightRig rig="threePt" dir="t"/>
     </dgm:scene3d>
-    <dgm:sp3d extrusionH="381000" contourW="38100" prstMaterial="matte">
-      <a:contourClr>
-        <a:schemeClr val="lt1"/>
-      </a:contourClr>
-    </dgm:sp3d>
+    <dgm:sp3d/>
     <dgm:txPr/>
     <dgm:style>
       <a:lnRef idx="0">
         <a:scrgbClr r="0" g="0" b="0"/>
       </a:lnRef>
-      <a:fillRef idx="1">
+      <a:fillRef idx="3">
         <a:scrgbClr r="0" g="0" b="0"/>
       </a:fillRef>
-      <a:effectRef idx="0">
+      <a:effectRef idx="3">
         <a:scrgbClr r="0" g="0" b="0"/>
       </a:effectRef>
       <a:fontRef idx="minor">
@@ -2803,20 +2868,16 @@
       <a:camera prst="orthographicFront"/>
       <a:lightRig rig="threePt" dir="t"/>
     </dgm:scene3d>
-    <dgm:sp3d extrusionH="381000" contourW="38100" prstMaterial="matte">
-      <a:contourClr>
-        <a:schemeClr val="lt1"/>
-      </a:contourClr>
-    </dgm:sp3d>
+    <dgm:sp3d/>
     <dgm:txPr/>
     <dgm:style>
       <a:lnRef idx="1">
         <a:scrgbClr r="0" g="0" b="0"/>
       </a:lnRef>
-      <a:fillRef idx="1">
+      <a:fillRef idx="3">
         <a:scrgbClr r="0" g="0" b="0"/>
       </a:fillRef>
-      <a:effectRef idx="0">
+      <a:effectRef idx="3">
         <a:scrgbClr r="0" g="0" b="0"/>
       </a:effectRef>
       <a:fontRef idx="minor">
@@ -2829,20 +2890,16 @@
       <a:camera prst="orthographicFront"/>
       <a:lightRig rig="threePt" dir="t"/>
     </dgm:scene3d>
-    <dgm:sp3d extrusionH="381000" contourW="38100" prstMaterial="matte">
-      <a:contourClr>
-        <a:schemeClr val="lt1"/>
-      </a:contourClr>
-    </dgm:sp3d>
+    <dgm:sp3d/>
     <dgm:txPr/>
     <dgm:style>
       <a:lnRef idx="0">
         <a:scrgbClr r="0" g="0" b="0"/>
       </a:lnRef>
-      <a:fillRef idx="1">
+      <a:fillRef idx="3">
         <a:scrgbClr r="0" g="0" b="0"/>
       </a:fillRef>
-      <a:effectRef idx="0">
+      <a:effectRef idx="3">
         <a:scrgbClr r="0" g="0" b="0"/>
       </a:effectRef>
       <a:fontRef idx="minor">
@@ -2855,20 +2912,16 @@
       <a:camera prst="orthographicFront"/>
       <a:lightRig rig="threePt" dir="t"/>
     </dgm:scene3d>
-    <dgm:sp3d extrusionH="381000" contourW="38100" prstMaterial="matte">
-      <a:contourClr>
-        <a:schemeClr val="lt1"/>
-      </a:contourClr>
-    </dgm:sp3d>
+    <dgm:sp3d/>
     <dgm:txPr/>
     <dgm:style>
       <a:lnRef idx="0">
         <a:scrgbClr r="0" g="0" b="0"/>
       </a:lnRef>
-      <a:fillRef idx="1">
+      <a:fillRef idx="3">
         <a:scrgbClr r="0" g="0" b="0"/>
       </a:fillRef>
-      <a:effectRef idx="0">
+      <a:effectRef idx="3">
         <a:scrgbClr r="0" g="0" b="0"/>
       </a:effectRef>
       <a:fontRef idx="minor">
@@ -2881,20 +2934,16 @@
       <a:camera prst="orthographicFront"/>
       <a:lightRig rig="threePt" dir="t"/>
     </dgm:scene3d>
-    <dgm:sp3d extrusionH="381000" contourW="38100" prstMaterial="matte">
-      <a:contourClr>
-        <a:schemeClr val="lt1"/>
-      </a:contourClr>
-    </dgm:sp3d>
+    <dgm:sp3d/>
     <dgm:txPr/>
     <dgm:style>
       <a:lnRef idx="0">
         <a:scrgbClr r="0" g="0" b="0"/>
       </a:lnRef>
-      <a:fillRef idx="1">
+      <a:fillRef idx="3">
         <a:scrgbClr r="0" g="0" b="0"/>
       </a:fillRef>
-      <a:effectRef idx="0">
+      <a:effectRef idx="3">
         <a:scrgbClr r="0" g="0" b="0"/>
       </a:effectRef>
       <a:fontRef idx="minor">
@@ -2907,20 +2956,16 @@
       <a:camera prst="orthographicFront"/>
       <a:lightRig rig="threePt" dir="t"/>
     </dgm:scene3d>
-    <dgm:sp3d extrusionH="381000" contourW="38100" prstMaterial="matte">
-      <a:contourClr>
-        <a:schemeClr val="lt1"/>
-      </a:contourClr>
-    </dgm:sp3d>
+    <dgm:sp3d/>
     <dgm:txPr/>
     <dgm:style>
       <a:lnRef idx="0">
         <a:scrgbClr r="0" g="0" b="0"/>
       </a:lnRef>
-      <a:fillRef idx="1">
+      <a:fillRef idx="3">
         <a:scrgbClr r="0" g="0" b="0"/>
       </a:fillRef>
-      <a:effectRef idx="0">
+      <a:effectRef idx="3">
         <a:scrgbClr r="0" g="0" b="0"/>
       </a:effectRef>
       <a:fontRef idx="minor">
@@ -2933,11 +2978,7 @@
       <a:camera prst="orthographicFront"/>
       <a:lightRig rig="threePt" dir="t"/>
     </dgm:scene3d>
-    <dgm:sp3d z="57150" extrusionH="63500" contourW="12700" prstMaterial="matte">
-      <a:contourClr>
-        <a:schemeClr val="lt1"/>
-      </a:contourClr>
-    </dgm:sp3d>
+    <dgm:sp3d/>
     <dgm:txPr/>
     <dgm:style>
       <a:lnRef idx="0">
@@ -2946,7 +2987,7 @@
       <a:fillRef idx="1">
         <a:scrgbClr r="0" g="0" b="0"/>
       </a:fillRef>
-      <a:effectRef idx="0">
+      <a:effectRef idx="3">
         <a:scrgbClr r="0" g="0" b="0"/>
       </a:effectRef>
       <a:fontRef idx="minor"/>
@@ -2957,11 +2998,7 @@
       <a:camera prst="orthographicFront"/>
       <a:lightRig rig="threePt" dir="t"/>
     </dgm:scene3d>
-    <dgm:sp3d extrusionH="63500" contourW="12700" prstMaterial="matte">
-      <a:contourClr>
-        <a:schemeClr val="lt1"/>
-      </a:contourClr>
-    </dgm:sp3d>
+    <dgm:sp3d/>
     <dgm:txPr/>
     <dgm:style>
       <a:lnRef idx="0">
@@ -2970,7 +3007,7 @@
       <a:fillRef idx="1">
         <a:scrgbClr r="0" g="0" b="0"/>
       </a:fillRef>
-      <a:effectRef idx="0">
+      <a:effectRef idx="3">
         <a:scrgbClr r="0" g="0" b="0"/>
       </a:effectRef>
       <a:fontRef idx="minor"/>
@@ -2981,11 +3018,7 @@
       <a:camera prst="orthographicFront"/>
       <a:lightRig rig="threePt" dir="t"/>
     </dgm:scene3d>
-    <dgm:sp3d z="-381000" extrusionH="63500" contourW="12700" prstMaterial="matte">
-      <a:contourClr>
-        <a:schemeClr val="lt1"/>
-      </a:contourClr>
-    </dgm:sp3d>
+    <dgm:sp3d/>
     <dgm:txPr/>
     <dgm:style>
       <a:lnRef idx="0">
@@ -2994,7 +3027,7 @@
       <a:fillRef idx="1">
         <a:scrgbClr r="0" g="0" b="0"/>
       </a:fillRef>
-      <a:effectRef idx="0">
+      <a:effectRef idx="3">
         <a:scrgbClr r="0" g="0" b="0"/>
       </a:effectRef>
       <a:fontRef idx="minor"/>
@@ -3005,20 +3038,16 @@
       <a:camera prst="orthographicFront"/>
       <a:lightRig rig="threePt" dir="t"/>
     </dgm:scene3d>
-    <dgm:sp3d z="-52400" extrusionH="181000" contourW="38100" prstMaterial="matte">
-      <a:contourClr>
-        <a:schemeClr val="lt1"/>
-      </a:contourClr>
-    </dgm:sp3d>
+    <dgm:sp3d/>
     <dgm:txPr/>
     <dgm:style>
       <a:lnRef idx="0">
         <a:scrgbClr r="0" g="0" b="0"/>
       </a:lnRef>
-      <a:fillRef idx="1">
+      <a:fillRef idx="3">
         <a:scrgbClr r="0" g="0" b="0"/>
       </a:fillRef>
-      <a:effectRef idx="0">
+      <a:effectRef idx="3">
         <a:scrgbClr r="0" g="0" b="0"/>
       </a:effectRef>
       <a:fontRef idx="minor">
@@ -3031,22 +3060,16 @@
       <a:camera prst="orthographicFront"/>
       <a:lightRig rig="threePt" dir="t"/>
     </dgm:scene3d>
-    <dgm:sp3d z="57150" extrusionH="63500" contourW="12700" prstMaterial="matte">
-      <a:contourClr>
-        <a:schemeClr val="dk1">
-          <a:tint val="20000"/>
-        </a:schemeClr>
-      </a:contourClr>
-    </dgm:sp3d>
+    <dgm:sp3d/>
     <dgm:txPr/>
     <dgm:style>
       <a:lnRef idx="0">
         <a:scrgbClr r="0" g="0" b="0"/>
       </a:lnRef>
-      <a:fillRef idx="1">
+      <a:fillRef idx="3">
         <a:scrgbClr r="0" g="0" b="0"/>
       </a:fillRef>
-      <a:effectRef idx="0">
+      <a:effectRef idx="3">
         <a:scrgbClr r="0" g="0" b="0"/>
       </a:effectRef>
       <a:fontRef idx="minor">
@@ -3059,22 +3082,16 @@
       <a:camera prst="orthographicFront"/>
       <a:lightRig rig="threePt" dir="t"/>
     </dgm:scene3d>
-    <dgm:sp3d z="-381000" extrusionH="63500" contourW="12700" prstMaterial="matte">
-      <a:contourClr>
-        <a:schemeClr val="dk1">
-          <a:tint val="20000"/>
-        </a:schemeClr>
-      </a:contourClr>
-    </dgm:sp3d>
+    <dgm:sp3d/>
     <dgm:txPr/>
     <dgm:style>
       <a:lnRef idx="0">
         <a:scrgbClr r="0" g="0" b="0"/>
       </a:lnRef>
-      <a:fillRef idx="1">
+      <a:fillRef idx="3">
         <a:scrgbClr r="0" g="0" b="0"/>
       </a:fillRef>
-      <a:effectRef idx="0">
+      <a:effectRef idx="3">
         <a:scrgbClr r="0" g="0" b="0"/>
       </a:effectRef>
       <a:fontRef idx="minor">
@@ -3087,7 +3104,7 @@
       <a:camera prst="orthographicFront"/>
       <a:lightRig rig="threePt" dir="t"/>
     </dgm:scene3d>
-    <dgm:sp3d z="-40000" prstMaterial="matte"/>
+    <dgm:sp3d/>
     <dgm:txPr/>
     <dgm:style>
       <a:lnRef idx="1">
@@ -3107,16 +3124,16 @@
       <a:camera prst="orthographicFront"/>
       <a:lightRig rig="threePt" dir="t"/>
     </dgm:scene3d>
-    <dgm:sp3d z="127000" prstMaterial="matte"/>
+    <dgm:sp3d/>
     <dgm:txPr/>
     <dgm:style>
-      <a:lnRef idx="2">
+      <a:lnRef idx="1">
         <a:scrgbClr r="0" g="0" b="0"/>
       </a:lnRef>
-      <a:fillRef idx="1">
+      <a:fillRef idx="0">
         <a:scrgbClr r="0" g="0" b="0"/>
       </a:fillRef>
-      <a:effectRef idx="0">
+      <a:effectRef idx="1">
         <a:scrgbClr r="0" g="0" b="0"/>
       </a:effectRef>
       <a:fontRef idx="minor"/>
@@ -3127,20 +3144,16 @@
       <a:camera prst="orthographicFront"/>
       <a:lightRig rig="threePt" dir="t"/>
     </dgm:scene3d>
-    <dgm:sp3d extrusionH="381000" contourW="38100" prstMaterial="matte">
-      <a:contourClr>
-        <a:schemeClr val="lt1"/>
-      </a:contourClr>
-    </dgm:sp3d>
+    <dgm:sp3d/>
     <dgm:txPr/>
     <dgm:style>
       <a:lnRef idx="0">
         <a:scrgbClr r="0" g="0" b="0"/>
       </a:lnRef>
-      <a:fillRef idx="1">
+      <a:fillRef idx="3">
         <a:scrgbClr r="0" g="0" b="0"/>
       </a:fillRef>
-      <a:effectRef idx="0">
+      <a:effectRef idx="3">
         <a:scrgbClr r="0" g="0" b="0"/>
       </a:effectRef>
       <a:fontRef idx="minor">
@@ -3153,20 +3166,16 @@
       <a:camera prst="orthographicFront"/>
       <a:lightRig rig="threePt" dir="t"/>
     </dgm:scene3d>
-    <dgm:sp3d extrusionH="381000" contourW="38100" prstMaterial="matte">
-      <a:contourClr>
-        <a:schemeClr val="lt1"/>
-      </a:contourClr>
-    </dgm:sp3d>
+    <dgm:sp3d/>
     <dgm:txPr/>
     <dgm:style>
       <a:lnRef idx="0">
         <a:scrgbClr r="0" g="0" b="0"/>
       </a:lnRef>
-      <a:fillRef idx="1">
+      <a:fillRef idx="3">
         <a:scrgbClr r="0" g="0" b="0"/>
       </a:fillRef>
-      <a:effectRef idx="0">
+      <a:effectRef idx="3">
         <a:scrgbClr r="0" g="0" b="0"/>
       </a:effectRef>
       <a:fontRef idx="minor">
@@ -3179,20 +3188,16 @@
       <a:camera prst="orthographicFront"/>
       <a:lightRig rig="threePt" dir="t"/>
     </dgm:scene3d>
-    <dgm:sp3d extrusionH="381000" contourW="38100" prstMaterial="matte">
-      <a:contourClr>
-        <a:schemeClr val="lt1"/>
-      </a:contourClr>
-    </dgm:sp3d>
+    <dgm:sp3d/>
     <dgm:txPr/>
     <dgm:style>
       <a:lnRef idx="0">
         <a:scrgbClr r="0" g="0" b="0"/>
       </a:lnRef>
-      <a:fillRef idx="1">
+      <a:fillRef idx="3">
         <a:scrgbClr r="0" g="0" b="0"/>
       </a:fillRef>
-      <a:effectRef idx="0">
+      <a:effectRef idx="3">
         <a:scrgbClr r="0" g="0" b="0"/>
       </a:effectRef>
       <a:fontRef idx="minor">
@@ -3205,20 +3210,16 @@
       <a:camera prst="orthographicFront"/>
       <a:lightRig rig="threePt" dir="t"/>
     </dgm:scene3d>
-    <dgm:sp3d extrusionH="381000" contourW="38100" prstMaterial="matte">
-      <a:contourClr>
-        <a:schemeClr val="lt1"/>
-      </a:contourClr>
-    </dgm:sp3d>
+    <dgm:sp3d/>
     <dgm:txPr/>
     <dgm:style>
       <a:lnRef idx="0">
         <a:scrgbClr r="0" g="0" b="0"/>
       </a:lnRef>
-      <a:fillRef idx="1">
+      <a:fillRef idx="3">
         <a:scrgbClr r="0" g="0" b="0"/>
       </a:fillRef>
-      <a:effectRef idx="0">
+      <a:effectRef idx="3">
         <a:scrgbClr r="0" g="0" b="0"/>
       </a:effectRef>
       <a:fontRef idx="minor">
@@ -3226,25 +3227,43 @@
       </a:fontRef>
     </dgm:style>
   </dgm:styleLbl>
+  <dgm:styleLbl name="asst4">
+    <dgm:scene3d>
+      <a:camera prst="orthographicFront"/>
+      <a:lightRig rig="threePt" dir="t"/>
+    </dgm:scene3d>
+    <dgm:sp3d/>
+    <dgm:txPr/>
+    <dgm:style>
+      <a:lnRef idx="0">
+        <a:scrgbClr r="0" g="0" b="0"/>
+      </a:lnRef>
+      <a:fillRef idx="3">
+        <a:scrgbClr r="0" g="0" b="0"/>
+      </a:fillRef>
+      <a:effectRef idx="3">
+        <a:scrgbClr r="0" g="0" b="0"/>
+      </a:effectRef>
+      <a:fontRef idx="minor">
+        <a:schemeClr val="lt1"/>
+      </a:fontRef>
+    </dgm:style>
+  </dgm:styleLbl>
   <dgm:styleLbl name="parChTrans2D1">
     <dgm:scene3d>
       <a:camera prst="orthographicFront"/>
       <a:lightRig rig="threePt" dir="t"/>
     </dgm:scene3d>
-    <dgm:sp3d z="52400" extrusionH="381000" contourW="38100" prstMaterial="matte">
-      <a:contourClr>
-        <a:schemeClr val="lt1"/>
-      </a:contourClr>
-    </dgm:sp3d>
+    <dgm:sp3d/>
     <dgm:txPr/>
     <dgm:style>
       <a:lnRef idx="0">
         <a:scrgbClr r="0" g="0" b="0"/>
       </a:lnRef>
-      <a:fillRef idx="1">
+      <a:fillRef idx="3">
         <a:scrgbClr r="0" g="0" b="0"/>
       </a:fillRef>
-      <a:effectRef idx="0">
+      <a:effectRef idx="3">
         <a:scrgbClr r="0" g="0" b="0"/>
       </a:effectRef>
       <a:fontRef idx="minor">
@@ -3257,20 +3276,16 @@
       <a:camera prst="orthographicFront"/>
       <a:lightRig rig="threePt" dir="t"/>
     </dgm:scene3d>
-    <dgm:sp3d z="52400" extrusionH="381000" contourW="38100" prstMaterial="matte">
-      <a:contourClr>
-        <a:schemeClr val="lt1"/>
-      </a:contourClr>
-    </dgm:sp3d>
+    <dgm:sp3d/>
     <dgm:txPr/>
     <dgm:style>
       <a:lnRef idx="0">
         <a:scrgbClr r="0" g="0" b="0"/>
       </a:lnRef>
-      <a:fillRef idx="1">
+      <a:fillRef idx="3">
         <a:scrgbClr r="0" g="0" b="0"/>
       </a:fillRef>
-      <a:effectRef idx="0">
+      <a:effectRef idx="3">
         <a:scrgbClr r="0" g="0" b="0"/>
       </a:effectRef>
       <a:fontRef idx="minor">
@@ -3283,10 +3298,7 @@
       <a:camera prst="orthographicFront"/>
       <a:lightRig rig="threePt" dir="t"/>
     </dgm:scene3d>
-    <dgm:sp3d z="60000" prstMaterial="flat">
-      <a:bevelT w="120900" h="88900"/>
-      <a:bevelB w="88900" h="31750" prst="angle"/>
-    </dgm:sp3d>
+    <dgm:sp3d/>
     <dgm:txPr/>
     <dgm:style>
       <a:lnRef idx="0">
@@ -3295,7 +3307,7 @@
       <a:fillRef idx="3">
         <a:scrgbClr r="0" g="0" b="0"/>
       </a:fillRef>
-      <a:effectRef idx="1">
+      <a:effectRef idx="3">
         <a:scrgbClr r="0" g="0" b="0"/>
       </a:effectRef>
       <a:fontRef idx="minor">
@@ -3308,10 +3320,7 @@
       <a:camera prst="orthographicFront"/>
       <a:lightRig rig="threePt" dir="t"/>
     </dgm:scene3d>
-    <dgm:sp3d z="60000" prstMaterial="flat">
-      <a:bevelT w="120900" h="88900"/>
-      <a:bevelB w="88900" h="31750" prst="angle"/>
-    </dgm:sp3d>
+    <dgm:sp3d/>
     <dgm:txPr/>
     <dgm:style>
       <a:lnRef idx="0">
@@ -3320,7 +3329,7 @@
       <a:fillRef idx="3">
         <a:scrgbClr r="0" g="0" b="0"/>
       </a:fillRef>
-      <a:effectRef idx="1">
+      <a:effectRef idx="3">
         <a:scrgbClr r="0" g="0" b="0"/>
       </a:effectRef>
       <a:fontRef idx="minor">
@@ -3333,7 +3342,7 @@
       <a:camera prst="orthographicFront"/>
       <a:lightRig rig="threePt" dir="t"/>
     </dgm:scene3d>
-    <dgm:sp3d z="-40000" prstMaterial="matte"/>
+    <dgm:sp3d/>
     <dgm:txPr/>
     <dgm:style>
       <a:lnRef idx="2">
@@ -3353,7 +3362,7 @@
       <a:camera prst="orthographicFront"/>
       <a:lightRig rig="threePt" dir="t"/>
     </dgm:scene3d>
-    <dgm:sp3d z="-40000" prstMaterial="matte"/>
+    <dgm:sp3d/>
     <dgm:txPr/>
     <dgm:style>
       <a:lnRef idx="2">
@@ -3373,7 +3382,7 @@
       <a:camera prst="orthographicFront"/>
       <a:lightRig rig="threePt" dir="t"/>
     </dgm:scene3d>
-    <dgm:sp3d z="-40000" prstMaterial="matte"/>
+    <dgm:sp3d/>
     <dgm:txPr/>
     <dgm:style>
       <a:lnRef idx="2">
@@ -3393,7 +3402,7 @@
       <a:camera prst="orthographicFront"/>
       <a:lightRig rig="threePt" dir="t"/>
     </dgm:scene3d>
-    <dgm:sp3d z="-40000" prstMaterial="matte"/>
+    <dgm:sp3d/>
     <dgm:txPr/>
     <dgm:style>
       <a:lnRef idx="2">
@@ -3413,7 +3422,7 @@
       <a:camera prst="orthographicFront"/>
       <a:lightRig rig="threePt" dir="t"/>
     </dgm:scene3d>
-    <dgm:sp3d z="57150" extrusionH="63500" prstMaterial="matte"/>
+    <dgm:sp3d/>
     <dgm:txPr/>
     <dgm:style>
       <a:lnRef idx="1">
@@ -3422,7 +3431,7 @@
       <a:fillRef idx="1">
         <a:scrgbClr r="0" g="0" b="0"/>
       </a:fillRef>
-      <a:effectRef idx="0">
+      <a:effectRef idx="2">
         <a:scrgbClr r="0" g="0" b="0"/>
       </a:effectRef>
       <a:fontRef idx="minor"/>
@@ -3433,7 +3442,7 @@
       <a:camera prst="orthographicFront"/>
       <a:lightRig rig="threePt" dir="t"/>
     </dgm:scene3d>
-    <dgm:sp3d z="-60000" extrusionH="63500" prstMaterial="matte"/>
+    <dgm:sp3d/>
     <dgm:txPr/>
     <dgm:style>
       <a:lnRef idx="1">
@@ -3442,7 +3451,7 @@
       <a:fillRef idx="1">
         <a:scrgbClr r="0" g="0" b="0"/>
       </a:fillRef>
-      <a:effectRef idx="0">
+      <a:effectRef idx="2">
         <a:scrgbClr r="0" g="0" b="0"/>
       </a:effectRef>
       <a:fontRef idx="minor"/>
@@ -3453,7 +3462,7 @@
       <a:camera prst="orthographicFront"/>
       <a:lightRig rig="threePt" dir="t"/>
     </dgm:scene3d>
-    <dgm:sp3d z="-60000" extrusionH="63500" prstMaterial="matte"/>
+    <dgm:sp3d/>
     <dgm:txPr/>
     <dgm:style>
       <a:lnRef idx="1">
@@ -3462,7 +3471,7 @@
       <a:fillRef idx="1">
         <a:scrgbClr r="0" g="0" b="0"/>
       </a:fillRef>
-      <a:effectRef idx="0">
+      <a:effectRef idx="2">
         <a:scrgbClr r="0" g="0" b="0"/>
       </a:effectRef>
       <a:fontRef idx="minor"/>
@@ -3473,7 +3482,7 @@
       <a:camera prst="orthographicFront"/>
       <a:lightRig rig="threePt" dir="t"/>
     </dgm:scene3d>
-    <dgm:sp3d extrusionH="381000" prstMaterial="matte"/>
+    <dgm:sp3d/>
     <dgm:txPr/>
     <dgm:style>
       <a:lnRef idx="1">
@@ -3493,7 +3502,7 @@
       <a:camera prst="orthographicFront"/>
       <a:lightRig rig="threePt" dir="t"/>
     </dgm:scene3d>
-    <dgm:sp3d z="-400500" extrusionH="63500" prstMaterial="matte"/>
+    <dgm:sp3d/>
     <dgm:txPr/>
     <dgm:style>
       <a:lnRef idx="1">
@@ -3502,7 +3511,7 @@
       <a:fillRef idx="1">
         <a:scrgbClr r="0" g="0" b="0"/>
       </a:fillRef>
-      <a:effectRef idx="0">
+      <a:effectRef idx="2">
         <a:scrgbClr r="0" g="0" b="0"/>
       </a:effectRef>
       <a:fontRef idx="minor"/>
@@ -3513,9 +3522,7 @@
       <a:camera prst="orthographicFront"/>
       <a:lightRig rig="threePt" dir="t"/>
     </dgm:scene3d>
-    <dgm:sp3d z="57150" extrusionH="12700" prstMaterial="flat">
-      <a:bevelT w="50800" h="50800"/>
-    </dgm:sp3d>
+    <dgm:sp3d/>
     <dgm:txPr/>
     <dgm:style>
       <a:lnRef idx="1">
@@ -3535,9 +3542,7 @@
       <a:camera prst="orthographicFront"/>
       <a:lightRig rig="threePt" dir="t"/>
     </dgm:scene3d>
-    <dgm:sp3d extrusionH="12700" prstMaterial="flat">
-      <a:bevelT w="50800" h="50800"/>
-    </dgm:sp3d>
+    <dgm:sp3d/>
     <dgm:txPr/>
     <dgm:style>
       <a:lnRef idx="1">
@@ -3546,7 +3551,7 @@
       <a:fillRef idx="1">
         <a:scrgbClr r="0" g="0" b="0"/>
       </a:fillRef>
-      <a:effectRef idx="2">
+      <a:effectRef idx="3">
         <a:scrgbClr r="0" g="0" b="0"/>
       </a:effectRef>
       <a:fontRef idx="minor"/>
@@ -3557,7 +3562,7 @@
       <a:camera prst="orthographicFront"/>
       <a:lightRig rig="threePt" dir="t"/>
     </dgm:scene3d>
-    <dgm:sp3d z="-63500" extrusionH="63500" prstMaterial="matte"/>
+    <dgm:sp3d/>
     <dgm:txPr/>
     <dgm:style>
       <a:lnRef idx="1">
@@ -3566,7 +3571,7 @@
       <a:fillRef idx="1">
         <a:scrgbClr r="0" g="0" b="0"/>
       </a:fillRef>
-      <a:effectRef idx="0">
+      <a:effectRef idx="3">
         <a:scrgbClr r="0" g="0" b="0"/>
       </a:effectRef>
       <a:fontRef idx="minor"/>
@@ -3577,22 +3582,16 @@
       <a:camera prst="orthographicFront"/>
       <a:lightRig rig="threePt" dir="t"/>
     </dgm:scene3d>
-    <dgm:sp3d z="57150" extrusionH="63500" contourW="12700" prstMaterial="matte">
-      <a:contourClr>
-        <a:schemeClr val="dk1">
-          <a:tint val="20000"/>
-        </a:schemeClr>
-      </a:contourClr>
-    </dgm:sp3d>
+    <dgm:sp3d/>
     <dgm:txPr/>
     <dgm:style>
-      <a:lnRef idx="0">
+      <a:lnRef idx="1">
         <a:scrgbClr r="0" g="0" b="0"/>
       </a:lnRef>
       <a:fillRef idx="1">
         <a:scrgbClr r="0" g="0" b="0"/>
       </a:fillRef>
-      <a:effectRef idx="0">
+      <a:effectRef idx="2">
         <a:scrgbClr r="0" g="0" b="0"/>
       </a:effectRef>
       <a:fontRef idx="minor"/>
@@ -3603,20 +3602,16 @@
       <a:camera prst="orthographicFront"/>
       <a:lightRig rig="threePt" dir="t"/>
     </dgm:scene3d>
-    <dgm:sp3d extrusionH="381000" contourW="38100" prstMaterial="matte">
-      <a:contourClr>
-        <a:schemeClr val="lt1"/>
-      </a:contourClr>
-    </dgm:sp3d>
+    <dgm:sp3d/>
     <dgm:txPr/>
     <dgm:style>
-      <a:lnRef idx="0">
+      <a:lnRef idx="1">
         <a:scrgbClr r="0" g="0" b="0"/>
       </a:lnRef>
       <a:fillRef idx="1">
         <a:scrgbClr r="0" g="0" b="0"/>
       </a:fillRef>
-      <a:effectRef idx="0">
+      <a:effectRef idx="2">
         <a:scrgbClr r="0" g="0" b="0"/>
       </a:effectRef>
       <a:fontRef idx="minor"/>
@@ -3627,14 +3622,10 @@
       <a:camera prst="orthographicFront"/>
       <a:lightRig rig="threePt" dir="t"/>
     </dgm:scene3d>
-    <dgm:sp3d z="-400500" extrusionH="63500" contourW="12700" prstMaterial="matte">
-      <a:contourClr>
-        <a:schemeClr val="lt1"/>
-      </a:contourClr>
-    </dgm:sp3d>
+    <dgm:sp3d/>
     <dgm:txPr/>
     <dgm:style>
-      <a:lnRef idx="0">
+      <a:lnRef idx="1">
         <a:scrgbClr r="0" g="0" b="0"/>
       </a:lnRef>
       <a:fillRef idx="1">
@@ -3651,7 +3642,7 @@
       <a:camera prst="orthographicFront"/>
       <a:lightRig rig="threePt" dir="t"/>
     </dgm:scene3d>
-    <dgm:sp3d z="57150" extrusionH="63500" prstMaterial="matte"/>
+    <dgm:sp3d/>
     <dgm:txPr/>
     <dgm:style>
       <a:lnRef idx="1">
@@ -3660,7 +3651,7 @@
       <a:fillRef idx="1">
         <a:scrgbClr r="0" g="0" b="0"/>
       </a:fillRef>
-      <a:effectRef idx="0">
+      <a:effectRef idx="2">
         <a:scrgbClr r="0" g="0" b="0"/>
       </a:effectRef>
       <a:fontRef idx="minor"/>
@@ -3671,7 +3662,7 @@
       <a:camera prst="orthographicFront"/>
       <a:lightRig rig="threePt" dir="t"/>
     </dgm:scene3d>
-    <dgm:sp3d z="57150" extrusionH="63500" prstMaterial="matte"/>
+    <dgm:sp3d/>
     <dgm:txPr/>
     <dgm:style>
       <a:lnRef idx="1">
@@ -3680,7 +3671,7 @@
       <a:fillRef idx="1">
         <a:scrgbClr r="0" g="0" b="0"/>
       </a:fillRef>
-      <a:effectRef idx="0">
+      <a:effectRef idx="2">
         <a:scrgbClr r="0" g="0" b="0"/>
       </a:effectRef>
       <a:fontRef idx="minor"/>
@@ -3691,7 +3682,7 @@
       <a:camera prst="orthographicFront"/>
       <a:lightRig rig="threePt" dir="t"/>
     </dgm:scene3d>
-    <dgm:sp3d z="57150" extrusionH="63500" prstMaterial="matte"/>
+    <dgm:sp3d/>
     <dgm:txPr/>
     <dgm:style>
       <a:lnRef idx="1">
@@ -3700,7 +3691,7 @@
       <a:fillRef idx="1">
         <a:scrgbClr r="0" g="0" b="0"/>
       </a:fillRef>
-      <a:effectRef idx="0">
+      <a:effectRef idx="2">
         <a:scrgbClr r="0" g="0" b="0"/>
       </a:effectRef>
       <a:fontRef idx="minor"/>
@@ -3711,7 +3702,7 @@
       <a:camera prst="orthographicFront"/>
       <a:lightRig rig="threePt" dir="t"/>
     </dgm:scene3d>
-    <dgm:sp3d z="57150" extrusionH="63500" prstMaterial="matte"/>
+    <dgm:sp3d/>
     <dgm:txPr/>
     <dgm:style>
       <a:lnRef idx="1">
@@ -3720,7 +3711,7 @@
       <a:fillRef idx="1">
         <a:scrgbClr r="0" g="0" b="0"/>
       </a:fillRef>
-      <a:effectRef idx="0">
+      <a:effectRef idx="2">
         <a:scrgbClr r="0" g="0" b="0"/>
       </a:effectRef>
       <a:fontRef idx="minor"/>
@@ -3731,13 +3722,7 @@
       <a:camera prst="orthographicFront"/>
       <a:lightRig rig="threePt" dir="t"/>
     </dgm:scene3d>
-    <dgm:sp3d z="-400500" extrusionH="63500" contourW="12700" prstMaterial="matte">
-      <a:contourClr>
-        <a:schemeClr val="lt1">
-          <a:tint val="50000"/>
-        </a:schemeClr>
-      </a:contourClr>
-    </dgm:sp3d>
+    <dgm:sp3d/>
     <dgm:txPr/>
     <dgm:style>
       <a:lnRef idx="0">
@@ -3746,7 +3731,7 @@
       <a:fillRef idx="1">
         <a:scrgbClr r="0" g="0" b="0"/>
       </a:fillRef>
-      <a:effectRef idx="0">
+      <a:effectRef idx="2">
         <a:scrgbClr r="0" g="0" b="0"/>
       </a:effectRef>
       <a:fontRef idx="minor"/>
@@ -3757,11 +3742,7 @@
       <a:camera prst="orthographicFront"/>
       <a:lightRig rig="threePt" dir="t"/>
     </dgm:scene3d>
-    <dgm:sp3d extrusionH="381000" contourW="38100" prstMaterial="matte">
-      <a:contourClr>
-        <a:schemeClr val="lt1"/>
-      </a:contourClr>
-    </dgm:sp3d>
+    <dgm:sp3d/>
     <dgm:txPr/>
     <dgm:style>
       <a:lnRef idx="0">
@@ -3770,12 +3751,10 @@
       <a:fillRef idx="1">
         <a:scrgbClr r="0" g="0" b="0"/>
       </a:fillRef>
-      <a:effectRef idx="0">
+      <a:effectRef idx="3">
         <a:scrgbClr r="0" g="0" b="0"/>
       </a:effectRef>
-      <a:fontRef idx="minor">
-        <a:schemeClr val="lt1"/>
-      </a:fontRef>
+      <a:fontRef idx="minor"/>
     </dgm:style>
   </dgm:styleLbl>
   <dgm:styleLbl name="trBgShp">
@@ -3783,7 +3762,7 @@
       <a:camera prst="orthographicFront"/>
       <a:lightRig rig="threePt" dir="t"/>
     </dgm:scene3d>
-    <dgm:sp3d z="-400500" prstMaterial="matte"/>
+    <dgm:sp3d/>
     <dgm:txPr/>
     <dgm:style>
       <a:lnRef idx="0">
@@ -3803,22 +3782,16 @@
       <a:camera prst="orthographicFront"/>
       <a:lightRig rig="threePt" dir="t"/>
     </dgm:scene3d>
-    <dgm:sp3d z="57150" extrusionH="63500" contourW="12700" prstMaterial="matte">
-      <a:contourClr>
-        <a:schemeClr val="lt1">
-          <a:tint val="50000"/>
-        </a:schemeClr>
-      </a:contourClr>
-    </dgm:sp3d>
+    <dgm:sp3d/>
     <dgm:txPr/>
     <dgm:style>
       <a:lnRef idx="0">
         <a:scrgbClr r="0" g="0" b="0"/>
       </a:lnRef>
-      <a:fillRef idx="1">
+      <a:fillRef idx="3">
         <a:scrgbClr r="0" g="0" b="0"/>
       </a:fillRef>
-      <a:effectRef idx="0">
+      <a:effectRef idx="3">
         <a:scrgbClr r="0" g="0" b="0"/>
       </a:effectRef>
       <a:fontRef idx="minor"/>
@@ -3978,7 +3951,7 @@
           <a:p>
             <a:fld id="{FE5BC6D1-33DB-4E0E-9717-2EF1BBA8CA1F}" type="datetimeFigureOut">
               <a:rPr lang="ko-KR" altLang="en-US" smtClean="0"/>
-              <a:t>2025-02-14</a:t>
+              <a:t>2025-02-15</a:t>
             </a:fld>
             <a:endParaRPr lang="ko-KR" altLang="en-US"/>
           </a:p>
@@ -4148,7 +4121,7 @@
           <a:p>
             <a:fld id="{FE5BC6D1-33DB-4E0E-9717-2EF1BBA8CA1F}" type="datetimeFigureOut">
               <a:rPr lang="ko-KR" altLang="en-US" smtClean="0"/>
-              <a:t>2025-02-14</a:t>
+              <a:t>2025-02-15</a:t>
             </a:fld>
             <a:endParaRPr lang="ko-KR" altLang="en-US"/>
           </a:p>
@@ -4328,7 +4301,7 @@
           <a:p>
             <a:fld id="{FE5BC6D1-33DB-4E0E-9717-2EF1BBA8CA1F}" type="datetimeFigureOut">
               <a:rPr lang="ko-KR" altLang="en-US" smtClean="0"/>
-              <a:t>2025-02-14</a:t>
+              <a:t>2025-02-15</a:t>
             </a:fld>
             <a:endParaRPr lang="ko-KR" altLang="en-US"/>
           </a:p>
@@ -4498,7 +4471,7 @@
           <a:p>
             <a:fld id="{FE5BC6D1-33DB-4E0E-9717-2EF1BBA8CA1F}" type="datetimeFigureOut">
               <a:rPr lang="ko-KR" altLang="en-US" smtClean="0"/>
-              <a:t>2025-02-14</a:t>
+              <a:t>2025-02-15</a:t>
             </a:fld>
             <a:endParaRPr lang="ko-KR" altLang="en-US"/>
           </a:p>
@@ -4744,7 +4717,7 @@
           <a:p>
             <a:fld id="{FE5BC6D1-33DB-4E0E-9717-2EF1BBA8CA1F}" type="datetimeFigureOut">
               <a:rPr lang="ko-KR" altLang="en-US" smtClean="0"/>
-              <a:t>2025-02-14</a:t>
+              <a:t>2025-02-15</a:t>
             </a:fld>
             <a:endParaRPr lang="ko-KR" altLang="en-US"/>
           </a:p>
@@ -4976,7 +4949,7 @@
           <a:p>
             <a:fld id="{FE5BC6D1-33DB-4E0E-9717-2EF1BBA8CA1F}" type="datetimeFigureOut">
               <a:rPr lang="ko-KR" altLang="en-US" smtClean="0"/>
-              <a:t>2025-02-14</a:t>
+              <a:t>2025-02-15</a:t>
             </a:fld>
             <a:endParaRPr lang="ko-KR" altLang="en-US"/>
           </a:p>
@@ -5343,7 +5316,7 @@
           <a:p>
             <a:fld id="{FE5BC6D1-33DB-4E0E-9717-2EF1BBA8CA1F}" type="datetimeFigureOut">
               <a:rPr lang="ko-KR" altLang="en-US" smtClean="0"/>
-              <a:t>2025-02-14</a:t>
+              <a:t>2025-02-15</a:t>
             </a:fld>
             <a:endParaRPr lang="ko-KR" altLang="en-US"/>
           </a:p>
@@ -5461,7 +5434,7 @@
           <a:p>
             <a:fld id="{FE5BC6D1-33DB-4E0E-9717-2EF1BBA8CA1F}" type="datetimeFigureOut">
               <a:rPr lang="ko-KR" altLang="en-US" smtClean="0"/>
-              <a:t>2025-02-14</a:t>
+              <a:t>2025-02-15</a:t>
             </a:fld>
             <a:endParaRPr lang="ko-KR" altLang="en-US"/>
           </a:p>
@@ -5556,7 +5529,7 @@
           <a:p>
             <a:fld id="{FE5BC6D1-33DB-4E0E-9717-2EF1BBA8CA1F}" type="datetimeFigureOut">
               <a:rPr lang="ko-KR" altLang="en-US" smtClean="0"/>
-              <a:t>2025-02-14</a:t>
+              <a:t>2025-02-15</a:t>
             </a:fld>
             <a:endParaRPr lang="ko-KR" altLang="en-US"/>
           </a:p>
@@ -5833,7 +5806,7 @@
           <a:p>
             <a:fld id="{FE5BC6D1-33DB-4E0E-9717-2EF1BBA8CA1F}" type="datetimeFigureOut">
               <a:rPr lang="ko-KR" altLang="en-US" smtClean="0"/>
-              <a:t>2025-02-14</a:t>
+              <a:t>2025-02-15</a:t>
             </a:fld>
             <a:endParaRPr lang="ko-KR" altLang="en-US"/>
           </a:p>
@@ -6090,7 +6063,7 @@
           <a:p>
             <a:fld id="{FE5BC6D1-33DB-4E0E-9717-2EF1BBA8CA1F}" type="datetimeFigureOut">
               <a:rPr lang="ko-KR" altLang="en-US" smtClean="0"/>
-              <a:t>2025-02-14</a:t>
+              <a:t>2025-02-15</a:t>
             </a:fld>
             <a:endParaRPr lang="ko-KR" altLang="en-US"/>
           </a:p>
@@ -6303,7 +6276,7 @@
           <a:p>
             <a:fld id="{FE5BC6D1-33DB-4E0E-9717-2EF1BBA8CA1F}" type="datetimeFigureOut">
               <a:rPr lang="ko-KR" altLang="en-US" smtClean="0"/>
-              <a:t>2025-02-14</a:t>
+              <a:t>2025-02-15</a:t>
             </a:fld>
             <a:endParaRPr lang="ko-KR" altLang="en-US"/>
           </a:p>
@@ -6710,25 +6683,28 @@
       </p:grpSpPr>
       <p:graphicFrame>
         <p:nvGraphicFramePr>
-          <p:cNvPr id="4" name="다이어그램 3">
+          <p:cNvPr id="4" name="내용 개체 틀 3">
             <a:extLst>
               <a:ext uri="{FF2B5EF4-FFF2-40B4-BE49-F238E27FC236}">
-                <a16:creationId xmlns:a16="http://schemas.microsoft.com/office/drawing/2014/main" id="{B24B6CDC-76C6-F6CD-37B6-CB9C216E8012}"/>
+                <a16:creationId xmlns:a16="http://schemas.microsoft.com/office/drawing/2014/main" id="{3A94C522-282D-7724-7D04-BC886B94404B}"/>
               </a:ext>
             </a:extLst>
           </p:cNvPr>
-          <p:cNvGraphicFramePr/>
+          <p:cNvGraphicFramePr>
+            <a:graphicFrameLocks noGrp="1"/>
+          </p:cNvGraphicFramePr>
           <p:nvPr>
+            <p:ph idx="1"/>
             <p:extLst>
               <p:ext uri="{D42A27DB-BD31-4B8C-83A1-F6EECF244321}">
-                <p14:modId xmlns:p14="http://schemas.microsoft.com/office/powerpoint/2010/main" val="666635168"/>
+                <p14:modId xmlns:p14="http://schemas.microsoft.com/office/powerpoint/2010/main" val="506241947"/>
               </p:ext>
             </p:extLst>
           </p:nvPr>
         </p:nvGraphicFramePr>
         <p:xfrm>
-          <a:off x="3733799" y="0"/>
-          <a:ext cx="7162801" cy="7315200"/>
+          <a:off x="2510443" y="0"/>
+          <a:ext cx="9609513" cy="7315200"/>
         </p:xfrm>
         <a:graphic>
           <a:graphicData uri="http://schemas.openxmlformats.org/drawingml/2006/diagram">
@@ -6739,7 +6715,7 @@
     </p:spTree>
     <p:extLst>
       <p:ext uri="{BB962C8B-B14F-4D97-AF65-F5344CB8AC3E}">
-        <p14:creationId xmlns:p14="http://schemas.microsoft.com/office/powerpoint/2010/main" val="2986180184"/>
+        <p14:creationId xmlns:p14="http://schemas.microsoft.com/office/powerpoint/2010/main" val="2308011379"/>
       </p:ext>
     </p:extLst>
   </p:cSld>

</xml_diff>